<commit_message>
Proceeding to: preprocess input,... > create entities
Former-commit-id: 1a308f1a2e145e7a87f5bc3485b7065a0250544b
</commit_message>
<xml_diff>
--- a/Plan_Task1.pptx
+++ b/Plan_Task1.pptx
@@ -104,6 +104,11 @@
       </a:defRPr>
     </a:lvl9pPr>
   </p:defaultTextStyle>
+  <p:extLst>
+    <p:ext uri="{EFAFB233-063F-42B5-8137-9DF3F51BA10A}">
+      <p15:sldGuideLst xmlns:p15="http://schemas.microsoft.com/office/powerpoint/2012/main"/>
+    </p:ext>
+  </p:extLst>
 </p:presentation>
 </file>
 
@@ -255,7 +260,7 @@
           <a:lstStyle/>
           <a:p>
             <a:fld id="{803220A4-8895-6D46-A558-2CE2469121C7}" type="datetimeFigureOut">
-              <a:t>8/14/19</a:t>
+              <a:t>8/16/19</a:t>
             </a:fld>
             <a:endParaRPr lang="en-US"/>
           </a:p>
@@ -453,7 +458,7 @@
           <a:lstStyle/>
           <a:p>
             <a:fld id="{803220A4-8895-6D46-A558-2CE2469121C7}" type="datetimeFigureOut">
-              <a:t>8/14/19</a:t>
+              <a:t>8/16/19</a:t>
             </a:fld>
             <a:endParaRPr lang="en-US"/>
           </a:p>
@@ -661,7 +666,7 @@
           <a:lstStyle/>
           <a:p>
             <a:fld id="{803220A4-8895-6D46-A558-2CE2469121C7}" type="datetimeFigureOut">
-              <a:t>8/14/19</a:t>
+              <a:t>8/16/19</a:t>
             </a:fld>
             <a:endParaRPr lang="en-US"/>
           </a:p>
@@ -859,7 +864,7 @@
           <a:lstStyle/>
           <a:p>
             <a:fld id="{803220A4-8895-6D46-A558-2CE2469121C7}" type="datetimeFigureOut">
-              <a:t>8/14/19</a:t>
+              <a:t>8/16/19</a:t>
             </a:fld>
             <a:endParaRPr lang="en-US"/>
           </a:p>
@@ -1133,7 +1138,7 @@
           <a:lstStyle/>
           <a:p>
             <a:fld id="{803220A4-8895-6D46-A558-2CE2469121C7}" type="datetimeFigureOut">
-              <a:t>8/14/19</a:t>
+              <a:t>8/16/19</a:t>
             </a:fld>
             <a:endParaRPr lang="en-US"/>
           </a:p>
@@ -1399,7 +1404,7 @@
           <a:lstStyle/>
           <a:p>
             <a:fld id="{803220A4-8895-6D46-A558-2CE2469121C7}" type="datetimeFigureOut">
-              <a:t>8/14/19</a:t>
+              <a:t>8/16/19</a:t>
             </a:fld>
             <a:endParaRPr lang="en-US"/>
           </a:p>
@@ -1812,7 +1817,7 @@
           <a:lstStyle/>
           <a:p>
             <a:fld id="{803220A4-8895-6D46-A558-2CE2469121C7}" type="datetimeFigureOut">
-              <a:t>8/14/19</a:t>
+              <a:t>8/16/19</a:t>
             </a:fld>
             <a:endParaRPr lang="en-US"/>
           </a:p>
@@ -1952,7 +1957,7 @@
           <a:lstStyle/>
           <a:p>
             <a:fld id="{803220A4-8895-6D46-A558-2CE2469121C7}" type="datetimeFigureOut">
-              <a:t>8/14/19</a:t>
+              <a:t>8/16/19</a:t>
             </a:fld>
             <a:endParaRPr lang="en-US"/>
           </a:p>
@@ -2063,7 +2068,7 @@
           <a:lstStyle/>
           <a:p>
             <a:fld id="{803220A4-8895-6D46-A558-2CE2469121C7}" type="datetimeFigureOut">
-              <a:t>8/14/19</a:t>
+              <a:t>8/16/19</a:t>
             </a:fld>
             <a:endParaRPr lang="en-US"/>
           </a:p>
@@ -2374,7 +2379,7 @@
           <a:lstStyle/>
           <a:p>
             <a:fld id="{803220A4-8895-6D46-A558-2CE2469121C7}" type="datetimeFigureOut">
-              <a:t>8/14/19</a:t>
+              <a:t>8/16/19</a:t>
             </a:fld>
             <a:endParaRPr lang="en-US"/>
           </a:p>
@@ -2661,7 +2666,7 @@
           <a:lstStyle/>
           <a:p>
             <a:fld id="{803220A4-8895-6D46-A558-2CE2469121C7}" type="datetimeFigureOut">
-              <a:t>8/14/19</a:t>
+              <a:t>8/16/19</a:t>
             </a:fld>
             <a:endParaRPr lang="en-US"/>
           </a:p>
@@ -2902,7 +2907,7 @@
           </a:lstStyle>
           <a:p>
             <a:fld id="{803220A4-8895-6D46-A558-2CE2469121C7}" type="datetimeFigureOut">
-              <a:t>8/14/19</a:t>
+              <a:t>8/16/19</a:t>
             </a:fld>
             <a:endParaRPr lang="en-US"/>
           </a:p>
@@ -3836,7 +3841,7 @@
             <a:pPr algn="ctr"/>
             <a:r>
               <a:rPr lang="en-US"/>
-              <a:t>Example 1</a:t>
+              <a:t>Example 1: wide</a:t>
             </a:r>
           </a:p>
         </p:txBody>
@@ -3885,7 +3890,7 @@
             <a:pPr algn="ctr"/>
             <a:r>
               <a:rPr lang="en-US"/>
-              <a:t>Example 2</a:t>
+              <a:t>Example 2: wide</a:t>
             </a:r>
           </a:p>
         </p:txBody>

</xml_diff>

<commit_message>
must get a vocabulary for the bootstrap-skipgram...
Former-commit-id: 6f63a4e6398f2a49799a5066c51de19f65a275a2
</commit_message>
<xml_diff>
--- a/Plan_Task1.pptx
+++ b/Plan_Task1.pptx
@@ -5,7 +5,8 @@
     <p:sldMasterId id="2147483648" r:id="rId1"/>
   </p:sldMasterIdLst>
   <p:sldIdLst>
-    <p:sldId id="256" r:id="rId2"/>
+    <p:sldId id="257" r:id="rId2"/>
+    <p:sldId id="256" r:id="rId3"/>
   </p:sldIdLst>
   <p:sldSz cx="12192000" cy="6858000"/>
   <p:notesSz cx="6858000" cy="9144000"/>
@@ -260,7 +261,7 @@
           <a:lstStyle/>
           <a:p>
             <a:fld id="{803220A4-8895-6D46-A558-2CE2469121C7}" type="datetimeFigureOut">
-              <a:t>8/16/19</a:t>
+              <a:t>8/27/19</a:t>
             </a:fld>
             <a:endParaRPr lang="en-US"/>
           </a:p>
@@ -458,7 +459,7 @@
           <a:lstStyle/>
           <a:p>
             <a:fld id="{803220A4-8895-6D46-A558-2CE2469121C7}" type="datetimeFigureOut">
-              <a:t>8/16/19</a:t>
+              <a:t>8/27/19</a:t>
             </a:fld>
             <a:endParaRPr lang="en-US"/>
           </a:p>
@@ -666,7 +667,7 @@
           <a:lstStyle/>
           <a:p>
             <a:fld id="{803220A4-8895-6D46-A558-2CE2469121C7}" type="datetimeFigureOut">
-              <a:t>8/16/19</a:t>
+              <a:t>8/27/19</a:t>
             </a:fld>
             <a:endParaRPr lang="en-US"/>
           </a:p>
@@ -864,7 +865,7 @@
           <a:lstStyle/>
           <a:p>
             <a:fld id="{803220A4-8895-6D46-A558-2CE2469121C7}" type="datetimeFigureOut">
-              <a:t>8/16/19</a:t>
+              <a:t>8/27/19</a:t>
             </a:fld>
             <a:endParaRPr lang="en-US"/>
           </a:p>
@@ -1138,7 +1139,7 @@
           <a:lstStyle/>
           <a:p>
             <a:fld id="{803220A4-8895-6D46-A558-2CE2469121C7}" type="datetimeFigureOut">
-              <a:t>8/16/19</a:t>
+              <a:t>8/27/19</a:t>
             </a:fld>
             <a:endParaRPr lang="en-US"/>
           </a:p>
@@ -1404,7 +1405,7 @@
           <a:lstStyle/>
           <a:p>
             <a:fld id="{803220A4-8895-6D46-A558-2CE2469121C7}" type="datetimeFigureOut">
-              <a:t>8/16/19</a:t>
+              <a:t>8/27/19</a:t>
             </a:fld>
             <a:endParaRPr lang="en-US"/>
           </a:p>
@@ -1817,7 +1818,7 @@
           <a:lstStyle/>
           <a:p>
             <a:fld id="{803220A4-8895-6D46-A558-2CE2469121C7}" type="datetimeFigureOut">
-              <a:t>8/16/19</a:t>
+              <a:t>8/27/19</a:t>
             </a:fld>
             <a:endParaRPr lang="en-US"/>
           </a:p>
@@ -1957,7 +1958,7 @@
           <a:lstStyle/>
           <a:p>
             <a:fld id="{803220A4-8895-6D46-A558-2CE2469121C7}" type="datetimeFigureOut">
-              <a:t>8/16/19</a:t>
+              <a:t>8/27/19</a:t>
             </a:fld>
             <a:endParaRPr lang="en-US"/>
           </a:p>
@@ -2068,7 +2069,7 @@
           <a:lstStyle/>
           <a:p>
             <a:fld id="{803220A4-8895-6D46-A558-2CE2469121C7}" type="datetimeFigureOut">
-              <a:t>8/16/19</a:t>
+              <a:t>8/27/19</a:t>
             </a:fld>
             <a:endParaRPr lang="en-US"/>
           </a:p>
@@ -2379,7 +2380,7 @@
           <a:lstStyle/>
           <a:p>
             <a:fld id="{803220A4-8895-6D46-A558-2CE2469121C7}" type="datetimeFigureOut">
-              <a:t>8/16/19</a:t>
+              <a:t>8/27/19</a:t>
             </a:fld>
             <a:endParaRPr lang="en-US"/>
           </a:p>
@@ -2666,7 +2667,7 @@
           <a:lstStyle/>
           <a:p>
             <a:fld id="{803220A4-8895-6D46-A558-2CE2469121C7}" type="datetimeFigureOut">
-              <a:t>8/16/19</a:t>
+              <a:t>8/27/19</a:t>
             </a:fld>
             <a:endParaRPr lang="en-US"/>
           </a:p>
@@ -2907,7 +2908,7 @@
           </a:lstStyle>
           <a:p>
             <a:fld id="{803220A4-8895-6D46-A558-2CE2469121C7}" type="datetimeFigureOut">
-              <a:t>8/16/19</a:t>
+              <a:t>8/27/19</a:t>
             </a:fld>
             <a:endParaRPr lang="en-US"/>
           </a:p>
@@ -3799,10 +3800,10 @@
       </p:cxnSp>
       <p:sp>
         <p:nvSpPr>
-          <p:cNvPr id="21" name="Snip Diagonal Corner of Rectangle 20">
-            <a:extLst>
-              <a:ext uri="{FF2B5EF4-FFF2-40B4-BE49-F238E27FC236}">
-                <a16:creationId xmlns:a16="http://schemas.microsoft.com/office/drawing/2014/main" id="{26BE3A8B-6ABD-F746-A2B6-66DF83209434}"/>
+          <p:cNvPr id="22" name="Snip Diagonal Corner of Rectangle 21">
+            <a:extLst>
+              <a:ext uri="{FF2B5EF4-FFF2-40B4-BE49-F238E27FC236}">
+                <a16:creationId xmlns:a16="http://schemas.microsoft.com/office/drawing/2014/main" id="{03FFFF54-9ACB-C840-8492-CD56692A8258}"/>
               </a:ext>
             </a:extLst>
           </p:cNvPr>
@@ -3811,8 +3812,8 @@
         </p:nvSpPr>
         <p:spPr>
           <a:xfrm>
-            <a:off x="1223319" y="4365024"/>
-            <a:ext cx="1799966" cy="717721"/>
+            <a:off x="1223318" y="3297080"/>
+            <a:ext cx="2047517" cy="1825198"/>
           </a:xfrm>
           <a:prstGeom prst="snip2DiagRect">
             <a:avLst/>
@@ -3841,17 +3842,160 @@
             <a:pPr algn="ctr"/>
             <a:r>
               <a:rPr lang="en-US"/>
-              <a:t>Example 1: wide</a:t>
-            </a:r>
-          </a:p>
-        </p:txBody>
-      </p:sp>
-      <p:sp>
-        <p:nvSpPr>
-          <p:cNvPr id="22" name="Snip Diagonal Corner of Rectangle 21">
-            <a:extLst>
-              <a:ext uri="{FF2B5EF4-FFF2-40B4-BE49-F238E27FC236}">
-                <a16:creationId xmlns:a16="http://schemas.microsoft.com/office/drawing/2014/main" id="{03FFFF54-9ACB-C840-8492-CD56692A8258}"/>
+              <a:t>”wide” word vector from having applied Skip-Gram over the corpus of examples</a:t>
+            </a:r>
+          </a:p>
+        </p:txBody>
+      </p:sp>
+      <p:sp>
+        <p:nvSpPr>
+          <p:cNvPr id="23" name="TextBox 22">
+            <a:extLst>
+              <a:ext uri="{FF2B5EF4-FFF2-40B4-BE49-F238E27FC236}">
+                <a16:creationId xmlns:a16="http://schemas.microsoft.com/office/drawing/2014/main" id="{24515796-A3A4-984B-8D4C-EB5B1CF9FD90}"/>
+              </a:ext>
+            </a:extLst>
+          </p:cNvPr>
+          <p:cNvSpPr txBox="1"/>
+          <p:nvPr/>
+        </p:nvSpPr>
+        <p:spPr>
+          <a:xfrm>
+            <a:off x="975768" y="5488457"/>
+            <a:ext cx="2295068" cy="1200329"/>
+          </a:xfrm>
+          <a:prstGeom prst="rect">
+            <a:avLst/>
+          </a:prstGeom>
+        </p:spPr>
+        <p:style>
+          <a:lnRef idx="2">
+            <a:schemeClr val="dk1"/>
+          </a:lnRef>
+          <a:fillRef idx="1">
+            <a:schemeClr val="lt1"/>
+          </a:fillRef>
+          <a:effectRef idx="0">
+            <a:schemeClr val="dk1"/>
+          </a:effectRef>
+          <a:fontRef idx="minor">
+            <a:schemeClr val="dk1"/>
+          </a:fontRef>
+        </p:style>
+        <p:txBody>
+          <a:bodyPr wrap="square" rtlCol="0">
+            <a:spAutoFit/>
+          </a:bodyPr>
+          <a:lstStyle/>
+          <a:p>
+            <a:r>
+              <a:rPr lang="en-US"/>
+              <a:t>Pre-trained word embeddings </a:t>
+            </a:r>
+            <a:r>
+              <a:rPr lang="en-US">
+                <a:sym typeface="Wingdings" pitchFamily="2" charset="2"/>
+              </a:rPr>
+              <a:t> </a:t>
+            </a:r>
+            <a:r>
+              <a:rPr lang="en-US"/>
+              <a:t>Skip-gram around the target word</a:t>
+            </a:r>
+          </a:p>
+        </p:txBody>
+      </p:sp>
+      <p:cxnSp>
+        <p:nvCxnSpPr>
+          <p:cNvPr id="24" name="Straight Arrow Connector 23">
+            <a:extLst>
+              <a:ext uri="{FF2B5EF4-FFF2-40B4-BE49-F238E27FC236}">
+                <a16:creationId xmlns:a16="http://schemas.microsoft.com/office/drawing/2014/main" id="{D04106F5-19FC-CC46-8FF2-2BF4F365B0C0}"/>
+              </a:ext>
+            </a:extLst>
+          </p:cNvPr>
+          <p:cNvCxnSpPr>
+            <a:cxnSpLocks/>
+            <a:stCxn id="23" idx="0"/>
+          </p:cNvCxnSpPr>
+          <p:nvPr/>
+        </p:nvCxnSpPr>
+        <p:spPr>
+          <a:xfrm flipV="1">
+            <a:off x="2123302" y="5082745"/>
+            <a:ext cx="0" cy="405712"/>
+          </a:xfrm>
+          <a:prstGeom prst="straightConnector1">
+            <a:avLst/>
+          </a:prstGeom>
+          <a:ln>
+            <a:tailEnd type="triangle"/>
+          </a:ln>
+        </p:spPr>
+        <p:style>
+          <a:lnRef idx="1">
+            <a:schemeClr val="accent1"/>
+          </a:lnRef>
+          <a:fillRef idx="0">
+            <a:schemeClr val="accent1"/>
+          </a:fillRef>
+          <a:effectRef idx="0">
+            <a:schemeClr val="accent1"/>
+          </a:effectRef>
+          <a:fontRef idx="minor">
+            <a:schemeClr val="tx1"/>
+          </a:fontRef>
+        </p:style>
+      </p:cxnSp>
+      <p:cxnSp>
+        <p:nvCxnSpPr>
+          <p:cNvPr id="32" name="Straight Arrow Connector 31">
+            <a:extLst>
+              <a:ext uri="{FF2B5EF4-FFF2-40B4-BE49-F238E27FC236}">
+                <a16:creationId xmlns:a16="http://schemas.microsoft.com/office/drawing/2014/main" id="{DF6359E9-38C6-B644-89A6-41E406FA1CDD}"/>
+              </a:ext>
+            </a:extLst>
+          </p:cNvPr>
+          <p:cNvCxnSpPr>
+            <a:cxnSpLocks/>
+            <a:stCxn id="4" idx="2"/>
+            <a:endCxn id="22" idx="0"/>
+          </p:cNvCxnSpPr>
+          <p:nvPr/>
+        </p:nvCxnSpPr>
+        <p:spPr>
+          <a:xfrm flipH="1">
+            <a:off x="3270835" y="3144795"/>
+            <a:ext cx="1465922" cy="1064884"/>
+          </a:xfrm>
+          <a:prstGeom prst="straightConnector1">
+            <a:avLst/>
+          </a:prstGeom>
+          <a:ln>
+            <a:tailEnd type="triangle"/>
+          </a:ln>
+        </p:spPr>
+        <p:style>
+          <a:lnRef idx="1">
+            <a:schemeClr val="accent1"/>
+          </a:lnRef>
+          <a:fillRef idx="0">
+            <a:schemeClr val="accent1"/>
+          </a:fillRef>
+          <a:effectRef idx="0">
+            <a:schemeClr val="accent1"/>
+          </a:effectRef>
+          <a:fontRef idx="minor">
+            <a:schemeClr val="tx1"/>
+          </a:fontRef>
+        </p:style>
+      </p:cxnSp>
+      <p:sp>
+        <p:nvSpPr>
+          <p:cNvPr id="35" name="Diamond 34">
+            <a:extLst>
+              <a:ext uri="{FF2B5EF4-FFF2-40B4-BE49-F238E27FC236}">
+                <a16:creationId xmlns:a16="http://schemas.microsoft.com/office/drawing/2014/main" id="{9F7190C9-02EF-2A43-B0C4-837BF16A9D0C}"/>
               </a:ext>
             </a:extLst>
           </p:cNvPr>
@@ -3860,12 +4004,15 @@
         </p:nvSpPr>
         <p:spPr>
           <a:xfrm>
-            <a:off x="1223319" y="3297080"/>
-            <a:ext cx="1799966" cy="717721"/>
-          </a:xfrm>
-          <a:prstGeom prst="snip2DiagRect">
+            <a:off x="4180705" y="5122278"/>
+            <a:ext cx="1272745" cy="1230816"/>
+          </a:xfrm>
+          <a:prstGeom prst="diamond">
             <a:avLst/>
           </a:prstGeom>
+          <a:solidFill>
+            <a:schemeClr val="bg1"/>
+          </a:solidFill>
         </p:spPr>
         <p:style>
           <a:lnRef idx="2">
@@ -3888,9 +4035,1189 @@
           <a:lstStyle/>
           <a:p>
             <a:pPr algn="ctr"/>
+            <a:endParaRPr lang="en-US"/>
+          </a:p>
+        </p:txBody>
+      </p:sp>
+      <p:sp>
+        <p:nvSpPr>
+          <p:cNvPr id="36" name="TextBox 35">
+            <a:extLst>
+              <a:ext uri="{FF2B5EF4-FFF2-40B4-BE49-F238E27FC236}">
+                <a16:creationId xmlns:a16="http://schemas.microsoft.com/office/drawing/2014/main" id="{5331301B-8679-7946-93C4-FD40CB168C4E}"/>
+              </a:ext>
+            </a:extLst>
+          </p:cNvPr>
+          <p:cNvSpPr txBox="1"/>
+          <p:nvPr/>
+        </p:nvSpPr>
+        <p:spPr>
+          <a:xfrm>
+            <a:off x="3822355" y="5007514"/>
+            <a:ext cx="2228336" cy="1477328"/>
+          </a:xfrm>
+          <a:prstGeom prst="rect">
+            <a:avLst/>
+          </a:prstGeom>
+          <a:noFill/>
+        </p:spPr>
+        <p:txBody>
+          <a:bodyPr wrap="square" rtlCol="0">
+            <a:spAutoFit/>
+          </a:bodyPr>
+          <a:lstStyle/>
+          <a:p>
             <a:r>
               <a:rPr lang="en-US"/>
-              <a:t>Example 2: wide</a:t>
+              <a:t>Alternatives: Word2Vec / LSTMs / TXL on small corpus, </a:t>
+            </a:r>
+            <a:br>
+              <a:rPr lang="en-US"/>
+            </a:br>
+            <a:r>
+              <a:rPr lang="en-US"/>
+              <a:t>or bootstrap from examples</a:t>
+            </a:r>
+          </a:p>
+        </p:txBody>
+      </p:sp>
+      <p:sp>
+        <p:nvSpPr>
+          <p:cNvPr id="38" name="Oval 37">
+            <a:extLst>
+              <a:ext uri="{FF2B5EF4-FFF2-40B4-BE49-F238E27FC236}">
+                <a16:creationId xmlns:a16="http://schemas.microsoft.com/office/drawing/2014/main" id="{E3B4A9C1-616D-8E44-98AF-3256821C1CDC}"/>
+              </a:ext>
+            </a:extLst>
+          </p:cNvPr>
+          <p:cNvSpPr/>
+          <p:nvPr/>
+        </p:nvSpPr>
+        <p:spPr>
+          <a:xfrm>
+            <a:off x="9168715" y="441776"/>
+            <a:ext cx="1295001" cy="1290882"/>
+          </a:xfrm>
+          <a:prstGeom prst="ellipse">
+            <a:avLst/>
+          </a:prstGeom>
+        </p:spPr>
+        <p:style>
+          <a:lnRef idx="2">
+            <a:schemeClr val="accent1">
+              <a:shade val="50000"/>
+            </a:schemeClr>
+          </a:lnRef>
+          <a:fillRef idx="1">
+            <a:schemeClr val="accent1"/>
+          </a:fillRef>
+          <a:effectRef idx="0">
+            <a:schemeClr val="accent1"/>
+          </a:effectRef>
+          <a:fontRef idx="minor">
+            <a:schemeClr val="lt1"/>
+          </a:fontRef>
+        </p:style>
+        <p:txBody>
+          <a:bodyPr rtlCol="0" anchor="ctr"/>
+          <a:lstStyle/>
+          <a:p>
+            <a:pPr algn="ctr"/>
+            <a:r>
+              <a:rPr lang="en-US"/>
+              <a:t>narrow</a:t>
+            </a:r>
+          </a:p>
+        </p:txBody>
+      </p:sp>
+      <p:sp>
+        <p:nvSpPr>
+          <p:cNvPr id="39" name="Oval 38">
+            <a:extLst>
+              <a:ext uri="{FF2B5EF4-FFF2-40B4-BE49-F238E27FC236}">
+                <a16:creationId xmlns:a16="http://schemas.microsoft.com/office/drawing/2014/main" id="{74036C56-D38F-4B41-BD13-C47BFC1D8C46}"/>
+              </a:ext>
+            </a:extLst>
+          </p:cNvPr>
+          <p:cNvSpPr/>
+          <p:nvPr/>
+        </p:nvSpPr>
+        <p:spPr>
+          <a:xfrm>
+            <a:off x="1346454" y="1451310"/>
+            <a:ext cx="1295001" cy="1290882"/>
+          </a:xfrm>
+          <a:prstGeom prst="ellipse">
+            <a:avLst/>
+          </a:prstGeom>
+        </p:spPr>
+        <p:style>
+          <a:lnRef idx="2">
+            <a:schemeClr val="accent1">
+              <a:shade val="50000"/>
+            </a:schemeClr>
+          </a:lnRef>
+          <a:fillRef idx="1">
+            <a:schemeClr val="accent1"/>
+          </a:fillRef>
+          <a:effectRef idx="0">
+            <a:schemeClr val="accent1"/>
+          </a:effectRef>
+          <a:fontRef idx="minor">
+            <a:schemeClr val="lt1"/>
+          </a:fontRef>
+        </p:style>
+        <p:txBody>
+          <a:bodyPr rtlCol="0" anchor="ctr"/>
+          <a:lstStyle/>
+          <a:p>
+            <a:pPr algn="ctr"/>
+            <a:r>
+              <a:rPr lang="en-US"/>
+              <a:t>broad</a:t>
+            </a:r>
+          </a:p>
+        </p:txBody>
+      </p:sp>
+      <p:cxnSp>
+        <p:nvCxnSpPr>
+          <p:cNvPr id="42" name="Straight Arrow Connector 41">
+            <a:extLst>
+              <a:ext uri="{FF2B5EF4-FFF2-40B4-BE49-F238E27FC236}">
+                <a16:creationId xmlns:a16="http://schemas.microsoft.com/office/drawing/2014/main" id="{DE3FC234-0BEC-3F42-A6F0-885C42710CBC}"/>
+              </a:ext>
+            </a:extLst>
+          </p:cNvPr>
+          <p:cNvCxnSpPr>
+            <a:cxnSpLocks/>
+            <a:stCxn id="38" idx="2"/>
+            <a:endCxn id="4" idx="7"/>
+          </p:cNvCxnSpPr>
+          <p:nvPr/>
+        </p:nvCxnSpPr>
+        <p:spPr>
+          <a:xfrm flipH="1">
+            <a:off x="5970773" y="1087217"/>
+            <a:ext cx="3197942" cy="1546431"/>
+          </a:xfrm>
+          <a:prstGeom prst="straightConnector1">
+            <a:avLst/>
+          </a:prstGeom>
+          <a:ln>
+            <a:tailEnd type="triangle"/>
+          </a:ln>
+        </p:spPr>
+        <p:style>
+          <a:lnRef idx="2">
+            <a:schemeClr val="accent2"/>
+          </a:lnRef>
+          <a:fillRef idx="0">
+            <a:schemeClr val="accent2"/>
+          </a:fillRef>
+          <a:effectRef idx="1">
+            <a:schemeClr val="accent2"/>
+          </a:effectRef>
+          <a:fontRef idx="minor">
+            <a:schemeClr val="tx1"/>
+          </a:fontRef>
+        </p:style>
+      </p:cxnSp>
+      <p:cxnSp>
+        <p:nvCxnSpPr>
+          <p:cNvPr id="45" name="Straight Arrow Connector 44">
+            <a:extLst>
+              <a:ext uri="{FF2B5EF4-FFF2-40B4-BE49-F238E27FC236}">
+                <a16:creationId xmlns:a16="http://schemas.microsoft.com/office/drawing/2014/main" id="{1DA91269-9A4C-4D49-83D9-7AE388C6966A}"/>
+              </a:ext>
+            </a:extLst>
+          </p:cNvPr>
+          <p:cNvCxnSpPr>
+            <a:cxnSpLocks/>
+            <a:stCxn id="4" idx="2"/>
+            <a:endCxn id="39" idx="6"/>
+          </p:cNvCxnSpPr>
+          <p:nvPr/>
+        </p:nvCxnSpPr>
+        <p:spPr>
+          <a:xfrm flipH="1" flipV="1">
+            <a:off x="2641455" y="2096751"/>
+            <a:ext cx="2095302" cy="1048044"/>
+          </a:xfrm>
+          <a:prstGeom prst="straightConnector1">
+            <a:avLst/>
+          </a:prstGeom>
+          <a:ln>
+            <a:tailEnd type="triangle"/>
+          </a:ln>
+        </p:spPr>
+        <p:style>
+          <a:lnRef idx="1">
+            <a:schemeClr val="accent6"/>
+          </a:lnRef>
+          <a:fillRef idx="0">
+            <a:schemeClr val="accent6"/>
+          </a:fillRef>
+          <a:effectRef idx="0">
+            <a:schemeClr val="accent6"/>
+          </a:effectRef>
+          <a:fontRef idx="minor">
+            <a:schemeClr val="tx1"/>
+          </a:fontRef>
+        </p:style>
+      </p:cxnSp>
+      <p:sp>
+        <p:nvSpPr>
+          <p:cNvPr id="48" name="TextBox 47">
+            <a:extLst>
+              <a:ext uri="{FF2B5EF4-FFF2-40B4-BE49-F238E27FC236}">
+                <a16:creationId xmlns:a16="http://schemas.microsoft.com/office/drawing/2014/main" id="{43891F1F-8BBE-5D44-AD17-3B88A25F29FD}"/>
+              </a:ext>
+            </a:extLst>
+          </p:cNvPr>
+          <p:cNvSpPr txBox="1"/>
+          <p:nvPr/>
+        </p:nvSpPr>
+        <p:spPr>
+          <a:xfrm>
+            <a:off x="9042672" y="5414520"/>
+            <a:ext cx="2228336" cy="646331"/>
+          </a:xfrm>
+          <a:prstGeom prst="rect">
+            <a:avLst/>
+          </a:prstGeom>
+          <a:noFill/>
+        </p:spPr>
+        <p:txBody>
+          <a:bodyPr wrap="square" rtlCol="0">
+            <a:spAutoFit/>
+          </a:bodyPr>
+          <a:lstStyle/>
+          <a:p>
+            <a:r>
+              <a:rPr lang="en-US"/>
+              <a:t>Alternatives: GloVe, Doc2Vec</a:t>
+            </a:r>
+          </a:p>
+        </p:txBody>
+      </p:sp>
+      <p:sp>
+        <p:nvSpPr>
+          <p:cNvPr id="53" name="Rectangle 52">
+            <a:extLst>
+              <a:ext uri="{FF2B5EF4-FFF2-40B4-BE49-F238E27FC236}">
+                <a16:creationId xmlns:a16="http://schemas.microsoft.com/office/drawing/2014/main" id="{D88E4017-3140-CC4E-92AF-7DACB95B0721}"/>
+              </a:ext>
+            </a:extLst>
+          </p:cNvPr>
+          <p:cNvSpPr/>
+          <p:nvPr/>
+        </p:nvSpPr>
+        <p:spPr>
+          <a:xfrm>
+            <a:off x="6855111" y="1598360"/>
+            <a:ext cx="1100385" cy="389847"/>
+          </a:xfrm>
+          <a:prstGeom prst="rect">
+            <a:avLst/>
+          </a:prstGeom>
+        </p:spPr>
+        <p:style>
+          <a:lnRef idx="2">
+            <a:schemeClr val="accent4">
+              <a:shade val="50000"/>
+            </a:schemeClr>
+          </a:lnRef>
+          <a:fillRef idx="1">
+            <a:schemeClr val="accent4"/>
+          </a:fillRef>
+          <a:effectRef idx="0">
+            <a:schemeClr val="accent4"/>
+          </a:effectRef>
+          <a:fontRef idx="minor">
+            <a:schemeClr val="lt1"/>
+          </a:fontRef>
+        </p:style>
+        <p:txBody>
+          <a:bodyPr rtlCol="0" anchor="ctr"/>
+          <a:lstStyle/>
+          <a:p>
+            <a:pPr algn="ctr"/>
+            <a:r>
+              <a:rPr lang="en-US"/>
+              <a:t>antonym</a:t>
+            </a:r>
+          </a:p>
+        </p:txBody>
+      </p:sp>
+      <p:sp>
+        <p:nvSpPr>
+          <p:cNvPr id="54" name="Rectangle 53">
+            <a:extLst>
+              <a:ext uri="{FF2B5EF4-FFF2-40B4-BE49-F238E27FC236}">
+                <a16:creationId xmlns:a16="http://schemas.microsoft.com/office/drawing/2014/main" id="{319BDFE2-154E-834A-9391-346D60E35815}"/>
+              </a:ext>
+            </a:extLst>
+          </p:cNvPr>
+          <p:cNvSpPr/>
+          <p:nvPr/>
+        </p:nvSpPr>
+        <p:spPr>
+          <a:xfrm>
+            <a:off x="3089573" y="2328233"/>
+            <a:ext cx="1148348" cy="389847"/>
+          </a:xfrm>
+          <a:prstGeom prst="rect">
+            <a:avLst/>
+          </a:prstGeom>
+        </p:spPr>
+        <p:style>
+          <a:lnRef idx="2">
+            <a:schemeClr val="accent4">
+              <a:shade val="50000"/>
+            </a:schemeClr>
+          </a:lnRef>
+          <a:fillRef idx="1">
+            <a:schemeClr val="accent4"/>
+          </a:fillRef>
+          <a:effectRef idx="0">
+            <a:schemeClr val="accent4"/>
+          </a:effectRef>
+          <a:fontRef idx="minor">
+            <a:schemeClr val="lt1"/>
+          </a:fontRef>
+        </p:style>
+        <p:txBody>
+          <a:bodyPr rtlCol="0" anchor="ctr"/>
+          <a:lstStyle/>
+          <a:p>
+            <a:pPr algn="ctr"/>
+            <a:r>
+              <a:rPr lang="en-US"/>
+              <a:t>synonym</a:t>
+            </a:r>
+          </a:p>
+        </p:txBody>
+      </p:sp>
+      <p:sp>
+        <p:nvSpPr>
+          <p:cNvPr id="55" name="Rectangle 54">
+            <a:extLst>
+              <a:ext uri="{FF2B5EF4-FFF2-40B4-BE49-F238E27FC236}">
+                <a16:creationId xmlns:a16="http://schemas.microsoft.com/office/drawing/2014/main" id="{6DAEB3F0-78B5-024D-994E-0A9E9338B445}"/>
+              </a:ext>
+            </a:extLst>
+          </p:cNvPr>
+          <p:cNvSpPr/>
+          <p:nvPr/>
+        </p:nvSpPr>
+        <p:spPr>
+          <a:xfrm>
+            <a:off x="3497584" y="3498656"/>
+            <a:ext cx="1012424" cy="389847"/>
+          </a:xfrm>
+          <a:prstGeom prst="rect">
+            <a:avLst/>
+          </a:prstGeom>
+        </p:spPr>
+        <p:style>
+          <a:lnRef idx="2">
+            <a:schemeClr val="accent4">
+              <a:shade val="50000"/>
+            </a:schemeClr>
+          </a:lnRef>
+          <a:fillRef idx="1">
+            <a:schemeClr val="accent4"/>
+          </a:fillRef>
+          <a:effectRef idx="0">
+            <a:schemeClr val="accent4"/>
+          </a:effectRef>
+          <a:fontRef idx="minor">
+            <a:schemeClr val="lt1"/>
+          </a:fontRef>
+        </p:style>
+        <p:txBody>
+          <a:bodyPr rtlCol="0" anchor="ctr"/>
+          <a:lstStyle/>
+          <a:p>
+            <a:pPr algn="ctr"/>
+            <a:r>
+              <a:rPr lang="en-US"/>
+              <a:t>example</a:t>
+            </a:r>
+          </a:p>
+        </p:txBody>
+      </p:sp>
+      <p:sp>
+        <p:nvSpPr>
+          <p:cNvPr id="57" name="Rectangle 56">
+            <a:extLst>
+              <a:ext uri="{FF2B5EF4-FFF2-40B4-BE49-F238E27FC236}">
+                <a16:creationId xmlns:a16="http://schemas.microsoft.com/office/drawing/2014/main" id="{C72DCF29-0765-C142-A170-220F3DEF6F65}"/>
+              </a:ext>
+            </a:extLst>
+          </p:cNvPr>
+          <p:cNvSpPr/>
+          <p:nvPr/>
+        </p:nvSpPr>
+        <p:spPr>
+          <a:xfrm>
+            <a:off x="6416045" y="3130195"/>
+            <a:ext cx="1153698" cy="389847"/>
+          </a:xfrm>
+          <a:prstGeom prst="rect">
+            <a:avLst/>
+          </a:prstGeom>
+        </p:spPr>
+        <p:style>
+          <a:lnRef idx="2">
+            <a:schemeClr val="accent4">
+              <a:shade val="50000"/>
+            </a:schemeClr>
+          </a:lnRef>
+          <a:fillRef idx="1">
+            <a:schemeClr val="accent4"/>
+          </a:fillRef>
+          <a:effectRef idx="0">
+            <a:schemeClr val="accent4"/>
+          </a:effectRef>
+          <a:fontRef idx="minor">
+            <a:schemeClr val="lt1"/>
+          </a:fontRef>
+        </p:style>
+        <p:txBody>
+          <a:bodyPr rtlCol="0" anchor="ctr"/>
+          <a:lstStyle/>
+          <a:p>
+            <a:pPr algn="ctr"/>
+            <a:r>
+              <a:rPr lang="en-US"/>
+              <a:t>Definition</a:t>
+            </a:r>
+          </a:p>
+        </p:txBody>
+      </p:sp>
+      <p:sp>
+        <p:nvSpPr>
+          <p:cNvPr id="58" name="Rectangle 57">
+            <a:extLst>
+              <a:ext uri="{FF2B5EF4-FFF2-40B4-BE49-F238E27FC236}">
+                <a16:creationId xmlns:a16="http://schemas.microsoft.com/office/drawing/2014/main" id="{B31028EA-5D98-504B-B898-1B86A75267CD}"/>
+              </a:ext>
+            </a:extLst>
+          </p:cNvPr>
+          <p:cNvSpPr/>
+          <p:nvPr/>
+        </p:nvSpPr>
+        <p:spPr>
+          <a:xfrm>
+            <a:off x="5970774" y="3813482"/>
+            <a:ext cx="1234016" cy="424281"/>
+          </a:xfrm>
+          <a:prstGeom prst="rect">
+            <a:avLst/>
+          </a:prstGeom>
+        </p:spPr>
+        <p:style>
+          <a:lnRef idx="2">
+            <a:schemeClr val="accent4">
+              <a:shade val="50000"/>
+            </a:schemeClr>
+          </a:lnRef>
+          <a:fillRef idx="1">
+            <a:schemeClr val="accent4"/>
+          </a:fillRef>
+          <a:effectRef idx="0">
+            <a:schemeClr val="accent4"/>
+          </a:effectRef>
+          <a:fontRef idx="minor">
+            <a:schemeClr val="lt1"/>
+          </a:fontRef>
+        </p:style>
+        <p:txBody>
+          <a:bodyPr rtlCol="0" anchor="ctr"/>
+          <a:lstStyle/>
+          <a:p>
+            <a:pPr algn="ctr"/>
+            <a:r>
+              <a:rPr lang="en-US"/>
+              <a:t>Definition</a:t>
+            </a:r>
+          </a:p>
+        </p:txBody>
+      </p:sp>
+      <p:sp>
+        <p:nvSpPr>
+          <p:cNvPr id="59" name="Rectangle 58">
+            <a:extLst>
+              <a:ext uri="{FF2B5EF4-FFF2-40B4-BE49-F238E27FC236}">
+                <a16:creationId xmlns:a16="http://schemas.microsoft.com/office/drawing/2014/main" id="{B855F05C-DE03-3B4A-AADF-E1D6D31854A2}"/>
+              </a:ext>
+            </a:extLst>
+          </p:cNvPr>
+          <p:cNvSpPr/>
+          <p:nvPr/>
+        </p:nvSpPr>
+        <p:spPr>
+          <a:xfrm>
+            <a:off x="3603856" y="1727598"/>
+            <a:ext cx="1153698" cy="389847"/>
+          </a:xfrm>
+          <a:prstGeom prst="rect">
+            <a:avLst/>
+          </a:prstGeom>
+        </p:spPr>
+        <p:style>
+          <a:lnRef idx="2">
+            <a:schemeClr val="accent4">
+              <a:shade val="50000"/>
+            </a:schemeClr>
+          </a:lnRef>
+          <a:fillRef idx="1">
+            <a:schemeClr val="accent4"/>
+          </a:fillRef>
+          <a:effectRef idx="0">
+            <a:schemeClr val="accent4"/>
+          </a:effectRef>
+          <a:fontRef idx="minor">
+            <a:schemeClr val="lt1"/>
+          </a:fontRef>
+        </p:style>
+        <p:txBody>
+          <a:bodyPr rtlCol="0" anchor="ctr"/>
+          <a:lstStyle/>
+          <a:p>
+            <a:pPr algn="ctr"/>
+            <a:r>
+              <a:rPr lang="en-US"/>
+              <a:t>Definition</a:t>
+            </a:r>
+          </a:p>
+        </p:txBody>
+      </p:sp>
+    </p:spTree>
+    <p:extLst>
+      <p:ext uri="{BB962C8B-B14F-4D97-AF65-F5344CB8AC3E}">
+        <p14:creationId xmlns:p14="http://schemas.microsoft.com/office/powerpoint/2010/main" val="346262446"/>
+      </p:ext>
+    </p:extLst>
+  </p:cSld>
+  <p:clrMapOvr>
+    <a:masterClrMapping/>
+  </p:clrMapOvr>
+</p:sld>
+</file>
+
+<file path=ppt/slides/slide2.xml><?xml version="1.0" encoding="utf-8"?>
+<p:sld xmlns:a="http://schemas.openxmlformats.org/drawingml/2006/main" xmlns:r="http://schemas.openxmlformats.org/officeDocument/2006/relationships" xmlns:p="http://schemas.openxmlformats.org/presentationml/2006/main">
+  <p:cSld>
+    <p:spTree>
+      <p:nvGrpSpPr>
+        <p:cNvPr id="1" name=""/>
+        <p:cNvGrpSpPr/>
+        <p:nvPr/>
+      </p:nvGrpSpPr>
+      <p:grpSpPr>
+        <a:xfrm>
+          <a:off x="0" y="0"/>
+          <a:ext cx="0" cy="0"/>
+          <a:chOff x="0" y="0"/>
+          <a:chExt cx="0" cy="0"/>
+        </a:xfrm>
+      </p:grpSpPr>
+      <p:sp>
+        <p:nvSpPr>
+          <p:cNvPr id="49" name="Diamond 48">
+            <a:extLst>
+              <a:ext uri="{FF2B5EF4-FFF2-40B4-BE49-F238E27FC236}">
+                <a16:creationId xmlns:a16="http://schemas.microsoft.com/office/drawing/2014/main" id="{3666EEA0-D81E-E94F-9683-401488F50E6B}"/>
+              </a:ext>
+            </a:extLst>
+          </p:cNvPr>
+          <p:cNvSpPr/>
+          <p:nvPr/>
+        </p:nvSpPr>
+        <p:spPr>
+          <a:xfrm>
+            <a:off x="9432325" y="5206001"/>
+            <a:ext cx="1272745" cy="1230816"/>
+          </a:xfrm>
+          <a:prstGeom prst="diamond">
+            <a:avLst/>
+          </a:prstGeom>
+          <a:solidFill>
+            <a:schemeClr val="bg1"/>
+          </a:solidFill>
+        </p:spPr>
+        <p:style>
+          <a:lnRef idx="2">
+            <a:schemeClr val="accent1">
+              <a:shade val="50000"/>
+            </a:schemeClr>
+          </a:lnRef>
+          <a:fillRef idx="1">
+            <a:schemeClr val="accent1"/>
+          </a:fillRef>
+          <a:effectRef idx="0">
+            <a:schemeClr val="accent1"/>
+          </a:effectRef>
+          <a:fontRef idx="minor">
+            <a:schemeClr val="lt1"/>
+          </a:fontRef>
+        </p:style>
+        <p:txBody>
+          <a:bodyPr rtlCol="0" anchor="ctr"/>
+          <a:lstStyle/>
+          <a:p>
+            <a:pPr algn="ctr"/>
+            <a:endParaRPr lang="en-US"/>
+          </a:p>
+        </p:txBody>
+      </p:sp>
+      <p:sp>
+        <p:nvSpPr>
+          <p:cNvPr id="4" name="Oval 3">
+            <a:extLst>
+              <a:ext uri="{FF2B5EF4-FFF2-40B4-BE49-F238E27FC236}">
+                <a16:creationId xmlns:a16="http://schemas.microsoft.com/office/drawing/2014/main" id="{D43BD5E3-D73C-D54F-93B0-944915FC767C}"/>
+              </a:ext>
+            </a:extLst>
+          </p:cNvPr>
+          <p:cNvSpPr/>
+          <p:nvPr/>
+        </p:nvSpPr>
+        <p:spPr>
+          <a:xfrm>
+            <a:off x="4736757" y="2421924"/>
+            <a:ext cx="1445740" cy="1445741"/>
+          </a:xfrm>
+          <a:prstGeom prst="ellipse">
+            <a:avLst/>
+          </a:prstGeom>
+        </p:spPr>
+        <p:style>
+          <a:lnRef idx="2">
+            <a:schemeClr val="accent1">
+              <a:shade val="50000"/>
+            </a:schemeClr>
+          </a:lnRef>
+          <a:fillRef idx="1">
+            <a:schemeClr val="accent1"/>
+          </a:fillRef>
+          <a:effectRef idx="0">
+            <a:schemeClr val="accent1"/>
+          </a:effectRef>
+          <a:fontRef idx="minor">
+            <a:schemeClr val="lt1"/>
+          </a:fontRef>
+        </p:style>
+        <p:txBody>
+          <a:bodyPr rtlCol="0" anchor="ctr"/>
+          <a:lstStyle/>
+          <a:p>
+            <a:pPr algn="ctr"/>
+            <a:r>
+              <a:rPr lang="en-US"/>
+              <a:t>wide</a:t>
+            </a:r>
+          </a:p>
+        </p:txBody>
+      </p:sp>
+      <p:sp>
+        <p:nvSpPr>
+          <p:cNvPr id="5" name="Rectangle 4">
+            <a:extLst>
+              <a:ext uri="{FF2B5EF4-FFF2-40B4-BE49-F238E27FC236}">
+                <a16:creationId xmlns:a16="http://schemas.microsoft.com/office/drawing/2014/main" id="{1F12ABAB-49CD-E041-B703-3599C5761A5E}"/>
+              </a:ext>
+            </a:extLst>
+          </p:cNvPr>
+          <p:cNvSpPr/>
+          <p:nvPr/>
+        </p:nvSpPr>
+        <p:spPr>
+          <a:xfrm>
+            <a:off x="7760043" y="3429000"/>
+            <a:ext cx="1260389" cy="624016"/>
+          </a:xfrm>
+          <a:prstGeom prst="rect">
+            <a:avLst/>
+          </a:prstGeom>
+        </p:spPr>
+        <p:style>
+          <a:lnRef idx="2">
+            <a:schemeClr val="accent1">
+              <a:shade val="50000"/>
+            </a:schemeClr>
+          </a:lnRef>
+          <a:fillRef idx="1">
+            <a:schemeClr val="accent1"/>
+          </a:fillRef>
+          <a:effectRef idx="0">
+            <a:schemeClr val="accent1"/>
+          </a:effectRef>
+          <a:fontRef idx="minor">
+            <a:schemeClr val="lt1"/>
+          </a:fontRef>
+        </p:style>
+        <p:txBody>
+          <a:bodyPr rtlCol="0" anchor="ctr"/>
+          <a:lstStyle/>
+          <a:p>
+            <a:pPr algn="ctr"/>
+            <a:r>
+              <a:rPr lang="en-US"/>
+              <a:t>Definition:Wide</a:t>
+            </a:r>
+          </a:p>
+        </p:txBody>
+      </p:sp>
+      <p:sp>
+        <p:nvSpPr>
+          <p:cNvPr id="6" name="Rectangle 5">
+            <a:extLst>
+              <a:ext uri="{FF2B5EF4-FFF2-40B4-BE49-F238E27FC236}">
+                <a16:creationId xmlns:a16="http://schemas.microsoft.com/office/drawing/2014/main" id="{C9872CA2-3EC2-734E-A0D3-C89DF3F91027}"/>
+              </a:ext>
+            </a:extLst>
+          </p:cNvPr>
+          <p:cNvSpPr/>
+          <p:nvPr/>
+        </p:nvSpPr>
+        <p:spPr>
+          <a:xfrm>
+            <a:off x="6849761" y="4458729"/>
+            <a:ext cx="1260389" cy="624016"/>
+          </a:xfrm>
+          <a:prstGeom prst="rect">
+            <a:avLst/>
+          </a:prstGeom>
+        </p:spPr>
+        <p:style>
+          <a:lnRef idx="2">
+            <a:schemeClr val="accent1">
+              <a:shade val="50000"/>
+            </a:schemeClr>
+          </a:lnRef>
+          <a:fillRef idx="1">
+            <a:schemeClr val="accent1"/>
+          </a:fillRef>
+          <a:effectRef idx="0">
+            <a:schemeClr val="accent1"/>
+          </a:effectRef>
+          <a:fontRef idx="minor">
+            <a:schemeClr val="lt1"/>
+          </a:fontRef>
+        </p:style>
+        <p:txBody>
+          <a:bodyPr rtlCol="0" anchor="ctr"/>
+          <a:lstStyle/>
+          <a:p>
+            <a:pPr algn="ctr"/>
+            <a:r>
+              <a:rPr lang="en-US"/>
+              <a:t>Definition:Wide</a:t>
+            </a:r>
+          </a:p>
+        </p:txBody>
+      </p:sp>
+      <p:sp>
+        <p:nvSpPr>
+          <p:cNvPr id="7" name="Rectangle 6">
+            <a:extLst>
+              <a:ext uri="{FF2B5EF4-FFF2-40B4-BE49-F238E27FC236}">
+                <a16:creationId xmlns:a16="http://schemas.microsoft.com/office/drawing/2014/main" id="{5EA6ED24-410A-F945-BADD-C4D4048C81CF}"/>
+              </a:ext>
+            </a:extLst>
+          </p:cNvPr>
+          <p:cNvSpPr/>
+          <p:nvPr/>
+        </p:nvSpPr>
+        <p:spPr>
+          <a:xfrm>
+            <a:off x="3023285" y="718750"/>
+            <a:ext cx="1260389" cy="624016"/>
+          </a:xfrm>
+          <a:prstGeom prst="rect">
+            <a:avLst/>
+          </a:prstGeom>
+        </p:spPr>
+        <p:style>
+          <a:lnRef idx="2">
+            <a:schemeClr val="accent1">
+              <a:shade val="50000"/>
+            </a:schemeClr>
+          </a:lnRef>
+          <a:fillRef idx="1">
+            <a:schemeClr val="accent1"/>
+          </a:fillRef>
+          <a:effectRef idx="0">
+            <a:schemeClr val="accent1"/>
+          </a:effectRef>
+          <a:fontRef idx="minor">
+            <a:schemeClr val="lt1"/>
+          </a:fontRef>
+        </p:style>
+        <p:txBody>
+          <a:bodyPr rtlCol="0" anchor="ctr"/>
+          <a:lstStyle/>
+          <a:p>
+            <a:pPr algn="ctr"/>
+            <a:r>
+              <a:rPr lang="en-US"/>
+              <a:t>Definition:Wide</a:t>
+            </a:r>
+          </a:p>
+        </p:txBody>
+      </p:sp>
+      <p:cxnSp>
+        <p:nvCxnSpPr>
+          <p:cNvPr id="9" name="Straight Arrow Connector 8">
+            <a:extLst>
+              <a:ext uri="{FF2B5EF4-FFF2-40B4-BE49-F238E27FC236}">
+                <a16:creationId xmlns:a16="http://schemas.microsoft.com/office/drawing/2014/main" id="{585BE030-C2A3-8C40-8A91-F1E4E7FEBC36}"/>
+              </a:ext>
+            </a:extLst>
+          </p:cNvPr>
+          <p:cNvCxnSpPr>
+            <a:cxnSpLocks/>
+            <a:stCxn id="4" idx="1"/>
+            <a:endCxn id="7" idx="2"/>
+          </p:cNvCxnSpPr>
+          <p:nvPr/>
+        </p:nvCxnSpPr>
+        <p:spPr>
+          <a:xfrm flipH="1" flipV="1">
+            <a:off x="3653480" y="1342766"/>
+            <a:ext cx="1295001" cy="1290882"/>
+          </a:xfrm>
+          <a:prstGeom prst="straightConnector1">
+            <a:avLst/>
+          </a:prstGeom>
+          <a:ln>
+            <a:tailEnd type="triangle"/>
+          </a:ln>
+        </p:spPr>
+        <p:style>
+          <a:lnRef idx="2">
+            <a:schemeClr val="dk1"/>
+          </a:lnRef>
+          <a:fillRef idx="0">
+            <a:schemeClr val="dk1"/>
+          </a:fillRef>
+          <a:effectRef idx="1">
+            <a:schemeClr val="dk1"/>
+          </a:effectRef>
+          <a:fontRef idx="minor">
+            <a:schemeClr val="tx1"/>
+          </a:fontRef>
+        </p:style>
+      </p:cxnSp>
+      <p:cxnSp>
+        <p:nvCxnSpPr>
+          <p:cNvPr id="10" name="Straight Arrow Connector 9">
+            <a:extLst>
+              <a:ext uri="{FF2B5EF4-FFF2-40B4-BE49-F238E27FC236}">
+                <a16:creationId xmlns:a16="http://schemas.microsoft.com/office/drawing/2014/main" id="{16468C25-7DE7-6540-B5A8-D7970B6D391A}"/>
+              </a:ext>
+            </a:extLst>
+          </p:cNvPr>
+          <p:cNvCxnSpPr>
+            <a:cxnSpLocks/>
+            <a:stCxn id="4" idx="6"/>
+            <a:endCxn id="5" idx="1"/>
+          </p:cNvCxnSpPr>
+          <p:nvPr/>
+        </p:nvCxnSpPr>
+        <p:spPr>
+          <a:xfrm>
+            <a:off x="6182497" y="3144795"/>
+            <a:ext cx="1577546" cy="596213"/>
+          </a:xfrm>
+          <a:prstGeom prst="straightConnector1">
+            <a:avLst/>
+          </a:prstGeom>
+          <a:ln>
+            <a:tailEnd type="triangle"/>
+          </a:ln>
+        </p:spPr>
+        <p:style>
+          <a:lnRef idx="2">
+            <a:schemeClr val="dk1"/>
+          </a:lnRef>
+          <a:fillRef idx="0">
+            <a:schemeClr val="dk1"/>
+          </a:fillRef>
+          <a:effectRef idx="1">
+            <a:schemeClr val="dk1"/>
+          </a:effectRef>
+          <a:fontRef idx="minor">
+            <a:schemeClr val="tx1"/>
+          </a:fontRef>
+        </p:style>
+      </p:cxnSp>
+      <p:cxnSp>
+        <p:nvCxnSpPr>
+          <p:cNvPr id="15" name="Straight Arrow Connector 14">
+            <a:extLst>
+              <a:ext uri="{FF2B5EF4-FFF2-40B4-BE49-F238E27FC236}">
+                <a16:creationId xmlns:a16="http://schemas.microsoft.com/office/drawing/2014/main" id="{2BB32905-A8DF-124F-8511-E19B12A0BDD2}"/>
+              </a:ext>
+            </a:extLst>
+          </p:cNvPr>
+          <p:cNvCxnSpPr>
+            <a:cxnSpLocks/>
+            <a:stCxn id="4" idx="5"/>
+            <a:endCxn id="6" idx="0"/>
+          </p:cNvCxnSpPr>
+          <p:nvPr/>
+        </p:nvCxnSpPr>
+        <p:spPr>
+          <a:xfrm>
+            <a:off x="5970773" y="3655941"/>
+            <a:ext cx="1509183" cy="802788"/>
+          </a:xfrm>
+          <a:prstGeom prst="straightConnector1">
+            <a:avLst/>
+          </a:prstGeom>
+          <a:ln>
+            <a:tailEnd type="triangle"/>
+          </a:ln>
+        </p:spPr>
+        <p:style>
+          <a:lnRef idx="2">
+            <a:schemeClr val="dk1"/>
+          </a:lnRef>
+          <a:fillRef idx="0">
+            <a:schemeClr val="dk1"/>
+          </a:fillRef>
+          <a:effectRef idx="1">
+            <a:schemeClr val="dk1"/>
+          </a:effectRef>
+          <a:fontRef idx="minor">
+            <a:schemeClr val="tx1"/>
+          </a:fontRef>
+        </p:style>
+      </p:cxnSp>
+      <p:sp>
+        <p:nvSpPr>
+          <p:cNvPr id="18" name="TextBox 17">
+            <a:extLst>
+              <a:ext uri="{FF2B5EF4-FFF2-40B4-BE49-F238E27FC236}">
+                <a16:creationId xmlns:a16="http://schemas.microsoft.com/office/drawing/2014/main" id="{6563134B-3F21-A141-943A-092F83D17179}"/>
+              </a:ext>
+            </a:extLst>
+          </p:cNvPr>
+          <p:cNvSpPr txBox="1"/>
+          <p:nvPr/>
+        </p:nvSpPr>
+        <p:spPr>
+          <a:xfrm>
+            <a:off x="6465873" y="5488458"/>
+            <a:ext cx="2295068" cy="1200329"/>
+          </a:xfrm>
+          <a:prstGeom prst="rect">
+            <a:avLst/>
+          </a:prstGeom>
+        </p:spPr>
+        <p:style>
+          <a:lnRef idx="2">
+            <a:schemeClr val="dk1"/>
+          </a:lnRef>
+          <a:fillRef idx="1">
+            <a:schemeClr val="lt1"/>
+          </a:fillRef>
+          <a:effectRef idx="0">
+            <a:schemeClr val="dk1"/>
+          </a:effectRef>
+          <a:fontRef idx="minor">
+            <a:schemeClr val="dk1"/>
+          </a:fontRef>
+        </p:style>
+        <p:txBody>
+          <a:bodyPr wrap="square" rtlCol="0">
+            <a:spAutoFit/>
+          </a:bodyPr>
+          <a:lstStyle/>
+          <a:p>
+            <a:r>
+              <a:rPr lang="en-US"/>
+              <a:t>Pre-trained word embeddings (e.g. Bert) </a:t>
+            </a:r>
+            <a:br>
+              <a:rPr lang="en-US"/>
+            </a:br>
+            <a:r>
+              <a:rPr lang="en-US">
+                <a:sym typeface="Wingdings" pitchFamily="2" charset="2"/>
+              </a:rPr>
+              <a:t> doc2vec</a:t>
+            </a:r>
+            <a:endParaRPr lang="en-US"/>
+          </a:p>
+        </p:txBody>
+      </p:sp>
+      <p:cxnSp>
+        <p:nvCxnSpPr>
+          <p:cNvPr id="20" name="Straight Arrow Connector 19">
+            <a:extLst>
+              <a:ext uri="{FF2B5EF4-FFF2-40B4-BE49-F238E27FC236}">
+                <a16:creationId xmlns:a16="http://schemas.microsoft.com/office/drawing/2014/main" id="{42D94457-2CBE-DB44-A823-51FE646B8F3E}"/>
+              </a:ext>
+            </a:extLst>
+          </p:cNvPr>
+          <p:cNvCxnSpPr>
+            <a:stCxn id="18" idx="0"/>
+            <a:endCxn id="6" idx="2"/>
+          </p:cNvCxnSpPr>
+          <p:nvPr/>
+        </p:nvCxnSpPr>
+        <p:spPr>
+          <a:xfrm flipH="1" flipV="1">
+            <a:off x="7479956" y="5082745"/>
+            <a:ext cx="133451" cy="405713"/>
+          </a:xfrm>
+          <a:prstGeom prst="straightConnector1">
+            <a:avLst/>
+          </a:prstGeom>
+          <a:ln>
+            <a:tailEnd type="triangle"/>
+          </a:ln>
+        </p:spPr>
+        <p:style>
+          <a:lnRef idx="1">
+            <a:schemeClr val="accent1"/>
+          </a:lnRef>
+          <a:fillRef idx="0">
+            <a:schemeClr val="accent1"/>
+          </a:fillRef>
+          <a:effectRef idx="0">
+            <a:schemeClr val="accent1"/>
+          </a:effectRef>
+          <a:fontRef idx="minor">
+            <a:schemeClr val="tx1"/>
+          </a:fontRef>
+        </p:style>
+      </p:cxnSp>
+      <p:sp>
+        <p:nvSpPr>
+          <p:cNvPr id="21" name="Snip Diagonal Corner of Rectangle 20">
+            <a:extLst>
+              <a:ext uri="{FF2B5EF4-FFF2-40B4-BE49-F238E27FC236}">
+                <a16:creationId xmlns:a16="http://schemas.microsoft.com/office/drawing/2014/main" id="{26BE3A8B-6ABD-F746-A2B6-66DF83209434}"/>
+              </a:ext>
+            </a:extLst>
+          </p:cNvPr>
+          <p:cNvSpPr/>
+          <p:nvPr/>
+        </p:nvSpPr>
+        <p:spPr>
+          <a:xfrm>
+            <a:off x="1223319" y="4365024"/>
+            <a:ext cx="1799966" cy="717721"/>
+          </a:xfrm>
+          <a:prstGeom prst="snip2DiagRect">
+            <a:avLst/>
+          </a:prstGeom>
+        </p:spPr>
+        <p:style>
+          <a:lnRef idx="2">
+            <a:schemeClr val="accent1">
+              <a:shade val="50000"/>
+            </a:schemeClr>
+          </a:lnRef>
+          <a:fillRef idx="1">
+            <a:schemeClr val="accent1"/>
+          </a:fillRef>
+          <a:effectRef idx="0">
+            <a:schemeClr val="accent1"/>
+          </a:effectRef>
+          <a:fontRef idx="minor">
+            <a:schemeClr val="lt1"/>
+          </a:fontRef>
+        </p:style>
+        <p:txBody>
+          <a:bodyPr rtlCol="0" anchor="ctr"/>
+          <a:lstStyle/>
+          <a:p>
+            <a:pPr algn="ctr"/>
+            <a:r>
+              <a:rPr lang="en-US"/>
+              <a:t>Example 1:</a:t>
+            </a:r>
+            <a:br>
+              <a:rPr lang="en-US"/>
+            </a:br>
+            <a:r>
+              <a:rPr lang="en-US"/>
+              <a:t> </a:t>
+            </a:r>
+            <a:r>
+              <a:rPr lang="en-US" sz="1200"/>
+              <a:t>“surely shoots wide bow hand”</a:t>
+            </a:r>
+          </a:p>
+        </p:txBody>
+      </p:sp>
+      <p:sp>
+        <p:nvSpPr>
+          <p:cNvPr id="22" name="Snip Diagonal Corner of Rectangle 21">
+            <a:extLst>
+              <a:ext uri="{FF2B5EF4-FFF2-40B4-BE49-F238E27FC236}">
+                <a16:creationId xmlns:a16="http://schemas.microsoft.com/office/drawing/2014/main" id="{03FFFF54-9ACB-C840-8492-CD56692A8258}"/>
+              </a:ext>
+            </a:extLst>
+          </p:cNvPr>
+          <p:cNvSpPr/>
+          <p:nvPr/>
+        </p:nvSpPr>
+        <p:spPr>
+          <a:xfrm>
+            <a:off x="1223319" y="3297080"/>
+            <a:ext cx="1799966" cy="717721"/>
+          </a:xfrm>
+          <a:prstGeom prst="snip2DiagRect">
+            <a:avLst/>
+          </a:prstGeom>
+        </p:spPr>
+        <p:style>
+          <a:lnRef idx="2">
+            <a:schemeClr val="accent1">
+              <a:shade val="50000"/>
+            </a:schemeClr>
+          </a:lnRef>
+          <a:fillRef idx="1">
+            <a:schemeClr val="accent1"/>
+          </a:fillRef>
+          <a:effectRef idx="0">
+            <a:schemeClr val="accent1"/>
+          </a:effectRef>
+          <a:fontRef idx="minor">
+            <a:schemeClr val="lt1"/>
+          </a:fontRef>
+        </p:style>
+        <p:txBody>
+          <a:bodyPr rtlCol="0" anchor="ctr"/>
+          <a:lstStyle/>
+          <a:p>
+            <a:pPr algn="ctr"/>
+            <a:r>
+              <a:rPr lang="en-US"/>
+              <a:t>Example 2: </a:t>
+            </a:r>
+            <a:br>
+              <a:rPr lang="en-US"/>
+            </a:br>
+            <a:r>
+              <a:rPr lang="en-US"/>
+              <a:t>“</a:t>
+            </a:r>
+            <a:r>
+              <a:rPr lang="en-US" sz="1200"/>
+              <a:t>wide plains</a:t>
+            </a:r>
+            <a:r>
+              <a:rPr lang="en-US"/>
+              <a:t>”</a:t>
             </a:r>
           </a:p>
         </p:txBody>

</xml_diff>

<commit_message>
Last snapshot of previous version. About to move on to Multi-Sense LM for Task 1
Former-commit-id: 61061d0659793d12a887e9beaa41f66cc5cf8fea
</commit_message>
<xml_diff>
--- a/Plan_Task1.pptx
+++ b/Plan_Task1.pptx
@@ -5,8 +5,8 @@
     <p:sldMasterId id="2147483648" r:id="rId1"/>
   </p:sldMasterIdLst>
   <p:sldIdLst>
-    <p:sldId id="257" r:id="rId2"/>
-    <p:sldId id="256" r:id="rId3"/>
+    <p:sldId id="256" r:id="rId2"/>
+    <p:sldId id="257" r:id="rId3"/>
   </p:sldIdLst>
   <p:sldSz cx="12192000" cy="6858000"/>
   <p:notesSz cx="6858000" cy="9144000"/>
@@ -261,7 +261,7 @@
           <a:lstStyle/>
           <a:p>
             <a:fld id="{803220A4-8895-6D46-A558-2CE2469121C7}" type="datetimeFigureOut">
-              <a:t>8/27/19</a:t>
+              <a:t>9/2/19</a:t>
             </a:fld>
             <a:endParaRPr lang="en-US"/>
           </a:p>
@@ -459,7 +459,7 @@
           <a:lstStyle/>
           <a:p>
             <a:fld id="{803220A4-8895-6D46-A558-2CE2469121C7}" type="datetimeFigureOut">
-              <a:t>8/27/19</a:t>
+              <a:t>9/2/19</a:t>
             </a:fld>
             <a:endParaRPr lang="en-US"/>
           </a:p>
@@ -667,7 +667,7 @@
           <a:lstStyle/>
           <a:p>
             <a:fld id="{803220A4-8895-6D46-A558-2CE2469121C7}" type="datetimeFigureOut">
-              <a:t>8/27/19</a:t>
+              <a:t>9/2/19</a:t>
             </a:fld>
             <a:endParaRPr lang="en-US"/>
           </a:p>
@@ -865,7 +865,7 @@
           <a:lstStyle/>
           <a:p>
             <a:fld id="{803220A4-8895-6D46-A558-2CE2469121C7}" type="datetimeFigureOut">
-              <a:t>8/27/19</a:t>
+              <a:t>9/2/19</a:t>
             </a:fld>
             <a:endParaRPr lang="en-US"/>
           </a:p>
@@ -1139,7 +1139,7 @@
           <a:lstStyle/>
           <a:p>
             <a:fld id="{803220A4-8895-6D46-A558-2CE2469121C7}" type="datetimeFigureOut">
-              <a:t>8/27/19</a:t>
+              <a:t>9/2/19</a:t>
             </a:fld>
             <a:endParaRPr lang="en-US"/>
           </a:p>
@@ -1405,7 +1405,7 @@
           <a:lstStyle/>
           <a:p>
             <a:fld id="{803220A4-8895-6D46-A558-2CE2469121C7}" type="datetimeFigureOut">
-              <a:t>8/27/19</a:t>
+              <a:t>9/2/19</a:t>
             </a:fld>
             <a:endParaRPr lang="en-US"/>
           </a:p>
@@ -1818,7 +1818,7 @@
           <a:lstStyle/>
           <a:p>
             <a:fld id="{803220A4-8895-6D46-A558-2CE2469121C7}" type="datetimeFigureOut">
-              <a:t>8/27/19</a:t>
+              <a:t>9/2/19</a:t>
             </a:fld>
             <a:endParaRPr lang="en-US"/>
           </a:p>
@@ -1958,7 +1958,7 @@
           <a:lstStyle/>
           <a:p>
             <a:fld id="{803220A4-8895-6D46-A558-2CE2469121C7}" type="datetimeFigureOut">
-              <a:t>8/27/19</a:t>
+              <a:t>9/2/19</a:t>
             </a:fld>
             <a:endParaRPr lang="en-US"/>
           </a:p>
@@ -2069,7 +2069,7 @@
           <a:lstStyle/>
           <a:p>
             <a:fld id="{803220A4-8895-6D46-A558-2CE2469121C7}" type="datetimeFigureOut">
-              <a:t>8/27/19</a:t>
+              <a:t>9/2/19</a:t>
             </a:fld>
             <a:endParaRPr lang="en-US"/>
           </a:p>
@@ -2380,7 +2380,7 @@
           <a:lstStyle/>
           <a:p>
             <a:fld id="{803220A4-8895-6D46-A558-2CE2469121C7}" type="datetimeFigureOut">
-              <a:t>8/27/19</a:t>
+              <a:t>9/2/19</a:t>
             </a:fld>
             <a:endParaRPr lang="en-US"/>
           </a:p>
@@ -2667,7 +2667,7 @@
           <a:lstStyle/>
           <a:p>
             <a:fld id="{803220A4-8895-6D46-A558-2CE2469121C7}" type="datetimeFigureOut">
-              <a:t>8/27/19</a:t>
+              <a:t>9/2/19</a:t>
             </a:fld>
             <a:endParaRPr lang="en-US"/>
           </a:p>
@@ -2908,7 +2908,7 @@
           </a:lstStyle>
           <a:p>
             <a:fld id="{803220A4-8895-6D46-A558-2CE2469121C7}" type="datetimeFigureOut">
-              <a:t>8/27/19</a:t>
+              <a:t>9/2/19</a:t>
             </a:fld>
             <a:endParaRPr lang="en-US"/>
           </a:p>
@@ -3326,384 +3326,10 @@
       </p:grpSpPr>
       <p:sp>
         <p:nvSpPr>
-          <p:cNvPr id="49" name="Diamond 48">
-            <a:extLst>
-              <a:ext uri="{FF2B5EF4-FFF2-40B4-BE49-F238E27FC236}">
-                <a16:creationId xmlns:a16="http://schemas.microsoft.com/office/drawing/2014/main" id="{3666EEA0-D81E-E94F-9683-401488F50E6B}"/>
-              </a:ext>
-            </a:extLst>
-          </p:cNvPr>
-          <p:cNvSpPr/>
-          <p:nvPr/>
-        </p:nvSpPr>
-        <p:spPr>
-          <a:xfrm>
-            <a:off x="9432325" y="5206001"/>
-            <a:ext cx="1272745" cy="1230816"/>
-          </a:xfrm>
-          <a:prstGeom prst="diamond">
-            <a:avLst/>
-          </a:prstGeom>
-          <a:solidFill>
-            <a:schemeClr val="bg1"/>
-          </a:solidFill>
-        </p:spPr>
-        <p:style>
-          <a:lnRef idx="2">
-            <a:schemeClr val="accent1">
-              <a:shade val="50000"/>
-            </a:schemeClr>
-          </a:lnRef>
-          <a:fillRef idx="1">
-            <a:schemeClr val="accent1"/>
-          </a:fillRef>
-          <a:effectRef idx="0">
-            <a:schemeClr val="accent1"/>
-          </a:effectRef>
-          <a:fontRef idx="minor">
-            <a:schemeClr val="lt1"/>
-          </a:fontRef>
-        </p:style>
-        <p:txBody>
-          <a:bodyPr rtlCol="0" anchor="ctr"/>
-          <a:lstStyle/>
-          <a:p>
-            <a:pPr algn="ctr"/>
-            <a:endParaRPr lang="en-US"/>
-          </a:p>
-        </p:txBody>
-      </p:sp>
-      <p:sp>
-        <p:nvSpPr>
-          <p:cNvPr id="4" name="Oval 3">
-            <a:extLst>
-              <a:ext uri="{FF2B5EF4-FFF2-40B4-BE49-F238E27FC236}">
-                <a16:creationId xmlns:a16="http://schemas.microsoft.com/office/drawing/2014/main" id="{D43BD5E3-D73C-D54F-93B0-944915FC767C}"/>
-              </a:ext>
-            </a:extLst>
-          </p:cNvPr>
-          <p:cNvSpPr/>
-          <p:nvPr/>
-        </p:nvSpPr>
-        <p:spPr>
-          <a:xfrm>
-            <a:off x="4736757" y="2421924"/>
-            <a:ext cx="1445740" cy="1445741"/>
-          </a:xfrm>
-          <a:prstGeom prst="ellipse">
-            <a:avLst/>
-          </a:prstGeom>
-        </p:spPr>
-        <p:style>
-          <a:lnRef idx="2">
-            <a:schemeClr val="accent1">
-              <a:shade val="50000"/>
-            </a:schemeClr>
-          </a:lnRef>
-          <a:fillRef idx="1">
-            <a:schemeClr val="accent1"/>
-          </a:fillRef>
-          <a:effectRef idx="0">
-            <a:schemeClr val="accent1"/>
-          </a:effectRef>
-          <a:fontRef idx="minor">
-            <a:schemeClr val="lt1"/>
-          </a:fontRef>
-        </p:style>
-        <p:txBody>
-          <a:bodyPr rtlCol="0" anchor="ctr"/>
-          <a:lstStyle/>
-          <a:p>
-            <a:pPr algn="ctr"/>
-            <a:r>
-              <a:rPr lang="en-US"/>
-              <a:t>wide</a:t>
-            </a:r>
-          </a:p>
-        </p:txBody>
-      </p:sp>
-      <p:sp>
-        <p:nvSpPr>
-          <p:cNvPr id="5" name="Rectangle 4">
-            <a:extLst>
-              <a:ext uri="{FF2B5EF4-FFF2-40B4-BE49-F238E27FC236}">
-                <a16:creationId xmlns:a16="http://schemas.microsoft.com/office/drawing/2014/main" id="{1F12ABAB-49CD-E041-B703-3599C5761A5E}"/>
-              </a:ext>
-            </a:extLst>
-          </p:cNvPr>
-          <p:cNvSpPr/>
-          <p:nvPr/>
-        </p:nvSpPr>
-        <p:spPr>
-          <a:xfrm>
-            <a:off x="7760043" y="3429000"/>
-            <a:ext cx="1260389" cy="624016"/>
-          </a:xfrm>
-          <a:prstGeom prst="rect">
-            <a:avLst/>
-          </a:prstGeom>
-        </p:spPr>
-        <p:style>
-          <a:lnRef idx="2">
-            <a:schemeClr val="accent1">
-              <a:shade val="50000"/>
-            </a:schemeClr>
-          </a:lnRef>
-          <a:fillRef idx="1">
-            <a:schemeClr val="accent1"/>
-          </a:fillRef>
-          <a:effectRef idx="0">
-            <a:schemeClr val="accent1"/>
-          </a:effectRef>
-          <a:fontRef idx="minor">
-            <a:schemeClr val="lt1"/>
-          </a:fontRef>
-        </p:style>
-        <p:txBody>
-          <a:bodyPr rtlCol="0" anchor="ctr"/>
-          <a:lstStyle/>
-          <a:p>
-            <a:pPr algn="ctr"/>
-            <a:r>
-              <a:rPr lang="en-US"/>
-              <a:t>Definition:Wide</a:t>
-            </a:r>
-          </a:p>
-        </p:txBody>
-      </p:sp>
-      <p:sp>
-        <p:nvSpPr>
-          <p:cNvPr id="6" name="Rectangle 5">
-            <a:extLst>
-              <a:ext uri="{FF2B5EF4-FFF2-40B4-BE49-F238E27FC236}">
-                <a16:creationId xmlns:a16="http://schemas.microsoft.com/office/drawing/2014/main" id="{C9872CA2-3EC2-734E-A0D3-C89DF3F91027}"/>
-              </a:ext>
-            </a:extLst>
-          </p:cNvPr>
-          <p:cNvSpPr/>
-          <p:nvPr/>
-        </p:nvSpPr>
-        <p:spPr>
-          <a:xfrm>
-            <a:off x="6849761" y="4458729"/>
-            <a:ext cx="1260389" cy="624016"/>
-          </a:xfrm>
-          <a:prstGeom prst="rect">
-            <a:avLst/>
-          </a:prstGeom>
-        </p:spPr>
-        <p:style>
-          <a:lnRef idx="2">
-            <a:schemeClr val="accent1">
-              <a:shade val="50000"/>
-            </a:schemeClr>
-          </a:lnRef>
-          <a:fillRef idx="1">
-            <a:schemeClr val="accent1"/>
-          </a:fillRef>
-          <a:effectRef idx="0">
-            <a:schemeClr val="accent1"/>
-          </a:effectRef>
-          <a:fontRef idx="minor">
-            <a:schemeClr val="lt1"/>
-          </a:fontRef>
-        </p:style>
-        <p:txBody>
-          <a:bodyPr rtlCol="0" anchor="ctr"/>
-          <a:lstStyle/>
-          <a:p>
-            <a:pPr algn="ctr"/>
-            <a:r>
-              <a:rPr lang="en-US"/>
-              <a:t>Definition:Wide</a:t>
-            </a:r>
-          </a:p>
-        </p:txBody>
-      </p:sp>
-      <p:sp>
-        <p:nvSpPr>
-          <p:cNvPr id="7" name="Rectangle 6">
-            <a:extLst>
-              <a:ext uri="{FF2B5EF4-FFF2-40B4-BE49-F238E27FC236}">
-                <a16:creationId xmlns:a16="http://schemas.microsoft.com/office/drawing/2014/main" id="{5EA6ED24-410A-F945-BADD-C4D4048C81CF}"/>
-              </a:ext>
-            </a:extLst>
-          </p:cNvPr>
-          <p:cNvSpPr/>
-          <p:nvPr/>
-        </p:nvSpPr>
-        <p:spPr>
-          <a:xfrm>
-            <a:off x="3023285" y="718750"/>
-            <a:ext cx="1260389" cy="624016"/>
-          </a:xfrm>
-          <a:prstGeom prst="rect">
-            <a:avLst/>
-          </a:prstGeom>
-        </p:spPr>
-        <p:style>
-          <a:lnRef idx="2">
-            <a:schemeClr val="accent1">
-              <a:shade val="50000"/>
-            </a:schemeClr>
-          </a:lnRef>
-          <a:fillRef idx="1">
-            <a:schemeClr val="accent1"/>
-          </a:fillRef>
-          <a:effectRef idx="0">
-            <a:schemeClr val="accent1"/>
-          </a:effectRef>
-          <a:fontRef idx="minor">
-            <a:schemeClr val="lt1"/>
-          </a:fontRef>
-        </p:style>
-        <p:txBody>
-          <a:bodyPr rtlCol="0" anchor="ctr"/>
-          <a:lstStyle/>
-          <a:p>
-            <a:pPr algn="ctr"/>
-            <a:r>
-              <a:rPr lang="en-US"/>
-              <a:t>Definition:Wide</a:t>
-            </a:r>
-          </a:p>
-        </p:txBody>
-      </p:sp>
-      <p:cxnSp>
-        <p:nvCxnSpPr>
-          <p:cNvPr id="9" name="Straight Arrow Connector 8">
-            <a:extLst>
-              <a:ext uri="{FF2B5EF4-FFF2-40B4-BE49-F238E27FC236}">
-                <a16:creationId xmlns:a16="http://schemas.microsoft.com/office/drawing/2014/main" id="{585BE030-C2A3-8C40-8A91-F1E4E7FEBC36}"/>
-              </a:ext>
-            </a:extLst>
-          </p:cNvPr>
-          <p:cNvCxnSpPr>
-            <a:cxnSpLocks/>
-            <a:stCxn id="4" idx="1"/>
-            <a:endCxn id="7" idx="2"/>
-          </p:cNvCxnSpPr>
-          <p:nvPr/>
-        </p:nvCxnSpPr>
-        <p:spPr>
-          <a:xfrm flipH="1" flipV="1">
-            <a:off x="3653480" y="1342766"/>
-            <a:ext cx="1295001" cy="1290882"/>
-          </a:xfrm>
-          <a:prstGeom prst="straightConnector1">
-            <a:avLst/>
-          </a:prstGeom>
-          <a:ln>
-            <a:tailEnd type="triangle"/>
-          </a:ln>
-        </p:spPr>
-        <p:style>
-          <a:lnRef idx="2">
-            <a:schemeClr val="dk1"/>
-          </a:lnRef>
-          <a:fillRef idx="0">
-            <a:schemeClr val="dk1"/>
-          </a:fillRef>
-          <a:effectRef idx="1">
-            <a:schemeClr val="dk1"/>
-          </a:effectRef>
-          <a:fontRef idx="minor">
-            <a:schemeClr val="tx1"/>
-          </a:fontRef>
-        </p:style>
-      </p:cxnSp>
-      <p:cxnSp>
-        <p:nvCxnSpPr>
-          <p:cNvPr id="10" name="Straight Arrow Connector 9">
-            <a:extLst>
-              <a:ext uri="{FF2B5EF4-FFF2-40B4-BE49-F238E27FC236}">
-                <a16:creationId xmlns:a16="http://schemas.microsoft.com/office/drawing/2014/main" id="{16468C25-7DE7-6540-B5A8-D7970B6D391A}"/>
-              </a:ext>
-            </a:extLst>
-          </p:cNvPr>
-          <p:cNvCxnSpPr>
-            <a:cxnSpLocks/>
-            <a:stCxn id="4" idx="6"/>
-            <a:endCxn id="5" idx="1"/>
-          </p:cNvCxnSpPr>
-          <p:nvPr/>
-        </p:nvCxnSpPr>
-        <p:spPr>
-          <a:xfrm>
-            <a:off x="6182497" y="3144795"/>
-            <a:ext cx="1577546" cy="596213"/>
-          </a:xfrm>
-          <a:prstGeom prst="straightConnector1">
-            <a:avLst/>
-          </a:prstGeom>
-          <a:ln>
-            <a:tailEnd type="triangle"/>
-          </a:ln>
-        </p:spPr>
-        <p:style>
-          <a:lnRef idx="2">
-            <a:schemeClr val="dk1"/>
-          </a:lnRef>
-          <a:fillRef idx="0">
-            <a:schemeClr val="dk1"/>
-          </a:fillRef>
-          <a:effectRef idx="1">
-            <a:schemeClr val="dk1"/>
-          </a:effectRef>
-          <a:fontRef idx="minor">
-            <a:schemeClr val="tx1"/>
-          </a:fontRef>
-        </p:style>
-      </p:cxnSp>
-      <p:cxnSp>
-        <p:nvCxnSpPr>
-          <p:cNvPr id="15" name="Straight Arrow Connector 14">
-            <a:extLst>
-              <a:ext uri="{FF2B5EF4-FFF2-40B4-BE49-F238E27FC236}">
-                <a16:creationId xmlns:a16="http://schemas.microsoft.com/office/drawing/2014/main" id="{2BB32905-A8DF-124F-8511-E19B12A0BDD2}"/>
-              </a:ext>
-            </a:extLst>
-          </p:cNvPr>
-          <p:cNvCxnSpPr>
-            <a:cxnSpLocks/>
-            <a:stCxn id="4" idx="5"/>
-            <a:endCxn id="6" idx="0"/>
-          </p:cNvCxnSpPr>
-          <p:nvPr/>
-        </p:nvCxnSpPr>
-        <p:spPr>
-          <a:xfrm>
-            <a:off x="5970773" y="3655941"/>
-            <a:ext cx="1509183" cy="802788"/>
-          </a:xfrm>
-          <a:prstGeom prst="straightConnector1">
-            <a:avLst/>
-          </a:prstGeom>
-          <a:ln>
-            <a:tailEnd type="triangle"/>
-          </a:ln>
-        </p:spPr>
-        <p:style>
-          <a:lnRef idx="2">
-            <a:schemeClr val="dk1"/>
-          </a:lnRef>
-          <a:fillRef idx="0">
-            <a:schemeClr val="dk1"/>
-          </a:fillRef>
-          <a:effectRef idx="1">
-            <a:schemeClr val="dk1"/>
-          </a:effectRef>
-          <a:fontRef idx="minor">
-            <a:schemeClr val="tx1"/>
-          </a:fontRef>
-        </p:style>
-      </p:cxnSp>
-      <p:sp>
-        <p:nvSpPr>
-          <p:cNvPr id="18" name="TextBox 17">
-            <a:extLst>
-              <a:ext uri="{FF2B5EF4-FFF2-40B4-BE49-F238E27FC236}">
-                <a16:creationId xmlns:a16="http://schemas.microsoft.com/office/drawing/2014/main" id="{6563134B-3F21-A141-943A-092F83D17179}"/>
+          <p:cNvPr id="4" name="TextBox 3">
+            <a:extLst>
+              <a:ext uri="{FF2B5EF4-FFF2-40B4-BE49-F238E27FC236}">
+                <a16:creationId xmlns:a16="http://schemas.microsoft.com/office/drawing/2014/main" id="{CADB7FCE-5BBD-F647-AEF4-FE633DC2B9F1}"/>
               </a:ext>
             </a:extLst>
           </p:cNvPr>
@@ -3712,349 +3338,8 @@
         </p:nvSpPr>
         <p:spPr>
           <a:xfrm>
-            <a:off x="6465873" y="5488458"/>
-            <a:ext cx="2295068" cy="1200329"/>
-          </a:xfrm>
-          <a:prstGeom prst="rect">
-            <a:avLst/>
-          </a:prstGeom>
-        </p:spPr>
-        <p:style>
-          <a:lnRef idx="2">
-            <a:schemeClr val="dk1"/>
-          </a:lnRef>
-          <a:fillRef idx="1">
-            <a:schemeClr val="lt1"/>
-          </a:fillRef>
-          <a:effectRef idx="0">
-            <a:schemeClr val="dk1"/>
-          </a:effectRef>
-          <a:fontRef idx="minor">
-            <a:schemeClr val="dk1"/>
-          </a:fontRef>
-        </p:style>
-        <p:txBody>
-          <a:bodyPr wrap="square" rtlCol="0">
-            <a:spAutoFit/>
-          </a:bodyPr>
-          <a:lstStyle/>
-          <a:p>
-            <a:r>
-              <a:rPr lang="en-US"/>
-              <a:t>Pre-trained word embeddings (e.g. Bert) </a:t>
-            </a:r>
-            <a:br>
-              <a:rPr lang="en-US"/>
-            </a:br>
-            <a:r>
-              <a:rPr lang="en-US">
-                <a:sym typeface="Wingdings" pitchFamily="2" charset="2"/>
-              </a:rPr>
-              <a:t> doc2vec</a:t>
-            </a:r>
-            <a:endParaRPr lang="en-US"/>
-          </a:p>
-        </p:txBody>
-      </p:sp>
-      <p:cxnSp>
-        <p:nvCxnSpPr>
-          <p:cNvPr id="20" name="Straight Arrow Connector 19">
-            <a:extLst>
-              <a:ext uri="{FF2B5EF4-FFF2-40B4-BE49-F238E27FC236}">
-                <a16:creationId xmlns:a16="http://schemas.microsoft.com/office/drawing/2014/main" id="{42D94457-2CBE-DB44-A823-51FE646B8F3E}"/>
-              </a:ext>
-            </a:extLst>
-          </p:cNvPr>
-          <p:cNvCxnSpPr>
-            <a:stCxn id="18" idx="0"/>
-            <a:endCxn id="6" idx="2"/>
-          </p:cNvCxnSpPr>
-          <p:nvPr/>
-        </p:nvCxnSpPr>
-        <p:spPr>
-          <a:xfrm flipH="1" flipV="1">
-            <a:off x="7479956" y="5082745"/>
-            <a:ext cx="133451" cy="405713"/>
-          </a:xfrm>
-          <a:prstGeom prst="straightConnector1">
-            <a:avLst/>
-          </a:prstGeom>
-          <a:ln>
-            <a:tailEnd type="triangle"/>
-          </a:ln>
-        </p:spPr>
-        <p:style>
-          <a:lnRef idx="1">
-            <a:schemeClr val="accent1"/>
-          </a:lnRef>
-          <a:fillRef idx="0">
-            <a:schemeClr val="accent1"/>
-          </a:fillRef>
-          <a:effectRef idx="0">
-            <a:schemeClr val="accent1"/>
-          </a:effectRef>
-          <a:fontRef idx="minor">
-            <a:schemeClr val="tx1"/>
-          </a:fontRef>
-        </p:style>
-      </p:cxnSp>
-      <p:sp>
-        <p:nvSpPr>
-          <p:cNvPr id="22" name="Snip Diagonal Corner of Rectangle 21">
-            <a:extLst>
-              <a:ext uri="{FF2B5EF4-FFF2-40B4-BE49-F238E27FC236}">
-                <a16:creationId xmlns:a16="http://schemas.microsoft.com/office/drawing/2014/main" id="{03FFFF54-9ACB-C840-8492-CD56692A8258}"/>
-              </a:ext>
-            </a:extLst>
-          </p:cNvPr>
-          <p:cNvSpPr/>
-          <p:nvPr/>
-        </p:nvSpPr>
-        <p:spPr>
-          <a:xfrm>
-            <a:off x="1223318" y="3297080"/>
-            <a:ext cx="2047517" cy="1825198"/>
-          </a:xfrm>
-          <a:prstGeom prst="snip2DiagRect">
-            <a:avLst/>
-          </a:prstGeom>
-        </p:spPr>
-        <p:style>
-          <a:lnRef idx="2">
-            <a:schemeClr val="accent1">
-              <a:shade val="50000"/>
-            </a:schemeClr>
-          </a:lnRef>
-          <a:fillRef idx="1">
-            <a:schemeClr val="accent1"/>
-          </a:fillRef>
-          <a:effectRef idx="0">
-            <a:schemeClr val="accent1"/>
-          </a:effectRef>
-          <a:fontRef idx="minor">
-            <a:schemeClr val="lt1"/>
-          </a:fontRef>
-        </p:style>
-        <p:txBody>
-          <a:bodyPr rtlCol="0" anchor="ctr"/>
-          <a:lstStyle/>
-          <a:p>
-            <a:pPr algn="ctr"/>
-            <a:r>
-              <a:rPr lang="en-US"/>
-              <a:t>”wide” word vector from having applied Skip-Gram over the corpus of examples</a:t>
-            </a:r>
-          </a:p>
-        </p:txBody>
-      </p:sp>
-      <p:sp>
-        <p:nvSpPr>
-          <p:cNvPr id="23" name="TextBox 22">
-            <a:extLst>
-              <a:ext uri="{FF2B5EF4-FFF2-40B4-BE49-F238E27FC236}">
-                <a16:creationId xmlns:a16="http://schemas.microsoft.com/office/drawing/2014/main" id="{24515796-A3A4-984B-8D4C-EB5B1CF9FD90}"/>
-              </a:ext>
-            </a:extLst>
-          </p:cNvPr>
-          <p:cNvSpPr txBox="1"/>
-          <p:nvPr/>
-        </p:nvSpPr>
-        <p:spPr>
-          <a:xfrm>
-            <a:off x="975768" y="5488457"/>
-            <a:ext cx="2295068" cy="1200329"/>
-          </a:xfrm>
-          <a:prstGeom prst="rect">
-            <a:avLst/>
-          </a:prstGeom>
-        </p:spPr>
-        <p:style>
-          <a:lnRef idx="2">
-            <a:schemeClr val="dk1"/>
-          </a:lnRef>
-          <a:fillRef idx="1">
-            <a:schemeClr val="lt1"/>
-          </a:fillRef>
-          <a:effectRef idx="0">
-            <a:schemeClr val="dk1"/>
-          </a:effectRef>
-          <a:fontRef idx="minor">
-            <a:schemeClr val="dk1"/>
-          </a:fontRef>
-        </p:style>
-        <p:txBody>
-          <a:bodyPr wrap="square" rtlCol="0">
-            <a:spAutoFit/>
-          </a:bodyPr>
-          <a:lstStyle/>
-          <a:p>
-            <a:r>
-              <a:rPr lang="en-US"/>
-              <a:t>Pre-trained word embeddings </a:t>
-            </a:r>
-            <a:r>
-              <a:rPr lang="en-US">
-                <a:sym typeface="Wingdings" pitchFamily="2" charset="2"/>
-              </a:rPr>
-              <a:t> </a:t>
-            </a:r>
-            <a:r>
-              <a:rPr lang="en-US"/>
-              <a:t>Skip-gram around the target word</a:t>
-            </a:r>
-          </a:p>
-        </p:txBody>
-      </p:sp>
-      <p:cxnSp>
-        <p:nvCxnSpPr>
-          <p:cNvPr id="24" name="Straight Arrow Connector 23">
-            <a:extLst>
-              <a:ext uri="{FF2B5EF4-FFF2-40B4-BE49-F238E27FC236}">
-                <a16:creationId xmlns:a16="http://schemas.microsoft.com/office/drawing/2014/main" id="{D04106F5-19FC-CC46-8FF2-2BF4F365B0C0}"/>
-              </a:ext>
-            </a:extLst>
-          </p:cNvPr>
-          <p:cNvCxnSpPr>
-            <a:cxnSpLocks/>
-            <a:stCxn id="23" idx="0"/>
-          </p:cNvCxnSpPr>
-          <p:nvPr/>
-        </p:nvCxnSpPr>
-        <p:spPr>
-          <a:xfrm flipV="1">
-            <a:off x="2123302" y="5082745"/>
-            <a:ext cx="0" cy="405712"/>
-          </a:xfrm>
-          <a:prstGeom prst="straightConnector1">
-            <a:avLst/>
-          </a:prstGeom>
-          <a:ln>
-            <a:tailEnd type="triangle"/>
-          </a:ln>
-        </p:spPr>
-        <p:style>
-          <a:lnRef idx="1">
-            <a:schemeClr val="accent1"/>
-          </a:lnRef>
-          <a:fillRef idx="0">
-            <a:schemeClr val="accent1"/>
-          </a:fillRef>
-          <a:effectRef idx="0">
-            <a:schemeClr val="accent1"/>
-          </a:effectRef>
-          <a:fontRef idx="minor">
-            <a:schemeClr val="tx1"/>
-          </a:fontRef>
-        </p:style>
-      </p:cxnSp>
-      <p:cxnSp>
-        <p:nvCxnSpPr>
-          <p:cNvPr id="32" name="Straight Arrow Connector 31">
-            <a:extLst>
-              <a:ext uri="{FF2B5EF4-FFF2-40B4-BE49-F238E27FC236}">
-                <a16:creationId xmlns:a16="http://schemas.microsoft.com/office/drawing/2014/main" id="{DF6359E9-38C6-B644-89A6-41E406FA1CDD}"/>
-              </a:ext>
-            </a:extLst>
-          </p:cNvPr>
-          <p:cNvCxnSpPr>
-            <a:cxnSpLocks/>
-            <a:stCxn id="4" idx="2"/>
-            <a:endCxn id="22" idx="0"/>
-          </p:cNvCxnSpPr>
-          <p:nvPr/>
-        </p:nvCxnSpPr>
-        <p:spPr>
-          <a:xfrm flipH="1">
-            <a:off x="3270835" y="3144795"/>
-            <a:ext cx="1465922" cy="1064884"/>
-          </a:xfrm>
-          <a:prstGeom prst="straightConnector1">
-            <a:avLst/>
-          </a:prstGeom>
-          <a:ln>
-            <a:tailEnd type="triangle"/>
-          </a:ln>
-        </p:spPr>
-        <p:style>
-          <a:lnRef idx="1">
-            <a:schemeClr val="accent1"/>
-          </a:lnRef>
-          <a:fillRef idx="0">
-            <a:schemeClr val="accent1"/>
-          </a:fillRef>
-          <a:effectRef idx="0">
-            <a:schemeClr val="accent1"/>
-          </a:effectRef>
-          <a:fontRef idx="minor">
-            <a:schemeClr val="tx1"/>
-          </a:fontRef>
-        </p:style>
-      </p:cxnSp>
-      <p:sp>
-        <p:nvSpPr>
-          <p:cNvPr id="35" name="Diamond 34">
-            <a:extLst>
-              <a:ext uri="{FF2B5EF4-FFF2-40B4-BE49-F238E27FC236}">
-                <a16:creationId xmlns:a16="http://schemas.microsoft.com/office/drawing/2014/main" id="{9F7190C9-02EF-2A43-B0C4-837BF16A9D0C}"/>
-              </a:ext>
-            </a:extLst>
-          </p:cNvPr>
-          <p:cNvSpPr/>
-          <p:nvPr/>
-        </p:nvSpPr>
-        <p:spPr>
-          <a:xfrm>
-            <a:off x="4180705" y="5122278"/>
-            <a:ext cx="1272745" cy="1230816"/>
-          </a:xfrm>
-          <a:prstGeom prst="diamond">
-            <a:avLst/>
-          </a:prstGeom>
-          <a:solidFill>
-            <a:schemeClr val="bg1"/>
-          </a:solidFill>
-        </p:spPr>
-        <p:style>
-          <a:lnRef idx="2">
-            <a:schemeClr val="accent1">
-              <a:shade val="50000"/>
-            </a:schemeClr>
-          </a:lnRef>
-          <a:fillRef idx="1">
-            <a:schemeClr val="accent1"/>
-          </a:fillRef>
-          <a:effectRef idx="0">
-            <a:schemeClr val="accent1"/>
-          </a:effectRef>
-          <a:fontRef idx="minor">
-            <a:schemeClr val="lt1"/>
-          </a:fontRef>
-        </p:style>
-        <p:txBody>
-          <a:bodyPr rtlCol="0" anchor="ctr"/>
-          <a:lstStyle/>
-          <a:p>
-            <a:pPr algn="ctr"/>
-            <a:endParaRPr lang="en-US"/>
-          </a:p>
-        </p:txBody>
-      </p:sp>
-      <p:sp>
-        <p:nvSpPr>
-          <p:cNvPr id="36" name="TextBox 35">
-            <a:extLst>
-              <a:ext uri="{FF2B5EF4-FFF2-40B4-BE49-F238E27FC236}">
-                <a16:creationId xmlns:a16="http://schemas.microsoft.com/office/drawing/2014/main" id="{5331301B-8679-7946-93C4-FD40CB168C4E}"/>
-              </a:ext>
-            </a:extLst>
-          </p:cNvPr>
-          <p:cNvSpPr txBox="1"/>
-          <p:nvPr/>
-        </p:nvSpPr>
-        <p:spPr>
-          <a:xfrm>
-            <a:off x="3822355" y="5007514"/>
-            <a:ext cx="2228336" cy="1477328"/>
+            <a:off x="714632" y="2228671"/>
+            <a:ext cx="10762735" cy="1200329"/>
           </a:xfrm>
           <a:prstGeom prst="rect">
             <a:avLst/>
@@ -4067,529 +3352,23 @@
           </a:bodyPr>
           <a:lstStyle/>
           <a:p>
-            <a:r>
-              <a:rPr lang="en-US"/>
-              <a:t>Alternatives: Word2Vec / LSTMs / TXL on small corpus, </a:t>
-            </a:r>
-            <a:br>
-              <a:rPr lang="en-US"/>
-            </a:br>
-            <a:r>
-              <a:rPr lang="en-US"/>
-              <a:t>or bootstrap from examples</a:t>
-            </a:r>
-          </a:p>
-        </p:txBody>
-      </p:sp>
-      <p:sp>
-        <p:nvSpPr>
-          <p:cNvPr id="38" name="Oval 37">
-            <a:extLst>
-              <a:ext uri="{FF2B5EF4-FFF2-40B4-BE49-F238E27FC236}">
-                <a16:creationId xmlns:a16="http://schemas.microsoft.com/office/drawing/2014/main" id="{E3B4A9C1-616D-8E44-98AF-3256821C1CDC}"/>
-              </a:ext>
-            </a:extLst>
-          </p:cNvPr>
-          <p:cNvSpPr/>
-          <p:nvPr/>
-        </p:nvSpPr>
-        <p:spPr>
-          <a:xfrm>
-            <a:off x="9168715" y="441776"/>
-            <a:ext cx="1295001" cy="1290882"/>
-          </a:xfrm>
-          <a:prstGeom prst="ellipse">
-            <a:avLst/>
-          </a:prstGeom>
-        </p:spPr>
-        <p:style>
-          <a:lnRef idx="2">
-            <a:schemeClr val="accent1">
-              <a:shade val="50000"/>
-            </a:schemeClr>
-          </a:lnRef>
-          <a:fillRef idx="1">
-            <a:schemeClr val="accent1"/>
-          </a:fillRef>
-          <a:effectRef idx="0">
-            <a:schemeClr val="accent1"/>
-          </a:effectRef>
-          <a:fontRef idx="minor">
-            <a:schemeClr val="lt1"/>
-          </a:fontRef>
-        </p:style>
-        <p:txBody>
-          <a:bodyPr rtlCol="0" anchor="ctr"/>
-          <a:lstStyle/>
-          <a:p>
-            <a:pPr algn="ctr"/>
-            <a:r>
-              <a:rPr lang="en-US"/>
-              <a:t>narrow</a:t>
-            </a:r>
-          </a:p>
-        </p:txBody>
-      </p:sp>
-      <p:sp>
-        <p:nvSpPr>
-          <p:cNvPr id="39" name="Oval 38">
-            <a:extLst>
-              <a:ext uri="{FF2B5EF4-FFF2-40B4-BE49-F238E27FC236}">
-                <a16:creationId xmlns:a16="http://schemas.microsoft.com/office/drawing/2014/main" id="{74036C56-D38F-4B41-BD13-C47BFC1D8C46}"/>
-              </a:ext>
-            </a:extLst>
-          </p:cNvPr>
-          <p:cNvSpPr/>
-          <p:nvPr/>
-        </p:nvSpPr>
-        <p:spPr>
-          <a:xfrm>
-            <a:off x="1346454" y="1451310"/>
-            <a:ext cx="1295001" cy="1290882"/>
-          </a:xfrm>
-          <a:prstGeom prst="ellipse">
-            <a:avLst/>
-          </a:prstGeom>
-        </p:spPr>
-        <p:style>
-          <a:lnRef idx="2">
-            <a:schemeClr val="accent1">
-              <a:shade val="50000"/>
-            </a:schemeClr>
-          </a:lnRef>
-          <a:fillRef idx="1">
-            <a:schemeClr val="accent1"/>
-          </a:fillRef>
-          <a:effectRef idx="0">
-            <a:schemeClr val="accent1"/>
-          </a:effectRef>
-          <a:fontRef idx="minor">
-            <a:schemeClr val="lt1"/>
-          </a:fontRef>
-        </p:style>
-        <p:txBody>
-          <a:bodyPr rtlCol="0" anchor="ctr"/>
-          <a:lstStyle/>
-          <a:p>
-            <a:pPr algn="ctr"/>
-            <a:r>
-              <a:rPr lang="en-US"/>
-              <a:t>broad</a:t>
-            </a:r>
-          </a:p>
-        </p:txBody>
-      </p:sp>
-      <p:cxnSp>
-        <p:nvCxnSpPr>
-          <p:cNvPr id="42" name="Straight Arrow Connector 41">
-            <a:extLst>
-              <a:ext uri="{FF2B5EF4-FFF2-40B4-BE49-F238E27FC236}">
-                <a16:creationId xmlns:a16="http://schemas.microsoft.com/office/drawing/2014/main" id="{DE3FC234-0BEC-3F42-A6F0-885C42710CBC}"/>
-              </a:ext>
-            </a:extLst>
-          </p:cNvPr>
-          <p:cNvCxnSpPr>
-            <a:cxnSpLocks/>
-            <a:stCxn id="38" idx="2"/>
-            <a:endCxn id="4" idx="7"/>
-          </p:cNvCxnSpPr>
-          <p:nvPr/>
-        </p:nvCxnSpPr>
-        <p:spPr>
-          <a:xfrm flipH="1">
-            <a:off x="5970773" y="1087217"/>
-            <a:ext cx="3197942" cy="1546431"/>
-          </a:xfrm>
-          <a:prstGeom prst="straightConnector1">
-            <a:avLst/>
-          </a:prstGeom>
-          <a:ln>
-            <a:tailEnd type="triangle"/>
-          </a:ln>
-        </p:spPr>
-        <p:style>
-          <a:lnRef idx="2">
-            <a:schemeClr val="accent2"/>
-          </a:lnRef>
-          <a:fillRef idx="0">
-            <a:schemeClr val="accent2"/>
-          </a:fillRef>
-          <a:effectRef idx="1">
-            <a:schemeClr val="accent2"/>
-          </a:effectRef>
-          <a:fontRef idx="minor">
-            <a:schemeClr val="tx1"/>
-          </a:fontRef>
-        </p:style>
-      </p:cxnSp>
-      <p:cxnSp>
-        <p:nvCxnSpPr>
-          <p:cNvPr id="45" name="Straight Arrow Connector 44">
-            <a:extLst>
-              <a:ext uri="{FF2B5EF4-FFF2-40B4-BE49-F238E27FC236}">
-                <a16:creationId xmlns:a16="http://schemas.microsoft.com/office/drawing/2014/main" id="{1DA91269-9A4C-4D49-83D9-7AE388C6966A}"/>
-              </a:ext>
-            </a:extLst>
-          </p:cNvPr>
-          <p:cNvCxnSpPr>
-            <a:cxnSpLocks/>
-            <a:stCxn id="4" idx="2"/>
-            <a:endCxn id="39" idx="6"/>
-          </p:cNvCxnSpPr>
-          <p:nvPr/>
-        </p:nvCxnSpPr>
-        <p:spPr>
-          <a:xfrm flipH="1" flipV="1">
-            <a:off x="2641455" y="2096751"/>
-            <a:ext cx="2095302" cy="1048044"/>
-          </a:xfrm>
-          <a:prstGeom prst="straightConnector1">
-            <a:avLst/>
-          </a:prstGeom>
-          <a:ln>
-            <a:tailEnd type="triangle"/>
-          </a:ln>
-        </p:spPr>
-        <p:style>
-          <a:lnRef idx="1">
-            <a:schemeClr val="accent6"/>
-          </a:lnRef>
-          <a:fillRef idx="0">
-            <a:schemeClr val="accent6"/>
-          </a:fillRef>
-          <a:effectRef idx="0">
-            <a:schemeClr val="accent6"/>
-          </a:effectRef>
-          <a:fontRef idx="minor">
-            <a:schemeClr val="tx1"/>
-          </a:fontRef>
-        </p:style>
-      </p:cxnSp>
-      <p:sp>
-        <p:nvSpPr>
-          <p:cNvPr id="48" name="TextBox 47">
-            <a:extLst>
-              <a:ext uri="{FF2B5EF4-FFF2-40B4-BE49-F238E27FC236}">
-                <a16:creationId xmlns:a16="http://schemas.microsoft.com/office/drawing/2014/main" id="{43891F1F-8BBE-5D44-AD17-3B88A25F29FD}"/>
-              </a:ext>
-            </a:extLst>
-          </p:cNvPr>
-          <p:cNvSpPr txBox="1"/>
-          <p:nvPr/>
-        </p:nvSpPr>
-        <p:spPr>
-          <a:xfrm>
-            <a:off x="9042672" y="5414520"/>
-            <a:ext cx="2228336" cy="646331"/>
-          </a:xfrm>
-          <a:prstGeom prst="rect">
-            <a:avLst/>
-          </a:prstGeom>
-          <a:noFill/>
-        </p:spPr>
-        <p:txBody>
-          <a:bodyPr wrap="square" rtlCol="0">
-            <a:spAutoFit/>
-          </a:bodyPr>
-          <a:lstStyle/>
-          <a:p>
-            <a:r>
-              <a:rPr lang="en-US"/>
-              <a:t>Alternatives: GloVe, Doc2Vec</a:t>
-            </a:r>
-          </a:p>
-        </p:txBody>
-      </p:sp>
-      <p:sp>
-        <p:nvSpPr>
-          <p:cNvPr id="53" name="Rectangle 52">
-            <a:extLst>
-              <a:ext uri="{FF2B5EF4-FFF2-40B4-BE49-F238E27FC236}">
-                <a16:creationId xmlns:a16="http://schemas.microsoft.com/office/drawing/2014/main" id="{D88E4017-3140-CC4E-92AF-7DACB95B0721}"/>
-              </a:ext>
-            </a:extLst>
-          </p:cNvPr>
-          <p:cNvSpPr/>
-          <p:nvPr/>
-        </p:nvSpPr>
-        <p:spPr>
-          <a:xfrm>
-            <a:off x="6855111" y="1598360"/>
-            <a:ext cx="1100385" cy="389847"/>
-          </a:xfrm>
-          <a:prstGeom prst="rect">
-            <a:avLst/>
-          </a:prstGeom>
-        </p:spPr>
-        <p:style>
-          <a:lnRef idx="2">
-            <a:schemeClr val="accent4">
-              <a:shade val="50000"/>
-            </a:schemeClr>
-          </a:lnRef>
-          <a:fillRef idx="1">
-            <a:schemeClr val="accent4"/>
-          </a:fillRef>
-          <a:effectRef idx="0">
-            <a:schemeClr val="accent4"/>
-          </a:effectRef>
-          <a:fontRef idx="minor">
-            <a:schemeClr val="lt1"/>
-          </a:fontRef>
-        </p:style>
-        <p:txBody>
-          <a:bodyPr rtlCol="0" anchor="ctr"/>
-          <a:lstStyle/>
-          <a:p>
-            <a:pPr algn="ctr"/>
-            <a:r>
-              <a:rPr lang="en-US"/>
-              <a:t>antonym</a:t>
-            </a:r>
-          </a:p>
-        </p:txBody>
-      </p:sp>
-      <p:sp>
-        <p:nvSpPr>
-          <p:cNvPr id="54" name="Rectangle 53">
-            <a:extLst>
-              <a:ext uri="{FF2B5EF4-FFF2-40B4-BE49-F238E27FC236}">
-                <a16:creationId xmlns:a16="http://schemas.microsoft.com/office/drawing/2014/main" id="{319BDFE2-154E-834A-9391-346D60E35815}"/>
-              </a:ext>
-            </a:extLst>
-          </p:cNvPr>
-          <p:cNvSpPr/>
-          <p:nvPr/>
-        </p:nvSpPr>
-        <p:spPr>
-          <a:xfrm>
-            <a:off x="3089573" y="2328233"/>
-            <a:ext cx="1148348" cy="389847"/>
-          </a:xfrm>
-          <a:prstGeom prst="rect">
-            <a:avLst/>
-          </a:prstGeom>
-        </p:spPr>
-        <p:style>
-          <a:lnRef idx="2">
-            <a:schemeClr val="accent4">
-              <a:shade val="50000"/>
-            </a:schemeClr>
-          </a:lnRef>
-          <a:fillRef idx="1">
-            <a:schemeClr val="accent4"/>
-          </a:fillRef>
-          <a:effectRef idx="0">
-            <a:schemeClr val="accent4"/>
-          </a:effectRef>
-          <a:fontRef idx="minor">
-            <a:schemeClr val="lt1"/>
-          </a:fontRef>
-        </p:style>
-        <p:txBody>
-          <a:bodyPr rtlCol="0" anchor="ctr"/>
-          <a:lstStyle/>
-          <a:p>
-            <a:pPr algn="ctr"/>
-            <a:r>
-              <a:rPr lang="en-US"/>
-              <a:t>synonym</a:t>
-            </a:r>
-          </a:p>
-        </p:txBody>
-      </p:sp>
-      <p:sp>
-        <p:nvSpPr>
-          <p:cNvPr id="55" name="Rectangle 54">
-            <a:extLst>
-              <a:ext uri="{FF2B5EF4-FFF2-40B4-BE49-F238E27FC236}">
-                <a16:creationId xmlns:a16="http://schemas.microsoft.com/office/drawing/2014/main" id="{6DAEB3F0-78B5-024D-994E-0A9E9338B445}"/>
-              </a:ext>
-            </a:extLst>
-          </p:cNvPr>
-          <p:cNvSpPr/>
-          <p:nvPr/>
-        </p:nvSpPr>
-        <p:spPr>
-          <a:xfrm>
-            <a:off x="3497584" y="3498656"/>
-            <a:ext cx="1012424" cy="389847"/>
-          </a:xfrm>
-          <a:prstGeom prst="rect">
-            <a:avLst/>
-          </a:prstGeom>
-        </p:spPr>
-        <p:style>
-          <a:lnRef idx="2">
-            <a:schemeClr val="accent4">
-              <a:shade val="50000"/>
-            </a:schemeClr>
-          </a:lnRef>
-          <a:fillRef idx="1">
-            <a:schemeClr val="accent4"/>
-          </a:fillRef>
-          <a:effectRef idx="0">
-            <a:schemeClr val="accent4"/>
-          </a:effectRef>
-          <a:fontRef idx="minor">
-            <a:schemeClr val="lt1"/>
-          </a:fontRef>
-        </p:style>
-        <p:txBody>
-          <a:bodyPr rtlCol="0" anchor="ctr"/>
-          <a:lstStyle/>
-          <a:p>
-            <a:pPr algn="ctr"/>
-            <a:r>
-              <a:rPr lang="en-US"/>
-              <a:t>example</a:t>
-            </a:r>
-          </a:p>
-        </p:txBody>
-      </p:sp>
-      <p:sp>
-        <p:nvSpPr>
-          <p:cNvPr id="57" name="Rectangle 56">
-            <a:extLst>
-              <a:ext uri="{FF2B5EF4-FFF2-40B4-BE49-F238E27FC236}">
-                <a16:creationId xmlns:a16="http://schemas.microsoft.com/office/drawing/2014/main" id="{C72DCF29-0765-C142-A170-220F3DEF6F65}"/>
-              </a:ext>
-            </a:extLst>
-          </p:cNvPr>
-          <p:cNvSpPr/>
-          <p:nvPr/>
-        </p:nvSpPr>
-        <p:spPr>
-          <a:xfrm>
-            <a:off x="6416045" y="3130195"/>
-            <a:ext cx="1153698" cy="389847"/>
-          </a:xfrm>
-          <a:prstGeom prst="rect">
-            <a:avLst/>
-          </a:prstGeom>
-        </p:spPr>
-        <p:style>
-          <a:lnRef idx="2">
-            <a:schemeClr val="accent4">
-              <a:shade val="50000"/>
-            </a:schemeClr>
-          </a:lnRef>
-          <a:fillRef idx="1">
-            <a:schemeClr val="accent4"/>
-          </a:fillRef>
-          <a:effectRef idx="0">
-            <a:schemeClr val="accent4"/>
-          </a:effectRef>
-          <a:fontRef idx="minor">
-            <a:schemeClr val="lt1"/>
-          </a:fontRef>
-        </p:style>
-        <p:txBody>
-          <a:bodyPr rtlCol="0" anchor="ctr"/>
-          <a:lstStyle/>
-          <a:p>
-            <a:pPr algn="ctr"/>
-            <a:r>
-              <a:rPr lang="en-US"/>
-              <a:t>Definition</a:t>
-            </a:r>
-          </a:p>
-        </p:txBody>
-      </p:sp>
-      <p:sp>
-        <p:nvSpPr>
-          <p:cNvPr id="58" name="Rectangle 57">
-            <a:extLst>
-              <a:ext uri="{FF2B5EF4-FFF2-40B4-BE49-F238E27FC236}">
-                <a16:creationId xmlns:a16="http://schemas.microsoft.com/office/drawing/2014/main" id="{B31028EA-5D98-504B-B898-1B86A75267CD}"/>
-              </a:ext>
-            </a:extLst>
-          </p:cNvPr>
-          <p:cNvSpPr/>
-          <p:nvPr/>
-        </p:nvSpPr>
-        <p:spPr>
-          <a:xfrm>
-            <a:off x="5970774" y="3813482"/>
-            <a:ext cx="1234016" cy="424281"/>
-          </a:xfrm>
-          <a:prstGeom prst="rect">
-            <a:avLst/>
-          </a:prstGeom>
-        </p:spPr>
-        <p:style>
-          <a:lnRef idx="2">
-            <a:schemeClr val="accent4">
-              <a:shade val="50000"/>
-            </a:schemeClr>
-          </a:lnRef>
-          <a:fillRef idx="1">
-            <a:schemeClr val="accent4"/>
-          </a:fillRef>
-          <a:effectRef idx="0">
-            <a:schemeClr val="accent4"/>
-          </a:effectRef>
-          <a:fontRef idx="minor">
-            <a:schemeClr val="lt1"/>
-          </a:fontRef>
-        </p:style>
-        <p:txBody>
-          <a:bodyPr rtlCol="0" anchor="ctr"/>
-          <a:lstStyle/>
-          <a:p>
-            <a:pPr algn="ctr"/>
-            <a:r>
-              <a:rPr lang="en-US"/>
-              <a:t>Definition</a:t>
-            </a:r>
-          </a:p>
-        </p:txBody>
-      </p:sp>
-      <p:sp>
-        <p:nvSpPr>
-          <p:cNvPr id="59" name="Rectangle 58">
-            <a:extLst>
-              <a:ext uri="{FF2B5EF4-FFF2-40B4-BE49-F238E27FC236}">
-                <a16:creationId xmlns:a16="http://schemas.microsoft.com/office/drawing/2014/main" id="{B855F05C-DE03-3B4A-AADF-E1D6D31854A2}"/>
-              </a:ext>
-            </a:extLst>
-          </p:cNvPr>
-          <p:cNvSpPr/>
-          <p:nvPr/>
-        </p:nvSpPr>
-        <p:spPr>
-          <a:xfrm>
-            <a:off x="3603856" y="1727598"/>
-            <a:ext cx="1153698" cy="389847"/>
-          </a:xfrm>
-          <a:prstGeom prst="rect">
-            <a:avLst/>
-          </a:prstGeom>
-        </p:spPr>
-        <p:style>
-          <a:lnRef idx="2">
-            <a:schemeClr val="accent4">
-              <a:shade val="50000"/>
-            </a:schemeClr>
-          </a:lnRef>
-          <a:fillRef idx="1">
-            <a:schemeClr val="accent4"/>
-          </a:fillRef>
-          <a:effectRef idx="0">
-            <a:schemeClr val="accent4"/>
-          </a:effectRef>
-          <a:fontRef idx="minor">
-            <a:schemeClr val="lt1"/>
-          </a:fontRef>
-        </p:style>
-        <p:txBody>
-          <a:bodyPr rtlCol="0" anchor="ctr"/>
-          <a:lstStyle/>
-          <a:p>
-            <a:pPr algn="ctr"/>
-            <a:r>
-              <a:rPr lang="en-US"/>
-              <a:t>Definition</a:t>
+            <a:pPr marL="285750" indent="-285750">
+              <a:buFont typeface="Arial" panose="020B0604020202020204" pitchFamily="34" charset="0"/>
+              <a:buChar char="•"/>
+            </a:pPr>
+            <a:r>
+              <a:rPr lang="en-US" sz="2400"/>
+              <a:t>Objective: Multi-sense Language Model</a:t>
+            </a:r>
+          </a:p>
+          <a:p>
+            <a:pPr marL="285750" indent="-285750">
+              <a:buFont typeface="Arial" panose="020B0604020202020204" pitchFamily="34" charset="0"/>
+              <a:buChar char="•"/>
+            </a:pPr>
+            <a:r>
+              <a:rPr lang="en-US" sz="2400"/>
+              <a:t>Write-Assistant should suggest a sense of a word; it will also be able to link the dictionary definition</a:t>
             </a:r>
           </a:p>
         </p:txBody>
@@ -4597,7 +3376,7 @@
     </p:spTree>
     <p:extLst>
       <p:ext uri="{BB962C8B-B14F-4D97-AF65-F5344CB8AC3E}">
-        <p14:creationId xmlns:p14="http://schemas.microsoft.com/office/powerpoint/2010/main" val="346262446"/>
+        <p14:creationId xmlns:p14="http://schemas.microsoft.com/office/powerpoint/2010/main" val="2034077816"/>
       </p:ext>
     </p:extLst>
   </p:cSld>
@@ -4626,10 +3405,10 @@
       </p:grpSpPr>
       <p:sp>
         <p:nvSpPr>
-          <p:cNvPr id="49" name="Diamond 48">
-            <a:extLst>
-              <a:ext uri="{FF2B5EF4-FFF2-40B4-BE49-F238E27FC236}">
-                <a16:creationId xmlns:a16="http://schemas.microsoft.com/office/drawing/2014/main" id="{3666EEA0-D81E-E94F-9683-401488F50E6B}"/>
+          <p:cNvPr id="4" name="Hexagon 3">
+            <a:extLst>
+              <a:ext uri="{FF2B5EF4-FFF2-40B4-BE49-F238E27FC236}">
+                <a16:creationId xmlns:a16="http://schemas.microsoft.com/office/drawing/2014/main" id="{23CB137D-5BB4-1242-8225-A9DF14533DE8}"/>
               </a:ext>
             </a:extLst>
           </p:cNvPr>
@@ -4638,27 +3417,398 @@
         </p:nvSpPr>
         <p:spPr>
           <a:xfrm>
-            <a:off x="9432325" y="5206001"/>
-            <a:ext cx="1272745" cy="1230816"/>
-          </a:xfrm>
-          <a:prstGeom prst="diamond">
+            <a:off x="1485250" y="1819529"/>
+            <a:ext cx="1234161" cy="819668"/>
+          </a:xfrm>
+          <a:prstGeom prst="hexagon">
             <a:avLst/>
           </a:prstGeom>
-          <a:solidFill>
-            <a:schemeClr val="bg1"/>
-          </a:solidFill>
         </p:spPr>
         <p:style>
-          <a:lnRef idx="2">
-            <a:schemeClr val="accent1">
-              <a:shade val="50000"/>
-            </a:schemeClr>
+          <a:lnRef idx="1">
+            <a:schemeClr val="accent6"/>
           </a:lnRef>
-          <a:fillRef idx="1">
-            <a:schemeClr val="accent1"/>
+          <a:fillRef idx="2">
+            <a:schemeClr val="accent6"/>
           </a:fillRef>
-          <a:effectRef idx="0">
-            <a:schemeClr val="accent1"/>
+          <a:effectRef idx="1">
+            <a:schemeClr val="accent6"/>
+          </a:effectRef>
+          <a:fontRef idx="minor">
+            <a:schemeClr val="dk1"/>
+          </a:fontRef>
+        </p:style>
+        <p:txBody>
+          <a:bodyPr rtlCol="0" anchor="ctr"/>
+          <a:lstStyle/>
+          <a:p>
+            <a:pPr algn="ctr"/>
+            <a:r>
+              <a:rPr lang="en-US"/>
+              <a:t>move.1</a:t>
+            </a:r>
+          </a:p>
+        </p:txBody>
+      </p:sp>
+      <p:sp>
+        <p:nvSpPr>
+          <p:cNvPr id="5" name="Hexagon 4">
+            <a:extLst>
+              <a:ext uri="{FF2B5EF4-FFF2-40B4-BE49-F238E27FC236}">
+                <a16:creationId xmlns:a16="http://schemas.microsoft.com/office/drawing/2014/main" id="{737AC331-5BBD-FA48-A45D-777447720597}"/>
+              </a:ext>
+            </a:extLst>
+          </p:cNvPr>
+          <p:cNvSpPr/>
+          <p:nvPr/>
+        </p:nvSpPr>
+        <p:spPr>
+          <a:xfrm>
+            <a:off x="6627885" y="1973637"/>
+            <a:ext cx="1243912" cy="819667"/>
+          </a:xfrm>
+          <a:prstGeom prst="hexagon">
+            <a:avLst/>
+          </a:prstGeom>
+        </p:spPr>
+        <p:style>
+          <a:lnRef idx="1">
+            <a:schemeClr val="accent6"/>
+          </a:lnRef>
+          <a:fillRef idx="2">
+            <a:schemeClr val="accent6"/>
+          </a:fillRef>
+          <a:effectRef idx="1">
+            <a:schemeClr val="accent6"/>
+          </a:effectRef>
+          <a:fontRef idx="minor">
+            <a:schemeClr val="dk1"/>
+          </a:fontRef>
+        </p:style>
+        <p:txBody>
+          <a:bodyPr rtlCol="0" anchor="ctr"/>
+          <a:lstStyle/>
+          <a:p>
+            <a:pPr algn="ctr"/>
+            <a:r>
+              <a:rPr lang="en-US"/>
+              <a:t>Move.2</a:t>
+            </a:r>
+          </a:p>
+        </p:txBody>
+      </p:sp>
+      <p:sp>
+        <p:nvSpPr>
+          <p:cNvPr id="6" name="Hexagon 5">
+            <a:extLst>
+              <a:ext uri="{FF2B5EF4-FFF2-40B4-BE49-F238E27FC236}">
+                <a16:creationId xmlns:a16="http://schemas.microsoft.com/office/drawing/2014/main" id="{C8F0319D-7AA5-824D-BFDE-D271CAAF9E88}"/>
+              </a:ext>
+            </a:extLst>
+          </p:cNvPr>
+          <p:cNvSpPr/>
+          <p:nvPr/>
+        </p:nvSpPr>
+        <p:spPr>
+          <a:xfrm>
+            <a:off x="4908997" y="300680"/>
+            <a:ext cx="1243912" cy="704335"/>
+          </a:xfrm>
+          <a:prstGeom prst="hexagon">
+            <a:avLst/>
+          </a:prstGeom>
+        </p:spPr>
+        <p:style>
+          <a:lnRef idx="1">
+            <a:schemeClr val="accent6"/>
+          </a:lnRef>
+          <a:fillRef idx="2">
+            <a:schemeClr val="accent6"/>
+          </a:fillRef>
+          <a:effectRef idx="1">
+            <a:schemeClr val="accent6"/>
+          </a:effectRef>
+          <a:fontRef idx="minor">
+            <a:schemeClr val="dk1"/>
+          </a:fontRef>
+        </p:style>
+        <p:txBody>
+          <a:bodyPr rtlCol="0" anchor="ctr"/>
+          <a:lstStyle/>
+          <a:p>
+            <a:pPr algn="ctr"/>
+            <a:r>
+              <a:rPr lang="en-US"/>
+              <a:t>move.5</a:t>
+            </a:r>
+          </a:p>
+        </p:txBody>
+      </p:sp>
+      <p:sp>
+        <p:nvSpPr>
+          <p:cNvPr id="7" name="Oval 6">
+            <a:extLst>
+              <a:ext uri="{FF2B5EF4-FFF2-40B4-BE49-F238E27FC236}">
+                <a16:creationId xmlns:a16="http://schemas.microsoft.com/office/drawing/2014/main" id="{EAF0B2C6-3FB8-494B-A72B-E60CB3D27B58}"/>
+              </a:ext>
+            </a:extLst>
+          </p:cNvPr>
+          <p:cNvSpPr/>
+          <p:nvPr/>
+        </p:nvSpPr>
+        <p:spPr>
+          <a:xfrm>
+            <a:off x="197739" y="337751"/>
+            <a:ext cx="889686" cy="704335"/>
+          </a:xfrm>
+          <a:prstGeom prst="ellipse">
+            <a:avLst/>
+          </a:prstGeom>
+        </p:spPr>
+        <p:style>
+          <a:lnRef idx="1">
+            <a:schemeClr val="accent5"/>
+          </a:lnRef>
+          <a:fillRef idx="2">
+            <a:schemeClr val="accent5"/>
+          </a:fillRef>
+          <a:effectRef idx="1">
+            <a:schemeClr val="accent5"/>
+          </a:effectRef>
+          <a:fontRef idx="minor">
+            <a:schemeClr val="dk1"/>
+          </a:fontRef>
+        </p:style>
+        <p:txBody>
+          <a:bodyPr rtlCol="0" anchor="ctr"/>
+          <a:lstStyle/>
+          <a:p>
+            <a:pPr algn="ctr"/>
+            <a:r>
+              <a:rPr lang="en-US"/>
+              <a:t>Def. 1,1</a:t>
+            </a:r>
+          </a:p>
+        </p:txBody>
+      </p:sp>
+      <p:sp>
+        <p:nvSpPr>
+          <p:cNvPr id="8" name="Oval 7">
+            <a:extLst>
+              <a:ext uri="{FF2B5EF4-FFF2-40B4-BE49-F238E27FC236}">
+                <a16:creationId xmlns:a16="http://schemas.microsoft.com/office/drawing/2014/main" id="{94D6FCF9-1A7F-A142-BB51-AB185300A51C}"/>
+              </a:ext>
+            </a:extLst>
+          </p:cNvPr>
+          <p:cNvSpPr/>
+          <p:nvPr/>
+        </p:nvSpPr>
+        <p:spPr>
+          <a:xfrm>
+            <a:off x="1245474" y="580771"/>
+            <a:ext cx="889686" cy="704335"/>
+          </a:xfrm>
+          <a:prstGeom prst="ellipse">
+            <a:avLst/>
+          </a:prstGeom>
+        </p:spPr>
+        <p:style>
+          <a:lnRef idx="1">
+            <a:schemeClr val="accent5"/>
+          </a:lnRef>
+          <a:fillRef idx="2">
+            <a:schemeClr val="accent5"/>
+          </a:fillRef>
+          <a:effectRef idx="1">
+            <a:schemeClr val="accent5"/>
+          </a:effectRef>
+          <a:fontRef idx="minor">
+            <a:schemeClr val="dk1"/>
+          </a:fontRef>
+        </p:style>
+        <p:txBody>
+          <a:bodyPr rtlCol="0" anchor="ctr"/>
+          <a:lstStyle/>
+          <a:p>
+            <a:pPr algn="ctr"/>
+            <a:r>
+              <a:rPr lang="en-US"/>
+              <a:t>Def. 1,2</a:t>
+            </a:r>
+          </a:p>
+        </p:txBody>
+      </p:sp>
+      <p:sp>
+        <p:nvSpPr>
+          <p:cNvPr id="9" name="Oval 8">
+            <a:extLst>
+              <a:ext uri="{FF2B5EF4-FFF2-40B4-BE49-F238E27FC236}">
+                <a16:creationId xmlns:a16="http://schemas.microsoft.com/office/drawing/2014/main" id="{2790D075-13C2-C347-9403-0740D4F65874}"/>
+              </a:ext>
+            </a:extLst>
+          </p:cNvPr>
+          <p:cNvSpPr/>
+          <p:nvPr/>
+        </p:nvSpPr>
+        <p:spPr>
+          <a:xfrm>
+            <a:off x="2705372" y="300680"/>
+            <a:ext cx="889686" cy="704335"/>
+          </a:xfrm>
+          <a:prstGeom prst="ellipse">
+            <a:avLst/>
+          </a:prstGeom>
+        </p:spPr>
+        <p:style>
+          <a:lnRef idx="1">
+            <a:schemeClr val="accent5"/>
+          </a:lnRef>
+          <a:fillRef idx="2">
+            <a:schemeClr val="accent5"/>
+          </a:fillRef>
+          <a:effectRef idx="1">
+            <a:schemeClr val="accent5"/>
+          </a:effectRef>
+          <a:fontRef idx="minor">
+            <a:schemeClr val="dk1"/>
+          </a:fontRef>
+        </p:style>
+        <p:txBody>
+          <a:bodyPr rtlCol="0" anchor="ctr"/>
+          <a:lstStyle/>
+          <a:p>
+            <a:pPr algn="ctr"/>
+            <a:r>
+              <a:rPr lang="en-US"/>
+              <a:t>Def. 1,8</a:t>
+            </a:r>
+          </a:p>
+        </p:txBody>
+      </p:sp>
+      <p:sp>
+        <p:nvSpPr>
+          <p:cNvPr id="10" name="Oval 9">
+            <a:extLst>
+              <a:ext uri="{FF2B5EF4-FFF2-40B4-BE49-F238E27FC236}">
+                <a16:creationId xmlns:a16="http://schemas.microsoft.com/office/drawing/2014/main" id="{FB1EEE0F-550B-0240-B3E5-35DDEF14A90F}"/>
+              </a:ext>
+            </a:extLst>
+          </p:cNvPr>
+          <p:cNvSpPr/>
+          <p:nvPr/>
+        </p:nvSpPr>
+        <p:spPr>
+          <a:xfrm>
+            <a:off x="6569948" y="549700"/>
+            <a:ext cx="889686" cy="704335"/>
+          </a:xfrm>
+          <a:prstGeom prst="ellipse">
+            <a:avLst/>
+          </a:prstGeom>
+        </p:spPr>
+        <p:style>
+          <a:lnRef idx="1">
+            <a:schemeClr val="accent5"/>
+          </a:lnRef>
+          <a:fillRef idx="2">
+            <a:schemeClr val="accent5"/>
+          </a:fillRef>
+          <a:effectRef idx="1">
+            <a:schemeClr val="accent5"/>
+          </a:effectRef>
+          <a:fontRef idx="minor">
+            <a:schemeClr val="dk1"/>
+          </a:fontRef>
+        </p:style>
+        <p:txBody>
+          <a:bodyPr rtlCol="0" anchor="ctr"/>
+          <a:lstStyle/>
+          <a:p>
+            <a:pPr algn="ctr"/>
+            <a:r>
+              <a:rPr lang="en-US"/>
+              <a:t>Def. 2,1</a:t>
+            </a:r>
+          </a:p>
+        </p:txBody>
+      </p:sp>
+      <p:sp>
+        <p:nvSpPr>
+          <p:cNvPr id="11" name="Oval 10">
+            <a:extLst>
+              <a:ext uri="{FF2B5EF4-FFF2-40B4-BE49-F238E27FC236}">
+                <a16:creationId xmlns:a16="http://schemas.microsoft.com/office/drawing/2014/main" id="{C6BE791C-99A4-8F4D-A04C-05B295A62934}"/>
+              </a:ext>
+            </a:extLst>
+          </p:cNvPr>
+          <p:cNvSpPr/>
+          <p:nvPr/>
+        </p:nvSpPr>
+        <p:spPr>
+          <a:xfrm>
+            <a:off x="7664552" y="901867"/>
+            <a:ext cx="889686" cy="704335"/>
+          </a:xfrm>
+          <a:prstGeom prst="ellipse">
+            <a:avLst/>
+          </a:prstGeom>
+        </p:spPr>
+        <p:style>
+          <a:lnRef idx="1">
+            <a:schemeClr val="accent5"/>
+          </a:lnRef>
+          <a:fillRef idx="2">
+            <a:schemeClr val="accent5"/>
+          </a:fillRef>
+          <a:effectRef idx="1">
+            <a:schemeClr val="accent5"/>
+          </a:effectRef>
+          <a:fontRef idx="minor">
+            <a:schemeClr val="dk1"/>
+          </a:fontRef>
+        </p:style>
+        <p:txBody>
+          <a:bodyPr rtlCol="0" anchor="ctr"/>
+          <a:lstStyle/>
+          <a:p>
+            <a:pPr algn="ctr"/>
+            <a:r>
+              <a:rPr lang="en-US"/>
+              <a:t>Def. 2,2</a:t>
+            </a:r>
+          </a:p>
+        </p:txBody>
+      </p:sp>
+      <p:sp>
+        <p:nvSpPr>
+          <p:cNvPr id="12" name="Oval 11">
+            <a:extLst>
+              <a:ext uri="{FF2B5EF4-FFF2-40B4-BE49-F238E27FC236}">
+                <a16:creationId xmlns:a16="http://schemas.microsoft.com/office/drawing/2014/main" id="{E933661C-109E-2846-9B9C-81D797E03499}"/>
+              </a:ext>
+            </a:extLst>
+          </p:cNvPr>
+          <p:cNvSpPr/>
+          <p:nvPr/>
+        </p:nvSpPr>
+        <p:spPr>
+          <a:xfrm>
+            <a:off x="610078" y="2821452"/>
+            <a:ext cx="889686" cy="704335"/>
+          </a:xfrm>
+          <a:prstGeom prst="ellipse">
+            <a:avLst/>
+          </a:prstGeom>
+        </p:spPr>
+        <p:style>
+          <a:lnRef idx="1">
+            <a:schemeClr val="accent5"/>
+          </a:lnRef>
+          <a:fillRef idx="3">
+            <a:schemeClr val="accent5"/>
+          </a:fillRef>
+          <a:effectRef idx="2">
+            <a:schemeClr val="accent5"/>
           </a:effectRef>
           <a:fontRef idx="minor">
             <a:schemeClr val="lt1"/>
@@ -4669,16 +3819,19 @@
           <a:lstStyle/>
           <a:p>
             <a:pPr algn="ctr"/>
-            <a:endParaRPr lang="en-US"/>
-          </a:p>
-        </p:txBody>
-      </p:sp>
-      <p:sp>
-        <p:nvSpPr>
-          <p:cNvPr id="4" name="Oval 3">
-            <a:extLst>
-              <a:ext uri="{FF2B5EF4-FFF2-40B4-BE49-F238E27FC236}">
-                <a16:creationId xmlns:a16="http://schemas.microsoft.com/office/drawing/2014/main" id="{D43BD5E3-D73C-D54F-93B0-944915FC767C}"/>
+            <a:r>
+              <a:rPr lang="en-US"/>
+              <a:t>Ex. 1,1</a:t>
+            </a:r>
+          </a:p>
+        </p:txBody>
+      </p:sp>
+      <p:sp>
+        <p:nvSpPr>
+          <p:cNvPr id="13" name="Oval 12">
+            <a:extLst>
+              <a:ext uri="{FF2B5EF4-FFF2-40B4-BE49-F238E27FC236}">
+                <a16:creationId xmlns:a16="http://schemas.microsoft.com/office/drawing/2014/main" id="{BB407A9B-2A37-6B45-B74A-F806A97AB9C4}"/>
               </a:ext>
             </a:extLst>
           </p:cNvPr>
@@ -4687,24 +3840,22 @@
         </p:nvSpPr>
         <p:spPr>
           <a:xfrm>
-            <a:off x="4736757" y="2421924"/>
-            <a:ext cx="1445740" cy="1445741"/>
+            <a:off x="1751018" y="3358971"/>
+            <a:ext cx="889686" cy="704335"/>
           </a:xfrm>
           <a:prstGeom prst="ellipse">
             <a:avLst/>
           </a:prstGeom>
         </p:spPr>
         <p:style>
-          <a:lnRef idx="2">
-            <a:schemeClr val="accent1">
-              <a:shade val="50000"/>
-            </a:schemeClr>
+          <a:lnRef idx="1">
+            <a:schemeClr val="accent5"/>
           </a:lnRef>
-          <a:fillRef idx="1">
-            <a:schemeClr val="accent1"/>
+          <a:fillRef idx="3">
+            <a:schemeClr val="accent5"/>
           </a:fillRef>
-          <a:effectRef idx="0">
-            <a:schemeClr val="accent1"/>
+          <a:effectRef idx="2">
+            <a:schemeClr val="accent5"/>
           </a:effectRef>
           <a:fontRef idx="minor">
             <a:schemeClr val="lt1"/>
@@ -4717,17 +3868,17 @@
             <a:pPr algn="ctr"/>
             <a:r>
               <a:rPr lang="en-US"/>
-              <a:t>wide</a:t>
-            </a:r>
-          </a:p>
-        </p:txBody>
-      </p:sp>
-      <p:sp>
-        <p:nvSpPr>
-          <p:cNvPr id="5" name="Rectangle 4">
-            <a:extLst>
-              <a:ext uri="{FF2B5EF4-FFF2-40B4-BE49-F238E27FC236}">
-                <a16:creationId xmlns:a16="http://schemas.microsoft.com/office/drawing/2014/main" id="{1F12ABAB-49CD-E041-B703-3599C5761A5E}"/>
+              <a:t>Ex. 1,2</a:t>
+            </a:r>
+          </a:p>
+        </p:txBody>
+      </p:sp>
+      <p:sp>
+        <p:nvSpPr>
+          <p:cNvPr id="14" name="Oval 13">
+            <a:extLst>
+              <a:ext uri="{FF2B5EF4-FFF2-40B4-BE49-F238E27FC236}">
+                <a16:creationId xmlns:a16="http://schemas.microsoft.com/office/drawing/2014/main" id="{1928B82E-10EB-9B4C-9051-35858A549285}"/>
               </a:ext>
             </a:extLst>
           </p:cNvPr>
@@ -4736,24 +3887,22 @@
         </p:nvSpPr>
         <p:spPr>
           <a:xfrm>
-            <a:off x="7760043" y="3429000"/>
-            <a:ext cx="1260389" cy="624016"/>
-          </a:xfrm>
-          <a:prstGeom prst="rect">
+            <a:off x="2719411" y="4143637"/>
+            <a:ext cx="889686" cy="704335"/>
+          </a:xfrm>
+          <a:prstGeom prst="ellipse">
             <a:avLst/>
           </a:prstGeom>
         </p:spPr>
         <p:style>
-          <a:lnRef idx="2">
-            <a:schemeClr val="accent1">
-              <a:shade val="50000"/>
-            </a:schemeClr>
+          <a:lnRef idx="1">
+            <a:schemeClr val="accent5"/>
           </a:lnRef>
-          <a:fillRef idx="1">
-            <a:schemeClr val="accent1"/>
+          <a:fillRef idx="3">
+            <a:schemeClr val="accent5"/>
           </a:fillRef>
-          <a:effectRef idx="0">
-            <a:schemeClr val="accent1"/>
+          <a:effectRef idx="2">
+            <a:schemeClr val="accent5"/>
           </a:effectRef>
           <a:fontRef idx="minor">
             <a:schemeClr val="lt1"/>
@@ -4766,17 +3915,17 @@
             <a:pPr algn="ctr"/>
             <a:r>
               <a:rPr lang="en-US"/>
-              <a:t>Definition:Wide</a:t>
-            </a:r>
-          </a:p>
-        </p:txBody>
-      </p:sp>
-      <p:sp>
-        <p:nvSpPr>
-          <p:cNvPr id="6" name="Rectangle 5">
-            <a:extLst>
-              <a:ext uri="{FF2B5EF4-FFF2-40B4-BE49-F238E27FC236}">
-                <a16:creationId xmlns:a16="http://schemas.microsoft.com/office/drawing/2014/main" id="{C9872CA2-3EC2-734E-A0D3-C89DF3F91027}"/>
+              <a:t>Ex. 1,10</a:t>
+            </a:r>
+          </a:p>
+        </p:txBody>
+      </p:sp>
+      <p:sp>
+        <p:nvSpPr>
+          <p:cNvPr id="15" name="Oval 14">
+            <a:extLst>
+              <a:ext uri="{FF2B5EF4-FFF2-40B4-BE49-F238E27FC236}">
+                <a16:creationId xmlns:a16="http://schemas.microsoft.com/office/drawing/2014/main" id="{4B3A3DA1-3524-6947-AEC8-7B51B2E19083}"/>
               </a:ext>
             </a:extLst>
           </p:cNvPr>
@@ -4785,24 +3934,22 @@
         </p:nvSpPr>
         <p:spPr>
           <a:xfrm>
-            <a:off x="6849761" y="4458729"/>
-            <a:ext cx="1260389" cy="624016"/>
-          </a:xfrm>
-          <a:prstGeom prst="rect">
+            <a:off x="6078767" y="3210523"/>
+            <a:ext cx="889686" cy="704335"/>
+          </a:xfrm>
+          <a:prstGeom prst="ellipse">
             <a:avLst/>
           </a:prstGeom>
         </p:spPr>
         <p:style>
-          <a:lnRef idx="2">
-            <a:schemeClr val="accent1">
-              <a:shade val="50000"/>
-            </a:schemeClr>
+          <a:lnRef idx="1">
+            <a:schemeClr val="accent5"/>
           </a:lnRef>
-          <a:fillRef idx="1">
-            <a:schemeClr val="accent1"/>
+          <a:fillRef idx="3">
+            <a:schemeClr val="accent5"/>
           </a:fillRef>
-          <a:effectRef idx="0">
-            <a:schemeClr val="accent1"/>
+          <a:effectRef idx="2">
+            <a:schemeClr val="accent5"/>
           </a:effectRef>
           <a:fontRef idx="minor">
             <a:schemeClr val="lt1"/>
@@ -4815,17 +3962,17 @@
             <a:pPr algn="ctr"/>
             <a:r>
               <a:rPr lang="en-US"/>
-              <a:t>Definition:Wide</a:t>
-            </a:r>
-          </a:p>
-        </p:txBody>
-      </p:sp>
-      <p:sp>
-        <p:nvSpPr>
-          <p:cNvPr id="7" name="Rectangle 6">
-            <a:extLst>
-              <a:ext uri="{FF2B5EF4-FFF2-40B4-BE49-F238E27FC236}">
-                <a16:creationId xmlns:a16="http://schemas.microsoft.com/office/drawing/2014/main" id="{5EA6ED24-410A-F945-BADD-C4D4048C81CF}"/>
+              <a:t>Ex. 2,1</a:t>
+            </a:r>
+          </a:p>
+        </p:txBody>
+      </p:sp>
+      <p:sp>
+        <p:nvSpPr>
+          <p:cNvPr id="16" name="Oval 15">
+            <a:extLst>
+              <a:ext uri="{FF2B5EF4-FFF2-40B4-BE49-F238E27FC236}">
+                <a16:creationId xmlns:a16="http://schemas.microsoft.com/office/drawing/2014/main" id="{34646155-B817-374A-A232-C0B892632DB7}"/>
               </a:ext>
             </a:extLst>
           </p:cNvPr>
@@ -4834,24 +3981,22 @@
         </p:nvSpPr>
         <p:spPr>
           <a:xfrm>
-            <a:off x="3023285" y="718750"/>
-            <a:ext cx="1260389" cy="624016"/>
-          </a:xfrm>
-          <a:prstGeom prst="rect">
+            <a:off x="7123428" y="3708917"/>
+            <a:ext cx="889686" cy="704335"/>
+          </a:xfrm>
+          <a:prstGeom prst="ellipse">
             <a:avLst/>
           </a:prstGeom>
         </p:spPr>
         <p:style>
-          <a:lnRef idx="2">
-            <a:schemeClr val="accent1">
-              <a:shade val="50000"/>
-            </a:schemeClr>
+          <a:lnRef idx="1">
+            <a:schemeClr val="accent5"/>
           </a:lnRef>
-          <a:fillRef idx="1">
-            <a:schemeClr val="accent1"/>
+          <a:fillRef idx="3">
+            <a:schemeClr val="accent5"/>
           </a:fillRef>
-          <a:effectRef idx="0">
-            <a:schemeClr val="accent1"/>
+          <a:effectRef idx="2">
+            <a:schemeClr val="accent5"/>
           </a:effectRef>
           <a:fontRef idx="minor">
             <a:schemeClr val="lt1"/>
@@ -4864,442 +4009,31 @@
             <a:pPr algn="ctr"/>
             <a:r>
               <a:rPr lang="en-US"/>
-              <a:t>Definition:Wide</a:t>
+              <a:t>Ex. 2,2</a:t>
             </a:r>
           </a:p>
         </p:txBody>
       </p:sp>
       <p:cxnSp>
         <p:nvCxnSpPr>
-          <p:cNvPr id="9" name="Straight Arrow Connector 8">
-            <a:extLst>
-              <a:ext uri="{FF2B5EF4-FFF2-40B4-BE49-F238E27FC236}">
-                <a16:creationId xmlns:a16="http://schemas.microsoft.com/office/drawing/2014/main" id="{585BE030-C2A3-8C40-8A91-F1E4E7FEBC36}"/>
+          <p:cNvPr id="19" name="Straight Arrow Connector 18">
+            <a:extLst>
+              <a:ext uri="{FF2B5EF4-FFF2-40B4-BE49-F238E27FC236}">
+                <a16:creationId xmlns:a16="http://schemas.microsoft.com/office/drawing/2014/main" id="{57242243-82A7-9E4D-BE25-79B9DDF8054D}"/>
               </a:ext>
             </a:extLst>
           </p:cNvPr>
           <p:cNvCxnSpPr>
             <a:cxnSpLocks/>
-            <a:stCxn id="4" idx="1"/>
-            <a:endCxn id="7" idx="2"/>
+            <a:stCxn id="7" idx="5"/>
+            <a:endCxn id="4" idx="4"/>
           </p:cNvCxnSpPr>
           <p:nvPr/>
         </p:nvCxnSpPr>
         <p:spPr>
-          <a:xfrm flipH="1" flipV="1">
-            <a:off x="3653480" y="1342766"/>
-            <a:ext cx="1295001" cy="1290882"/>
-          </a:xfrm>
-          <a:prstGeom prst="straightConnector1">
-            <a:avLst/>
-          </a:prstGeom>
-          <a:ln>
-            <a:tailEnd type="triangle"/>
-          </a:ln>
-        </p:spPr>
-        <p:style>
-          <a:lnRef idx="2">
-            <a:schemeClr val="dk1"/>
-          </a:lnRef>
-          <a:fillRef idx="0">
-            <a:schemeClr val="dk1"/>
-          </a:fillRef>
-          <a:effectRef idx="1">
-            <a:schemeClr val="dk1"/>
-          </a:effectRef>
-          <a:fontRef idx="minor">
-            <a:schemeClr val="tx1"/>
-          </a:fontRef>
-        </p:style>
-      </p:cxnSp>
-      <p:cxnSp>
-        <p:nvCxnSpPr>
-          <p:cNvPr id="10" name="Straight Arrow Connector 9">
-            <a:extLst>
-              <a:ext uri="{FF2B5EF4-FFF2-40B4-BE49-F238E27FC236}">
-                <a16:creationId xmlns:a16="http://schemas.microsoft.com/office/drawing/2014/main" id="{16468C25-7DE7-6540-B5A8-D7970B6D391A}"/>
-              </a:ext>
-            </a:extLst>
-          </p:cNvPr>
-          <p:cNvCxnSpPr>
-            <a:cxnSpLocks/>
-            <a:stCxn id="4" idx="6"/>
-            <a:endCxn id="5" idx="1"/>
-          </p:cNvCxnSpPr>
-          <p:nvPr/>
-        </p:nvCxnSpPr>
-        <p:spPr>
           <a:xfrm>
-            <a:off x="6182497" y="3144795"/>
-            <a:ext cx="1577546" cy="596213"/>
-          </a:xfrm>
-          <a:prstGeom prst="straightConnector1">
-            <a:avLst/>
-          </a:prstGeom>
-          <a:ln>
-            <a:tailEnd type="triangle"/>
-          </a:ln>
-        </p:spPr>
-        <p:style>
-          <a:lnRef idx="2">
-            <a:schemeClr val="dk1"/>
-          </a:lnRef>
-          <a:fillRef idx="0">
-            <a:schemeClr val="dk1"/>
-          </a:fillRef>
-          <a:effectRef idx="1">
-            <a:schemeClr val="dk1"/>
-          </a:effectRef>
-          <a:fontRef idx="minor">
-            <a:schemeClr val="tx1"/>
-          </a:fontRef>
-        </p:style>
-      </p:cxnSp>
-      <p:cxnSp>
-        <p:nvCxnSpPr>
-          <p:cNvPr id="15" name="Straight Arrow Connector 14">
-            <a:extLst>
-              <a:ext uri="{FF2B5EF4-FFF2-40B4-BE49-F238E27FC236}">
-                <a16:creationId xmlns:a16="http://schemas.microsoft.com/office/drawing/2014/main" id="{2BB32905-A8DF-124F-8511-E19B12A0BDD2}"/>
-              </a:ext>
-            </a:extLst>
-          </p:cNvPr>
-          <p:cNvCxnSpPr>
-            <a:cxnSpLocks/>
-            <a:stCxn id="4" idx="5"/>
-            <a:endCxn id="6" idx="0"/>
-          </p:cNvCxnSpPr>
-          <p:nvPr/>
-        </p:nvCxnSpPr>
-        <p:spPr>
-          <a:xfrm>
-            <a:off x="5970773" y="3655941"/>
-            <a:ext cx="1509183" cy="802788"/>
-          </a:xfrm>
-          <a:prstGeom prst="straightConnector1">
-            <a:avLst/>
-          </a:prstGeom>
-          <a:ln>
-            <a:tailEnd type="triangle"/>
-          </a:ln>
-        </p:spPr>
-        <p:style>
-          <a:lnRef idx="2">
-            <a:schemeClr val="dk1"/>
-          </a:lnRef>
-          <a:fillRef idx="0">
-            <a:schemeClr val="dk1"/>
-          </a:fillRef>
-          <a:effectRef idx="1">
-            <a:schemeClr val="dk1"/>
-          </a:effectRef>
-          <a:fontRef idx="minor">
-            <a:schemeClr val="tx1"/>
-          </a:fontRef>
-        </p:style>
-      </p:cxnSp>
-      <p:sp>
-        <p:nvSpPr>
-          <p:cNvPr id="18" name="TextBox 17">
-            <a:extLst>
-              <a:ext uri="{FF2B5EF4-FFF2-40B4-BE49-F238E27FC236}">
-                <a16:creationId xmlns:a16="http://schemas.microsoft.com/office/drawing/2014/main" id="{6563134B-3F21-A141-943A-092F83D17179}"/>
-              </a:ext>
-            </a:extLst>
-          </p:cNvPr>
-          <p:cNvSpPr txBox="1"/>
-          <p:nvPr/>
-        </p:nvSpPr>
-        <p:spPr>
-          <a:xfrm>
-            <a:off x="6465873" y="5488458"/>
-            <a:ext cx="2295068" cy="1200329"/>
-          </a:xfrm>
-          <a:prstGeom prst="rect">
-            <a:avLst/>
-          </a:prstGeom>
-        </p:spPr>
-        <p:style>
-          <a:lnRef idx="2">
-            <a:schemeClr val="dk1"/>
-          </a:lnRef>
-          <a:fillRef idx="1">
-            <a:schemeClr val="lt1"/>
-          </a:fillRef>
-          <a:effectRef idx="0">
-            <a:schemeClr val="dk1"/>
-          </a:effectRef>
-          <a:fontRef idx="minor">
-            <a:schemeClr val="dk1"/>
-          </a:fontRef>
-        </p:style>
-        <p:txBody>
-          <a:bodyPr wrap="square" rtlCol="0">
-            <a:spAutoFit/>
-          </a:bodyPr>
-          <a:lstStyle/>
-          <a:p>
-            <a:r>
-              <a:rPr lang="en-US"/>
-              <a:t>Pre-trained word embeddings (e.g. Bert) </a:t>
-            </a:r>
-            <a:br>
-              <a:rPr lang="en-US"/>
-            </a:br>
-            <a:r>
-              <a:rPr lang="en-US">
-                <a:sym typeface="Wingdings" pitchFamily="2" charset="2"/>
-              </a:rPr>
-              <a:t> doc2vec</a:t>
-            </a:r>
-            <a:endParaRPr lang="en-US"/>
-          </a:p>
-        </p:txBody>
-      </p:sp>
-      <p:cxnSp>
-        <p:nvCxnSpPr>
-          <p:cNvPr id="20" name="Straight Arrow Connector 19">
-            <a:extLst>
-              <a:ext uri="{FF2B5EF4-FFF2-40B4-BE49-F238E27FC236}">
-                <a16:creationId xmlns:a16="http://schemas.microsoft.com/office/drawing/2014/main" id="{42D94457-2CBE-DB44-A823-51FE646B8F3E}"/>
-              </a:ext>
-            </a:extLst>
-          </p:cNvPr>
-          <p:cNvCxnSpPr>
-            <a:stCxn id="18" idx="0"/>
-            <a:endCxn id="6" idx="2"/>
-          </p:cNvCxnSpPr>
-          <p:nvPr/>
-        </p:nvCxnSpPr>
-        <p:spPr>
-          <a:xfrm flipH="1" flipV="1">
-            <a:off x="7479956" y="5082745"/>
-            <a:ext cx="133451" cy="405713"/>
-          </a:xfrm>
-          <a:prstGeom prst="straightConnector1">
-            <a:avLst/>
-          </a:prstGeom>
-          <a:ln>
-            <a:tailEnd type="triangle"/>
-          </a:ln>
-        </p:spPr>
-        <p:style>
-          <a:lnRef idx="1">
-            <a:schemeClr val="accent1"/>
-          </a:lnRef>
-          <a:fillRef idx="0">
-            <a:schemeClr val="accent1"/>
-          </a:fillRef>
-          <a:effectRef idx="0">
-            <a:schemeClr val="accent1"/>
-          </a:effectRef>
-          <a:fontRef idx="minor">
-            <a:schemeClr val="tx1"/>
-          </a:fontRef>
-        </p:style>
-      </p:cxnSp>
-      <p:sp>
-        <p:nvSpPr>
-          <p:cNvPr id="21" name="Snip Diagonal Corner of Rectangle 20">
-            <a:extLst>
-              <a:ext uri="{FF2B5EF4-FFF2-40B4-BE49-F238E27FC236}">
-                <a16:creationId xmlns:a16="http://schemas.microsoft.com/office/drawing/2014/main" id="{26BE3A8B-6ABD-F746-A2B6-66DF83209434}"/>
-              </a:ext>
-            </a:extLst>
-          </p:cNvPr>
-          <p:cNvSpPr/>
-          <p:nvPr/>
-        </p:nvSpPr>
-        <p:spPr>
-          <a:xfrm>
-            <a:off x="1223319" y="4365024"/>
-            <a:ext cx="1799966" cy="717721"/>
-          </a:xfrm>
-          <a:prstGeom prst="snip2DiagRect">
-            <a:avLst/>
-          </a:prstGeom>
-        </p:spPr>
-        <p:style>
-          <a:lnRef idx="2">
-            <a:schemeClr val="accent1">
-              <a:shade val="50000"/>
-            </a:schemeClr>
-          </a:lnRef>
-          <a:fillRef idx="1">
-            <a:schemeClr val="accent1"/>
-          </a:fillRef>
-          <a:effectRef idx="0">
-            <a:schemeClr val="accent1"/>
-          </a:effectRef>
-          <a:fontRef idx="minor">
-            <a:schemeClr val="lt1"/>
-          </a:fontRef>
-        </p:style>
-        <p:txBody>
-          <a:bodyPr rtlCol="0" anchor="ctr"/>
-          <a:lstStyle/>
-          <a:p>
-            <a:pPr algn="ctr"/>
-            <a:r>
-              <a:rPr lang="en-US"/>
-              <a:t>Example 1:</a:t>
-            </a:r>
-            <a:br>
-              <a:rPr lang="en-US"/>
-            </a:br>
-            <a:r>
-              <a:rPr lang="en-US"/>
-              <a:t> </a:t>
-            </a:r>
-            <a:r>
-              <a:rPr lang="en-US" sz="1200"/>
-              <a:t>“surely shoots wide bow hand”</a:t>
-            </a:r>
-          </a:p>
-        </p:txBody>
-      </p:sp>
-      <p:sp>
-        <p:nvSpPr>
-          <p:cNvPr id="22" name="Snip Diagonal Corner of Rectangle 21">
-            <a:extLst>
-              <a:ext uri="{FF2B5EF4-FFF2-40B4-BE49-F238E27FC236}">
-                <a16:creationId xmlns:a16="http://schemas.microsoft.com/office/drawing/2014/main" id="{03FFFF54-9ACB-C840-8492-CD56692A8258}"/>
-              </a:ext>
-            </a:extLst>
-          </p:cNvPr>
-          <p:cNvSpPr/>
-          <p:nvPr/>
-        </p:nvSpPr>
-        <p:spPr>
-          <a:xfrm>
-            <a:off x="1223319" y="3297080"/>
-            <a:ext cx="1799966" cy="717721"/>
-          </a:xfrm>
-          <a:prstGeom prst="snip2DiagRect">
-            <a:avLst/>
-          </a:prstGeom>
-        </p:spPr>
-        <p:style>
-          <a:lnRef idx="2">
-            <a:schemeClr val="accent1">
-              <a:shade val="50000"/>
-            </a:schemeClr>
-          </a:lnRef>
-          <a:fillRef idx="1">
-            <a:schemeClr val="accent1"/>
-          </a:fillRef>
-          <a:effectRef idx="0">
-            <a:schemeClr val="accent1"/>
-          </a:effectRef>
-          <a:fontRef idx="minor">
-            <a:schemeClr val="lt1"/>
-          </a:fontRef>
-        </p:style>
-        <p:txBody>
-          <a:bodyPr rtlCol="0" anchor="ctr"/>
-          <a:lstStyle/>
-          <a:p>
-            <a:pPr algn="ctr"/>
-            <a:r>
-              <a:rPr lang="en-US"/>
-              <a:t>Example 2: </a:t>
-            </a:r>
-            <a:br>
-              <a:rPr lang="en-US"/>
-            </a:br>
-            <a:r>
-              <a:rPr lang="en-US"/>
-              <a:t>“</a:t>
-            </a:r>
-            <a:r>
-              <a:rPr lang="en-US" sz="1200"/>
-              <a:t>wide plains</a:t>
-            </a:r>
-            <a:r>
-              <a:rPr lang="en-US"/>
-              <a:t>”</a:t>
-            </a:r>
-          </a:p>
-        </p:txBody>
-      </p:sp>
-      <p:sp>
-        <p:nvSpPr>
-          <p:cNvPr id="23" name="TextBox 22">
-            <a:extLst>
-              <a:ext uri="{FF2B5EF4-FFF2-40B4-BE49-F238E27FC236}">
-                <a16:creationId xmlns:a16="http://schemas.microsoft.com/office/drawing/2014/main" id="{24515796-A3A4-984B-8D4C-EB5B1CF9FD90}"/>
-              </a:ext>
-            </a:extLst>
-          </p:cNvPr>
-          <p:cNvSpPr txBox="1"/>
-          <p:nvPr/>
-        </p:nvSpPr>
-        <p:spPr>
-          <a:xfrm>
-            <a:off x="975768" y="5488457"/>
-            <a:ext cx="2295068" cy="1200329"/>
-          </a:xfrm>
-          <a:prstGeom prst="rect">
-            <a:avLst/>
-          </a:prstGeom>
-        </p:spPr>
-        <p:style>
-          <a:lnRef idx="2">
-            <a:schemeClr val="dk1"/>
-          </a:lnRef>
-          <a:fillRef idx="1">
-            <a:schemeClr val="lt1"/>
-          </a:fillRef>
-          <a:effectRef idx="0">
-            <a:schemeClr val="dk1"/>
-          </a:effectRef>
-          <a:fontRef idx="minor">
-            <a:schemeClr val="dk1"/>
-          </a:fontRef>
-        </p:style>
-        <p:txBody>
-          <a:bodyPr wrap="square" rtlCol="0">
-            <a:spAutoFit/>
-          </a:bodyPr>
-          <a:lstStyle/>
-          <a:p>
-            <a:r>
-              <a:rPr lang="en-US"/>
-              <a:t>Pre-trained word embeddings </a:t>
-            </a:r>
-            <a:r>
-              <a:rPr lang="en-US">
-                <a:sym typeface="Wingdings" pitchFamily="2" charset="2"/>
-              </a:rPr>
-              <a:t> </a:t>
-            </a:r>
-            <a:r>
-              <a:rPr lang="en-US"/>
-              <a:t>Skip-gram around the target word</a:t>
-            </a:r>
-          </a:p>
-        </p:txBody>
-      </p:sp>
-      <p:cxnSp>
-        <p:nvCxnSpPr>
-          <p:cNvPr id="24" name="Straight Arrow Connector 23">
-            <a:extLst>
-              <a:ext uri="{FF2B5EF4-FFF2-40B4-BE49-F238E27FC236}">
-                <a16:creationId xmlns:a16="http://schemas.microsoft.com/office/drawing/2014/main" id="{D04106F5-19FC-CC46-8FF2-2BF4F365B0C0}"/>
-              </a:ext>
-            </a:extLst>
-          </p:cNvPr>
-          <p:cNvCxnSpPr>
-            <a:cxnSpLocks/>
-            <a:stCxn id="23" idx="0"/>
-            <a:endCxn id="21" idx="1"/>
-          </p:cNvCxnSpPr>
-          <p:nvPr/>
-        </p:nvCxnSpPr>
-        <p:spPr>
-          <a:xfrm flipV="1">
-            <a:off x="2123302" y="5082745"/>
-            <a:ext cx="0" cy="405712"/>
+            <a:off x="957134" y="938939"/>
+            <a:ext cx="733033" cy="880590"/>
           </a:xfrm>
           <a:prstGeom prst="straightConnector1">
             <a:avLst/>
@@ -5325,24 +4059,196 @@
       </p:cxnSp>
       <p:cxnSp>
         <p:nvCxnSpPr>
-          <p:cNvPr id="29" name="Straight Arrow Connector 28">
-            <a:extLst>
-              <a:ext uri="{FF2B5EF4-FFF2-40B4-BE49-F238E27FC236}">
-                <a16:creationId xmlns:a16="http://schemas.microsoft.com/office/drawing/2014/main" id="{E057FDE1-A682-774D-91ED-338B17C1CDE4}"/>
+          <p:cNvPr id="21" name="Straight Arrow Connector 20">
+            <a:extLst>
+              <a:ext uri="{FF2B5EF4-FFF2-40B4-BE49-F238E27FC236}">
+                <a16:creationId xmlns:a16="http://schemas.microsoft.com/office/drawing/2014/main" id="{2CC2FD02-87A6-7445-B7DF-8DA0E85D885E}"/>
               </a:ext>
             </a:extLst>
           </p:cNvPr>
           <p:cNvCxnSpPr>
             <a:cxnSpLocks/>
-            <a:stCxn id="4" idx="3"/>
-            <a:endCxn id="21" idx="0"/>
+            <a:stCxn id="8" idx="4"/>
+            <a:endCxn id="4" idx="4"/>
           </p:cNvCxnSpPr>
           <p:nvPr/>
         </p:nvCxnSpPr>
         <p:spPr>
           <a:xfrm flipH="1">
-            <a:off x="3023285" y="3655941"/>
-            <a:ext cx="1925196" cy="1067944"/>
+            <a:off x="1690167" y="1285106"/>
+            <a:ext cx="150" cy="534423"/>
+          </a:xfrm>
+          <a:prstGeom prst="straightConnector1">
+            <a:avLst/>
+          </a:prstGeom>
+          <a:ln>
+            <a:tailEnd type="triangle"/>
+          </a:ln>
+        </p:spPr>
+        <p:style>
+          <a:lnRef idx="1">
+            <a:schemeClr val="accent1"/>
+          </a:lnRef>
+          <a:fillRef idx="0">
+            <a:schemeClr val="accent1"/>
+          </a:fillRef>
+          <a:effectRef idx="0">
+            <a:schemeClr val="accent1"/>
+          </a:effectRef>
+          <a:fontRef idx="minor">
+            <a:schemeClr val="tx1"/>
+          </a:fontRef>
+        </p:style>
+      </p:cxnSp>
+      <p:cxnSp>
+        <p:nvCxnSpPr>
+          <p:cNvPr id="24" name="Straight Arrow Connector 23">
+            <a:extLst>
+              <a:ext uri="{FF2B5EF4-FFF2-40B4-BE49-F238E27FC236}">
+                <a16:creationId xmlns:a16="http://schemas.microsoft.com/office/drawing/2014/main" id="{DD9DE5AF-DBCF-A840-9FFE-B8472BE61B06}"/>
+              </a:ext>
+            </a:extLst>
+          </p:cNvPr>
+          <p:cNvCxnSpPr>
+            <a:cxnSpLocks/>
+            <a:stCxn id="9" idx="3"/>
+            <a:endCxn id="4" idx="5"/>
+          </p:cNvCxnSpPr>
+          <p:nvPr/>
+        </p:nvCxnSpPr>
+        <p:spPr>
+          <a:xfrm flipH="1">
+            <a:off x="2514494" y="901868"/>
+            <a:ext cx="321169" cy="917661"/>
+          </a:xfrm>
+          <a:prstGeom prst="straightConnector1">
+            <a:avLst/>
+          </a:prstGeom>
+          <a:ln>
+            <a:tailEnd type="triangle"/>
+          </a:ln>
+        </p:spPr>
+        <p:style>
+          <a:lnRef idx="1">
+            <a:schemeClr val="accent1"/>
+          </a:lnRef>
+          <a:fillRef idx="0">
+            <a:schemeClr val="accent1"/>
+          </a:fillRef>
+          <a:effectRef idx="0">
+            <a:schemeClr val="accent1"/>
+          </a:effectRef>
+          <a:fontRef idx="minor">
+            <a:schemeClr val="tx1"/>
+          </a:fontRef>
+        </p:style>
+      </p:cxnSp>
+      <p:cxnSp>
+        <p:nvCxnSpPr>
+          <p:cNvPr id="26" name="Straight Arrow Connector 25">
+            <a:extLst>
+              <a:ext uri="{FF2B5EF4-FFF2-40B4-BE49-F238E27FC236}">
+                <a16:creationId xmlns:a16="http://schemas.microsoft.com/office/drawing/2014/main" id="{BFC77110-2ABC-564B-B7D2-77DA3A0028E0}"/>
+              </a:ext>
+            </a:extLst>
+          </p:cNvPr>
+          <p:cNvCxnSpPr>
+            <a:cxnSpLocks/>
+            <a:stCxn id="10" idx="3"/>
+            <a:endCxn id="5" idx="4"/>
+          </p:cNvCxnSpPr>
+          <p:nvPr/>
+        </p:nvCxnSpPr>
+        <p:spPr>
+          <a:xfrm>
+            <a:off x="6700239" y="1150888"/>
+            <a:ext cx="132563" cy="822749"/>
+          </a:xfrm>
+          <a:prstGeom prst="straightConnector1">
+            <a:avLst/>
+          </a:prstGeom>
+          <a:ln>
+            <a:tailEnd type="triangle"/>
+          </a:ln>
+        </p:spPr>
+        <p:style>
+          <a:lnRef idx="1">
+            <a:schemeClr val="accent1"/>
+          </a:lnRef>
+          <a:fillRef idx="0">
+            <a:schemeClr val="accent1"/>
+          </a:fillRef>
+          <a:effectRef idx="0">
+            <a:schemeClr val="accent1"/>
+          </a:effectRef>
+          <a:fontRef idx="minor">
+            <a:schemeClr val="tx1"/>
+          </a:fontRef>
+        </p:style>
+      </p:cxnSp>
+      <p:cxnSp>
+        <p:nvCxnSpPr>
+          <p:cNvPr id="28" name="Straight Arrow Connector 27">
+            <a:extLst>
+              <a:ext uri="{FF2B5EF4-FFF2-40B4-BE49-F238E27FC236}">
+                <a16:creationId xmlns:a16="http://schemas.microsoft.com/office/drawing/2014/main" id="{14B706C4-1BA8-C241-8C6A-756B362B5039}"/>
+              </a:ext>
+            </a:extLst>
+          </p:cNvPr>
+          <p:cNvCxnSpPr>
+            <a:cxnSpLocks/>
+            <a:stCxn id="11" idx="3"/>
+            <a:endCxn id="5" idx="5"/>
+          </p:cNvCxnSpPr>
+          <p:nvPr/>
+        </p:nvCxnSpPr>
+        <p:spPr>
+          <a:xfrm flipH="1">
+            <a:off x="7666880" y="1503055"/>
+            <a:ext cx="127963" cy="470582"/>
+          </a:xfrm>
+          <a:prstGeom prst="straightConnector1">
+            <a:avLst/>
+          </a:prstGeom>
+          <a:ln>
+            <a:tailEnd type="triangle"/>
+          </a:ln>
+        </p:spPr>
+        <p:style>
+          <a:lnRef idx="1">
+            <a:schemeClr val="accent1"/>
+          </a:lnRef>
+          <a:fillRef idx="0">
+            <a:schemeClr val="accent1"/>
+          </a:fillRef>
+          <a:effectRef idx="0">
+            <a:schemeClr val="accent1"/>
+          </a:effectRef>
+          <a:fontRef idx="minor">
+            <a:schemeClr val="tx1"/>
+          </a:fontRef>
+        </p:style>
+      </p:cxnSp>
+      <p:cxnSp>
+        <p:nvCxnSpPr>
+          <p:cNvPr id="30" name="Straight Arrow Connector 29">
+            <a:extLst>
+              <a:ext uri="{FF2B5EF4-FFF2-40B4-BE49-F238E27FC236}">
+                <a16:creationId xmlns:a16="http://schemas.microsoft.com/office/drawing/2014/main" id="{3B5E2498-3C53-6349-B0E1-85D186CEF882}"/>
+              </a:ext>
+            </a:extLst>
+          </p:cNvPr>
+          <p:cNvCxnSpPr>
+            <a:cxnSpLocks/>
+            <a:stCxn id="12" idx="0"/>
+            <a:endCxn id="4" idx="2"/>
+          </p:cNvCxnSpPr>
+          <p:nvPr/>
+        </p:nvCxnSpPr>
+        <p:spPr>
+          <a:xfrm flipV="1">
+            <a:off x="1054921" y="2639197"/>
+            <a:ext cx="635246" cy="182255"/>
           </a:xfrm>
           <a:prstGeom prst="straightConnector1">
             <a:avLst/>
@@ -5371,21 +4277,21 @@
           <p:cNvPr id="32" name="Straight Arrow Connector 31">
             <a:extLst>
               <a:ext uri="{FF2B5EF4-FFF2-40B4-BE49-F238E27FC236}">
-                <a16:creationId xmlns:a16="http://schemas.microsoft.com/office/drawing/2014/main" id="{DF6359E9-38C6-B644-89A6-41E406FA1CDD}"/>
+                <a16:creationId xmlns:a16="http://schemas.microsoft.com/office/drawing/2014/main" id="{E68738F2-EB6C-5340-BFC3-E3AB725B20DB}"/>
               </a:ext>
             </a:extLst>
           </p:cNvPr>
           <p:cNvCxnSpPr>
             <a:cxnSpLocks/>
-            <a:stCxn id="4" idx="2"/>
-            <a:endCxn id="22" idx="0"/>
+            <a:stCxn id="13" idx="0"/>
+            <a:endCxn id="4" idx="1"/>
           </p:cNvCxnSpPr>
           <p:nvPr/>
         </p:nvCxnSpPr>
         <p:spPr>
-          <a:xfrm flipH="1">
-            <a:off x="3023285" y="3144795"/>
-            <a:ext cx="1713472" cy="511146"/>
+          <a:xfrm flipV="1">
+            <a:off x="2195861" y="2639197"/>
+            <a:ext cx="318633" cy="719774"/>
           </a:xfrm>
           <a:prstGeom prst="straightConnector1">
             <a:avLst/>
@@ -5409,12 +4315,141 @@
           </a:fontRef>
         </p:style>
       </p:cxnSp>
-      <p:sp>
-        <p:nvSpPr>
-          <p:cNvPr id="35" name="Diamond 34">
-            <a:extLst>
-              <a:ext uri="{FF2B5EF4-FFF2-40B4-BE49-F238E27FC236}">
-                <a16:creationId xmlns:a16="http://schemas.microsoft.com/office/drawing/2014/main" id="{9F7190C9-02EF-2A43-B0C4-837BF16A9D0C}"/>
+      <p:cxnSp>
+        <p:nvCxnSpPr>
+          <p:cNvPr id="34" name="Straight Arrow Connector 33">
+            <a:extLst>
+              <a:ext uri="{FF2B5EF4-FFF2-40B4-BE49-F238E27FC236}">
+                <a16:creationId xmlns:a16="http://schemas.microsoft.com/office/drawing/2014/main" id="{D2C8F6C5-20CD-9040-B576-D99FE84853E4}"/>
+              </a:ext>
+            </a:extLst>
+          </p:cNvPr>
+          <p:cNvCxnSpPr>
+            <a:cxnSpLocks/>
+            <a:stCxn id="14" idx="0"/>
+            <a:endCxn id="4" idx="1"/>
+          </p:cNvCxnSpPr>
+          <p:nvPr/>
+        </p:nvCxnSpPr>
+        <p:spPr>
+          <a:xfrm flipH="1" flipV="1">
+            <a:off x="2514494" y="2639197"/>
+            <a:ext cx="649760" cy="1504440"/>
+          </a:xfrm>
+          <a:prstGeom prst="straightConnector1">
+            <a:avLst/>
+          </a:prstGeom>
+          <a:ln>
+            <a:tailEnd type="triangle"/>
+          </a:ln>
+        </p:spPr>
+        <p:style>
+          <a:lnRef idx="1">
+            <a:schemeClr val="accent1"/>
+          </a:lnRef>
+          <a:fillRef idx="0">
+            <a:schemeClr val="accent1"/>
+          </a:fillRef>
+          <a:effectRef idx="0">
+            <a:schemeClr val="accent1"/>
+          </a:effectRef>
+          <a:fontRef idx="minor">
+            <a:schemeClr val="tx1"/>
+          </a:fontRef>
+        </p:style>
+      </p:cxnSp>
+      <p:cxnSp>
+        <p:nvCxnSpPr>
+          <p:cNvPr id="37" name="Straight Arrow Connector 36">
+            <a:extLst>
+              <a:ext uri="{FF2B5EF4-FFF2-40B4-BE49-F238E27FC236}">
+                <a16:creationId xmlns:a16="http://schemas.microsoft.com/office/drawing/2014/main" id="{492A2287-310F-B946-AEF1-82B998E15392}"/>
+              </a:ext>
+            </a:extLst>
+          </p:cNvPr>
+          <p:cNvCxnSpPr>
+            <a:cxnSpLocks/>
+            <a:stCxn id="15" idx="1"/>
+            <a:endCxn id="5" idx="2"/>
+          </p:cNvCxnSpPr>
+          <p:nvPr/>
+        </p:nvCxnSpPr>
+        <p:spPr>
+          <a:xfrm flipV="1">
+            <a:off x="6209058" y="2793304"/>
+            <a:ext cx="623744" cy="520366"/>
+          </a:xfrm>
+          <a:prstGeom prst="straightConnector1">
+            <a:avLst/>
+          </a:prstGeom>
+          <a:ln>
+            <a:tailEnd type="triangle"/>
+          </a:ln>
+        </p:spPr>
+        <p:style>
+          <a:lnRef idx="1">
+            <a:schemeClr val="accent1"/>
+          </a:lnRef>
+          <a:fillRef idx="0">
+            <a:schemeClr val="accent1"/>
+          </a:fillRef>
+          <a:effectRef idx="0">
+            <a:schemeClr val="accent1"/>
+          </a:effectRef>
+          <a:fontRef idx="minor">
+            <a:schemeClr val="tx1"/>
+          </a:fontRef>
+        </p:style>
+      </p:cxnSp>
+      <p:cxnSp>
+        <p:nvCxnSpPr>
+          <p:cNvPr id="39" name="Straight Arrow Connector 38">
+            <a:extLst>
+              <a:ext uri="{FF2B5EF4-FFF2-40B4-BE49-F238E27FC236}">
+                <a16:creationId xmlns:a16="http://schemas.microsoft.com/office/drawing/2014/main" id="{94CD089F-5773-E04C-BDC5-512549EA62F0}"/>
+              </a:ext>
+            </a:extLst>
+          </p:cNvPr>
+          <p:cNvCxnSpPr>
+            <a:cxnSpLocks/>
+            <a:stCxn id="16" idx="0"/>
+            <a:endCxn id="5" idx="1"/>
+          </p:cNvCxnSpPr>
+          <p:nvPr/>
+        </p:nvCxnSpPr>
+        <p:spPr>
+          <a:xfrm flipV="1">
+            <a:off x="7568271" y="2793304"/>
+            <a:ext cx="98609" cy="915613"/>
+          </a:xfrm>
+          <a:prstGeom prst="straightConnector1">
+            <a:avLst/>
+          </a:prstGeom>
+          <a:ln>
+            <a:tailEnd type="triangle"/>
+          </a:ln>
+        </p:spPr>
+        <p:style>
+          <a:lnRef idx="1">
+            <a:schemeClr val="accent1"/>
+          </a:lnRef>
+          <a:fillRef idx="0">
+            <a:schemeClr val="accent1"/>
+          </a:fillRef>
+          <a:effectRef idx="0">
+            <a:schemeClr val="accent1"/>
+          </a:effectRef>
+          <a:fontRef idx="minor">
+            <a:schemeClr val="tx1"/>
+          </a:fontRef>
+        </p:style>
+      </p:cxnSp>
+      <p:sp>
+        <p:nvSpPr>
+          <p:cNvPr id="50" name="Rectangle 49">
+            <a:extLst>
+              <a:ext uri="{FF2B5EF4-FFF2-40B4-BE49-F238E27FC236}">
+                <a16:creationId xmlns:a16="http://schemas.microsoft.com/office/drawing/2014/main" id="{B8D579BA-5C4C-E14D-A374-B9DDC758B117}"/>
               </a:ext>
             </a:extLst>
           </p:cNvPr>
@@ -5423,15 +4458,488 @@
         </p:nvSpPr>
         <p:spPr>
           <a:xfrm>
-            <a:off x="4180705" y="5122278"/>
-            <a:ext cx="1272745" cy="1230816"/>
-          </a:xfrm>
-          <a:prstGeom prst="diamond">
+            <a:off x="4062654" y="2747144"/>
+            <a:ext cx="963827" cy="815546"/>
+          </a:xfrm>
+          <a:prstGeom prst="rect">
             <a:avLst/>
           </a:prstGeom>
-          <a:solidFill>
-            <a:schemeClr val="bg1"/>
-          </a:solidFill>
+        </p:spPr>
+        <p:style>
+          <a:lnRef idx="2">
+            <a:schemeClr val="accent4">
+              <a:shade val="50000"/>
+            </a:schemeClr>
+          </a:lnRef>
+          <a:fillRef idx="1">
+            <a:schemeClr val="accent4"/>
+          </a:fillRef>
+          <a:effectRef idx="0">
+            <a:schemeClr val="accent4"/>
+          </a:effectRef>
+          <a:fontRef idx="minor">
+            <a:schemeClr val="lt1"/>
+          </a:fontRef>
+        </p:style>
+        <p:txBody>
+          <a:bodyPr rtlCol="0" anchor="ctr"/>
+          <a:lstStyle/>
+          <a:p>
+            <a:pPr algn="ctr"/>
+            <a:r>
+              <a:rPr lang="en-US"/>
+              <a:t>move.</a:t>
+            </a:r>
+            <a:br>
+              <a:rPr lang="en-US"/>
+            </a:br>
+            <a:r>
+              <a:rPr lang="en-US"/>
+              <a:t>global</a:t>
+            </a:r>
+          </a:p>
+        </p:txBody>
+      </p:sp>
+      <p:cxnSp>
+        <p:nvCxnSpPr>
+          <p:cNvPr id="74" name="Straight Arrow Connector 73">
+            <a:extLst>
+              <a:ext uri="{FF2B5EF4-FFF2-40B4-BE49-F238E27FC236}">
+                <a16:creationId xmlns:a16="http://schemas.microsoft.com/office/drawing/2014/main" id="{2CA80652-C6E3-4A4A-9B7C-3339EEF97881}"/>
+              </a:ext>
+            </a:extLst>
+          </p:cNvPr>
+          <p:cNvCxnSpPr>
+            <a:stCxn id="50" idx="0"/>
+            <a:endCxn id="4" idx="0"/>
+          </p:cNvCxnSpPr>
+          <p:nvPr/>
+        </p:nvCxnSpPr>
+        <p:spPr>
+          <a:xfrm flipH="1" flipV="1">
+            <a:off x="2719411" y="2229363"/>
+            <a:ext cx="1825157" cy="517781"/>
+          </a:xfrm>
+          <a:prstGeom prst="straightConnector1">
+            <a:avLst/>
+          </a:prstGeom>
+          <a:ln>
+            <a:tailEnd type="triangle"/>
+          </a:ln>
+        </p:spPr>
+        <p:style>
+          <a:lnRef idx="1">
+            <a:schemeClr val="accent1"/>
+          </a:lnRef>
+          <a:fillRef idx="0">
+            <a:schemeClr val="accent1"/>
+          </a:fillRef>
+          <a:effectRef idx="0">
+            <a:schemeClr val="accent1"/>
+          </a:effectRef>
+          <a:fontRef idx="minor">
+            <a:schemeClr val="tx1"/>
+          </a:fontRef>
+        </p:style>
+      </p:cxnSp>
+      <p:cxnSp>
+        <p:nvCxnSpPr>
+          <p:cNvPr id="77" name="Straight Arrow Connector 76">
+            <a:extLst>
+              <a:ext uri="{FF2B5EF4-FFF2-40B4-BE49-F238E27FC236}">
+                <a16:creationId xmlns:a16="http://schemas.microsoft.com/office/drawing/2014/main" id="{FCC9F9F5-A0D1-274E-8660-513EEA6C0190}"/>
+              </a:ext>
+            </a:extLst>
+          </p:cNvPr>
+          <p:cNvCxnSpPr>
+            <a:stCxn id="50" idx="0"/>
+            <a:endCxn id="5" idx="3"/>
+          </p:cNvCxnSpPr>
+          <p:nvPr/>
+        </p:nvCxnSpPr>
+        <p:spPr>
+          <a:xfrm flipV="1">
+            <a:off x="4544568" y="2383471"/>
+            <a:ext cx="2083317" cy="363673"/>
+          </a:xfrm>
+          <a:prstGeom prst="straightConnector1">
+            <a:avLst/>
+          </a:prstGeom>
+          <a:ln>
+            <a:tailEnd type="triangle"/>
+          </a:ln>
+        </p:spPr>
+        <p:style>
+          <a:lnRef idx="1">
+            <a:schemeClr val="accent1"/>
+          </a:lnRef>
+          <a:fillRef idx="0">
+            <a:schemeClr val="accent1"/>
+          </a:fillRef>
+          <a:effectRef idx="0">
+            <a:schemeClr val="accent1"/>
+          </a:effectRef>
+          <a:fontRef idx="minor">
+            <a:schemeClr val="tx1"/>
+          </a:fontRef>
+        </p:style>
+      </p:cxnSp>
+      <p:cxnSp>
+        <p:nvCxnSpPr>
+          <p:cNvPr id="86" name="Straight Arrow Connector 85">
+            <a:extLst>
+              <a:ext uri="{FF2B5EF4-FFF2-40B4-BE49-F238E27FC236}">
+                <a16:creationId xmlns:a16="http://schemas.microsoft.com/office/drawing/2014/main" id="{FAAAF412-15B6-6444-B038-670139F1877E}"/>
+              </a:ext>
+            </a:extLst>
+          </p:cNvPr>
+          <p:cNvCxnSpPr>
+            <a:stCxn id="50" idx="0"/>
+            <a:endCxn id="6" idx="2"/>
+          </p:cNvCxnSpPr>
+          <p:nvPr/>
+        </p:nvCxnSpPr>
+        <p:spPr>
+          <a:xfrm flipV="1">
+            <a:off x="4544568" y="1005015"/>
+            <a:ext cx="540513" cy="1742129"/>
+          </a:xfrm>
+          <a:prstGeom prst="straightConnector1">
+            <a:avLst/>
+          </a:prstGeom>
+          <a:ln>
+            <a:tailEnd type="triangle"/>
+          </a:ln>
+        </p:spPr>
+        <p:style>
+          <a:lnRef idx="1">
+            <a:schemeClr val="accent1"/>
+          </a:lnRef>
+          <a:fillRef idx="0">
+            <a:schemeClr val="accent1"/>
+          </a:fillRef>
+          <a:effectRef idx="0">
+            <a:schemeClr val="accent1"/>
+          </a:effectRef>
+          <a:fontRef idx="minor">
+            <a:schemeClr val="tx1"/>
+          </a:fontRef>
+        </p:style>
+      </p:cxnSp>
+      <p:sp>
+        <p:nvSpPr>
+          <p:cNvPr id="87" name="Rectangle 86">
+            <a:extLst>
+              <a:ext uri="{FF2B5EF4-FFF2-40B4-BE49-F238E27FC236}">
+                <a16:creationId xmlns:a16="http://schemas.microsoft.com/office/drawing/2014/main" id="{DF7E396D-D895-144E-ABBF-93B50E5CBD08}"/>
+              </a:ext>
+            </a:extLst>
+          </p:cNvPr>
+          <p:cNvSpPr/>
+          <p:nvPr/>
+        </p:nvSpPr>
+        <p:spPr>
+          <a:xfrm>
+            <a:off x="3164254" y="5132357"/>
+            <a:ext cx="963827" cy="815546"/>
+          </a:xfrm>
+          <a:prstGeom prst="rect">
+            <a:avLst/>
+          </a:prstGeom>
+        </p:spPr>
+        <p:style>
+          <a:lnRef idx="2">
+            <a:schemeClr val="accent4">
+              <a:shade val="50000"/>
+            </a:schemeClr>
+          </a:lnRef>
+          <a:fillRef idx="1">
+            <a:schemeClr val="accent4"/>
+          </a:fillRef>
+          <a:effectRef idx="0">
+            <a:schemeClr val="accent4"/>
+          </a:effectRef>
+          <a:fontRef idx="minor">
+            <a:schemeClr val="lt1"/>
+          </a:fontRef>
+        </p:style>
+        <p:txBody>
+          <a:bodyPr rtlCol="0" anchor="ctr"/>
+          <a:lstStyle/>
+          <a:p>
+            <a:pPr algn="ctr"/>
+            <a:r>
+              <a:rPr lang="en-US"/>
+              <a:t>syn1.</a:t>
+            </a:r>
+            <a:br>
+              <a:rPr lang="en-US"/>
+            </a:br>
+            <a:r>
+              <a:rPr lang="en-US"/>
+              <a:t>global</a:t>
+            </a:r>
+          </a:p>
+        </p:txBody>
+      </p:sp>
+      <p:sp>
+        <p:nvSpPr>
+          <p:cNvPr id="88" name="Rectangle 87">
+            <a:extLst>
+              <a:ext uri="{FF2B5EF4-FFF2-40B4-BE49-F238E27FC236}">
+                <a16:creationId xmlns:a16="http://schemas.microsoft.com/office/drawing/2014/main" id="{60E71F45-C6CC-0B4A-BF8B-7B8E99EC8AC5}"/>
+              </a:ext>
+            </a:extLst>
+          </p:cNvPr>
+          <p:cNvSpPr/>
+          <p:nvPr/>
+        </p:nvSpPr>
+        <p:spPr>
+          <a:xfrm>
+            <a:off x="5049039" y="4724584"/>
+            <a:ext cx="963827" cy="815546"/>
+          </a:xfrm>
+          <a:prstGeom prst="rect">
+            <a:avLst/>
+          </a:prstGeom>
+        </p:spPr>
+        <p:style>
+          <a:lnRef idx="2">
+            <a:schemeClr val="accent4">
+              <a:shade val="50000"/>
+            </a:schemeClr>
+          </a:lnRef>
+          <a:fillRef idx="1">
+            <a:schemeClr val="accent4"/>
+          </a:fillRef>
+          <a:effectRef idx="0">
+            <a:schemeClr val="accent4"/>
+          </a:effectRef>
+          <a:fontRef idx="minor">
+            <a:schemeClr val="lt1"/>
+          </a:fontRef>
+        </p:style>
+        <p:txBody>
+          <a:bodyPr rtlCol="0" anchor="ctr"/>
+          <a:lstStyle/>
+          <a:p>
+            <a:pPr algn="ctr"/>
+            <a:r>
+              <a:rPr lang="en-US"/>
+              <a:t>syn2.</a:t>
+            </a:r>
+            <a:br>
+              <a:rPr lang="en-US"/>
+            </a:br>
+            <a:r>
+              <a:rPr lang="en-US"/>
+              <a:t>global</a:t>
+            </a:r>
+          </a:p>
+        </p:txBody>
+      </p:sp>
+      <p:sp>
+        <p:nvSpPr>
+          <p:cNvPr id="89" name="Rectangle 88">
+            <a:extLst>
+              <a:ext uri="{FF2B5EF4-FFF2-40B4-BE49-F238E27FC236}">
+                <a16:creationId xmlns:a16="http://schemas.microsoft.com/office/drawing/2014/main" id="{60F5BE5E-7866-9F47-9CB4-9ED7E0155F3F}"/>
+              </a:ext>
+            </a:extLst>
+          </p:cNvPr>
+          <p:cNvSpPr/>
+          <p:nvPr/>
+        </p:nvSpPr>
+        <p:spPr>
+          <a:xfrm>
+            <a:off x="7794843" y="5132357"/>
+            <a:ext cx="963827" cy="815546"/>
+          </a:xfrm>
+          <a:prstGeom prst="rect">
+            <a:avLst/>
+          </a:prstGeom>
+        </p:spPr>
+        <p:style>
+          <a:lnRef idx="2">
+            <a:schemeClr val="accent4">
+              <a:shade val="50000"/>
+            </a:schemeClr>
+          </a:lnRef>
+          <a:fillRef idx="1">
+            <a:schemeClr val="accent4"/>
+          </a:fillRef>
+          <a:effectRef idx="0">
+            <a:schemeClr val="accent4"/>
+          </a:effectRef>
+          <a:fontRef idx="minor">
+            <a:schemeClr val="lt1"/>
+          </a:fontRef>
+        </p:style>
+        <p:txBody>
+          <a:bodyPr rtlCol="0" anchor="ctr"/>
+          <a:lstStyle/>
+          <a:p>
+            <a:pPr algn="ctr"/>
+            <a:r>
+              <a:rPr lang="en-US"/>
+              <a:t>ant1.</a:t>
+            </a:r>
+            <a:br>
+              <a:rPr lang="en-US"/>
+            </a:br>
+            <a:r>
+              <a:rPr lang="en-US"/>
+              <a:t>global</a:t>
+            </a:r>
+          </a:p>
+        </p:txBody>
+      </p:sp>
+      <p:cxnSp>
+        <p:nvCxnSpPr>
+          <p:cNvPr id="91" name="Straight Arrow Connector 90">
+            <a:extLst>
+              <a:ext uri="{FF2B5EF4-FFF2-40B4-BE49-F238E27FC236}">
+                <a16:creationId xmlns:a16="http://schemas.microsoft.com/office/drawing/2014/main" id="{3EA62AF8-D830-9541-863A-8A0083BBB424}"/>
+              </a:ext>
+            </a:extLst>
+          </p:cNvPr>
+          <p:cNvCxnSpPr>
+            <a:stCxn id="50" idx="2"/>
+            <a:endCxn id="87" idx="0"/>
+          </p:cNvCxnSpPr>
+          <p:nvPr/>
+        </p:nvCxnSpPr>
+        <p:spPr>
+          <a:xfrm flipH="1">
+            <a:off x="3646168" y="3562690"/>
+            <a:ext cx="898400" cy="1569667"/>
+          </a:xfrm>
+          <a:prstGeom prst="straightConnector1">
+            <a:avLst/>
+          </a:prstGeom>
+          <a:ln>
+            <a:tailEnd type="triangle"/>
+          </a:ln>
+        </p:spPr>
+        <p:style>
+          <a:lnRef idx="1">
+            <a:schemeClr val="accent1"/>
+          </a:lnRef>
+          <a:fillRef idx="0">
+            <a:schemeClr val="accent1"/>
+          </a:fillRef>
+          <a:effectRef idx="0">
+            <a:schemeClr val="accent1"/>
+          </a:effectRef>
+          <a:fontRef idx="minor">
+            <a:schemeClr val="tx1"/>
+          </a:fontRef>
+        </p:style>
+      </p:cxnSp>
+      <p:cxnSp>
+        <p:nvCxnSpPr>
+          <p:cNvPr id="93" name="Straight Arrow Connector 92">
+            <a:extLst>
+              <a:ext uri="{FF2B5EF4-FFF2-40B4-BE49-F238E27FC236}">
+                <a16:creationId xmlns:a16="http://schemas.microsoft.com/office/drawing/2014/main" id="{04101A02-DFC9-BA45-A82C-C65FDD6BF8DF}"/>
+              </a:ext>
+            </a:extLst>
+          </p:cNvPr>
+          <p:cNvCxnSpPr>
+            <a:stCxn id="50" idx="2"/>
+            <a:endCxn id="88" idx="0"/>
+          </p:cNvCxnSpPr>
+          <p:nvPr/>
+        </p:nvCxnSpPr>
+        <p:spPr>
+          <a:xfrm>
+            <a:off x="4544568" y="3562690"/>
+            <a:ext cx="986385" cy="1161894"/>
+          </a:xfrm>
+          <a:prstGeom prst="straightConnector1">
+            <a:avLst/>
+          </a:prstGeom>
+          <a:ln>
+            <a:tailEnd type="triangle"/>
+          </a:ln>
+        </p:spPr>
+        <p:style>
+          <a:lnRef idx="1">
+            <a:schemeClr val="accent1"/>
+          </a:lnRef>
+          <a:fillRef idx="0">
+            <a:schemeClr val="accent1"/>
+          </a:fillRef>
+          <a:effectRef idx="0">
+            <a:schemeClr val="accent1"/>
+          </a:effectRef>
+          <a:fontRef idx="minor">
+            <a:schemeClr val="tx1"/>
+          </a:fontRef>
+        </p:style>
+      </p:cxnSp>
+      <p:cxnSp>
+        <p:nvCxnSpPr>
+          <p:cNvPr id="95" name="Straight Arrow Connector 94">
+            <a:extLst>
+              <a:ext uri="{FF2B5EF4-FFF2-40B4-BE49-F238E27FC236}">
+                <a16:creationId xmlns:a16="http://schemas.microsoft.com/office/drawing/2014/main" id="{0135BF46-92CE-8F48-96D7-C7AA19A18277}"/>
+              </a:ext>
+            </a:extLst>
+          </p:cNvPr>
+          <p:cNvCxnSpPr>
+            <a:stCxn id="50" idx="2"/>
+            <a:endCxn id="89" idx="0"/>
+          </p:cNvCxnSpPr>
+          <p:nvPr/>
+        </p:nvCxnSpPr>
+        <p:spPr>
+          <a:xfrm>
+            <a:off x="4544568" y="3562690"/>
+            <a:ext cx="3732189" cy="1569667"/>
+          </a:xfrm>
+          <a:prstGeom prst="straightConnector1">
+            <a:avLst/>
+          </a:prstGeom>
+          <a:ln>
+            <a:tailEnd type="triangle"/>
+          </a:ln>
+        </p:spPr>
+        <p:style>
+          <a:lnRef idx="1">
+            <a:schemeClr val="accent1"/>
+          </a:lnRef>
+          <a:fillRef idx="0">
+            <a:schemeClr val="accent1"/>
+          </a:fillRef>
+          <a:effectRef idx="0">
+            <a:schemeClr val="accent1"/>
+          </a:effectRef>
+          <a:fontRef idx="minor">
+            <a:schemeClr val="tx1"/>
+          </a:fontRef>
+        </p:style>
+      </p:cxnSp>
+      <p:sp>
+        <p:nvSpPr>
+          <p:cNvPr id="101" name="Right Arrow 100">
+            <a:extLst>
+              <a:ext uri="{FF2B5EF4-FFF2-40B4-BE49-F238E27FC236}">
+                <a16:creationId xmlns:a16="http://schemas.microsoft.com/office/drawing/2014/main" id="{70E3DB8A-E338-F14A-BD74-671F7AE596D7}"/>
+              </a:ext>
+            </a:extLst>
+          </p:cNvPr>
+          <p:cNvSpPr/>
+          <p:nvPr/>
+        </p:nvSpPr>
+        <p:spPr>
+          <a:xfrm rot="19247124">
+            <a:off x="183301" y="3471561"/>
+            <a:ext cx="566894" cy="182255"/>
+          </a:xfrm>
+          <a:prstGeom prst="rightArrow">
+            <a:avLst/>
+          </a:prstGeom>
         </p:spPr>
         <p:style>
           <a:lnRef idx="2">
@@ -5460,52 +4968,10 @@
       </p:sp>
       <p:sp>
         <p:nvSpPr>
-          <p:cNvPr id="36" name="TextBox 35">
-            <a:extLst>
-              <a:ext uri="{FF2B5EF4-FFF2-40B4-BE49-F238E27FC236}">
-                <a16:creationId xmlns:a16="http://schemas.microsoft.com/office/drawing/2014/main" id="{5331301B-8679-7946-93C4-FD40CB168C4E}"/>
-              </a:ext>
-            </a:extLst>
-          </p:cNvPr>
-          <p:cNvSpPr txBox="1"/>
-          <p:nvPr/>
-        </p:nvSpPr>
-        <p:spPr>
-          <a:xfrm>
-            <a:off x="3822355" y="5007514"/>
-            <a:ext cx="2228336" cy="1477328"/>
-          </a:xfrm>
-          <a:prstGeom prst="rect">
-            <a:avLst/>
-          </a:prstGeom>
-          <a:noFill/>
-        </p:spPr>
-        <p:txBody>
-          <a:bodyPr wrap="square" rtlCol="0">
-            <a:spAutoFit/>
-          </a:bodyPr>
-          <a:lstStyle/>
-          <a:p>
-            <a:r>
-              <a:rPr lang="en-US"/>
-              <a:t>Alternatives: Word2Vec / LSTMs / TXL on small corpus, </a:t>
-            </a:r>
-            <a:br>
-              <a:rPr lang="en-US"/>
-            </a:br>
-            <a:r>
-              <a:rPr lang="en-US"/>
-              <a:t>or bootstrap from examples</a:t>
-            </a:r>
-          </a:p>
-        </p:txBody>
-      </p:sp>
-      <p:sp>
-        <p:nvSpPr>
-          <p:cNvPr id="38" name="Oval 37">
-            <a:extLst>
-              <a:ext uri="{FF2B5EF4-FFF2-40B4-BE49-F238E27FC236}">
-                <a16:creationId xmlns:a16="http://schemas.microsoft.com/office/drawing/2014/main" id="{E3B4A9C1-616D-8E44-98AF-3256821C1CDC}"/>
+          <p:cNvPr id="102" name="Right Arrow 101">
+            <a:extLst>
+              <a:ext uri="{FF2B5EF4-FFF2-40B4-BE49-F238E27FC236}">
+                <a16:creationId xmlns:a16="http://schemas.microsoft.com/office/drawing/2014/main" id="{05C41163-055C-FE41-A593-F2BE542EC8F9}"/>
               </a:ext>
             </a:extLst>
           </p:cNvPr>
@@ -5513,11 +4979,11 @@
           <p:nvPr/>
         </p:nvSpPr>
         <p:spPr>
-          <a:xfrm>
-            <a:off x="9168715" y="441776"/>
-            <a:ext cx="1295001" cy="1290882"/>
-          </a:xfrm>
-          <a:prstGeom prst="ellipse">
+          <a:xfrm rot="19247124">
+            <a:off x="-24963" y="1119971"/>
+            <a:ext cx="566894" cy="182255"/>
+          </a:xfrm>
+          <a:prstGeom prst="rightArrow">
             <a:avLst/>
           </a:prstGeom>
         </p:spPr>
@@ -5542,154 +5008,16 @@
           <a:lstStyle/>
           <a:p>
             <a:pPr algn="ctr"/>
-            <a:r>
-              <a:rPr lang="en-US"/>
-              <a:t>narrow</a:t>
-            </a:r>
-          </a:p>
-        </p:txBody>
-      </p:sp>
-      <p:sp>
-        <p:nvSpPr>
-          <p:cNvPr id="39" name="Oval 38">
-            <a:extLst>
-              <a:ext uri="{FF2B5EF4-FFF2-40B4-BE49-F238E27FC236}">
-                <a16:creationId xmlns:a16="http://schemas.microsoft.com/office/drawing/2014/main" id="{74036C56-D38F-4B41-BD13-C47BFC1D8C46}"/>
-              </a:ext>
-            </a:extLst>
-          </p:cNvPr>
-          <p:cNvSpPr/>
-          <p:nvPr/>
-        </p:nvSpPr>
-        <p:spPr>
-          <a:xfrm>
-            <a:off x="1346454" y="1451310"/>
-            <a:ext cx="1295001" cy="1290882"/>
-          </a:xfrm>
-          <a:prstGeom prst="ellipse">
-            <a:avLst/>
-          </a:prstGeom>
-        </p:spPr>
-        <p:style>
-          <a:lnRef idx="2">
-            <a:schemeClr val="accent1">
-              <a:shade val="50000"/>
-            </a:schemeClr>
-          </a:lnRef>
-          <a:fillRef idx="1">
-            <a:schemeClr val="accent1"/>
-          </a:fillRef>
-          <a:effectRef idx="0">
-            <a:schemeClr val="accent1"/>
-          </a:effectRef>
-          <a:fontRef idx="minor">
-            <a:schemeClr val="lt1"/>
-          </a:fontRef>
-        </p:style>
-        <p:txBody>
-          <a:bodyPr rtlCol="0" anchor="ctr"/>
-          <a:lstStyle/>
-          <a:p>
-            <a:pPr algn="ctr"/>
-            <a:r>
-              <a:rPr lang="en-US"/>
-              <a:t>broad</a:t>
-            </a:r>
-          </a:p>
-        </p:txBody>
-      </p:sp>
-      <p:cxnSp>
-        <p:nvCxnSpPr>
-          <p:cNvPr id="42" name="Straight Arrow Connector 41">
-            <a:extLst>
-              <a:ext uri="{FF2B5EF4-FFF2-40B4-BE49-F238E27FC236}">
-                <a16:creationId xmlns:a16="http://schemas.microsoft.com/office/drawing/2014/main" id="{DE3FC234-0BEC-3F42-A6F0-885C42710CBC}"/>
-              </a:ext>
-            </a:extLst>
-          </p:cNvPr>
-          <p:cNvCxnSpPr>
-            <a:cxnSpLocks/>
-            <a:stCxn id="38" idx="2"/>
-            <a:endCxn id="4" idx="7"/>
-          </p:cNvCxnSpPr>
-          <p:nvPr/>
-        </p:nvCxnSpPr>
-        <p:spPr>
-          <a:xfrm flipH="1">
-            <a:off x="5970773" y="1087217"/>
-            <a:ext cx="3197942" cy="1546431"/>
-          </a:xfrm>
-          <a:prstGeom prst="straightConnector1">
-            <a:avLst/>
-          </a:prstGeom>
-          <a:ln>
-            <a:tailEnd type="triangle"/>
-          </a:ln>
-        </p:spPr>
-        <p:style>
-          <a:lnRef idx="2">
-            <a:schemeClr val="accent2"/>
-          </a:lnRef>
-          <a:fillRef idx="0">
-            <a:schemeClr val="accent2"/>
-          </a:fillRef>
-          <a:effectRef idx="1">
-            <a:schemeClr val="accent2"/>
-          </a:effectRef>
-          <a:fontRef idx="minor">
-            <a:schemeClr val="tx1"/>
-          </a:fontRef>
-        </p:style>
-      </p:cxnSp>
-      <p:cxnSp>
-        <p:nvCxnSpPr>
-          <p:cNvPr id="45" name="Straight Arrow Connector 44">
-            <a:extLst>
-              <a:ext uri="{FF2B5EF4-FFF2-40B4-BE49-F238E27FC236}">
-                <a16:creationId xmlns:a16="http://schemas.microsoft.com/office/drawing/2014/main" id="{1DA91269-9A4C-4D49-83D9-7AE388C6966A}"/>
-              </a:ext>
-            </a:extLst>
-          </p:cNvPr>
-          <p:cNvCxnSpPr>
-            <a:cxnSpLocks/>
-            <a:stCxn id="4" idx="2"/>
-            <a:endCxn id="39" idx="6"/>
-          </p:cNvCxnSpPr>
-          <p:nvPr/>
-        </p:nvCxnSpPr>
-        <p:spPr>
-          <a:xfrm flipH="1" flipV="1">
-            <a:off x="2641455" y="2096751"/>
-            <a:ext cx="2095302" cy="1048044"/>
-          </a:xfrm>
-          <a:prstGeom prst="straightConnector1">
-            <a:avLst/>
-          </a:prstGeom>
-          <a:ln>
-            <a:tailEnd type="triangle"/>
-          </a:ln>
-        </p:spPr>
-        <p:style>
-          <a:lnRef idx="1">
-            <a:schemeClr val="accent6"/>
-          </a:lnRef>
-          <a:fillRef idx="0">
-            <a:schemeClr val="accent6"/>
-          </a:fillRef>
-          <a:effectRef idx="0">
-            <a:schemeClr val="accent6"/>
-          </a:effectRef>
-          <a:fontRef idx="minor">
-            <a:schemeClr val="tx1"/>
-          </a:fontRef>
-        </p:style>
-      </p:cxnSp>
-      <p:sp>
-        <p:nvSpPr>
-          <p:cNvPr id="48" name="TextBox 47">
-            <a:extLst>
-              <a:ext uri="{FF2B5EF4-FFF2-40B4-BE49-F238E27FC236}">
-                <a16:creationId xmlns:a16="http://schemas.microsoft.com/office/drawing/2014/main" id="{43891F1F-8BBE-5D44-AD17-3B88A25F29FD}"/>
+            <a:endParaRPr lang="en-US"/>
+          </a:p>
+        </p:txBody>
+      </p:sp>
+      <p:sp>
+        <p:nvSpPr>
+          <p:cNvPr id="103" name="TextBox 102">
+            <a:extLst>
+              <a:ext uri="{FF2B5EF4-FFF2-40B4-BE49-F238E27FC236}">
+                <a16:creationId xmlns:a16="http://schemas.microsoft.com/office/drawing/2014/main" id="{7B5B22F8-7A5B-E349-BF97-C19BC42AEBCA}"/>
               </a:ext>
             </a:extLst>
           </p:cNvPr>
@@ -5698,8 +5026,8 @@
         </p:nvSpPr>
         <p:spPr>
           <a:xfrm>
-            <a:off x="9042672" y="5414520"/>
-            <a:ext cx="2228336" cy="646331"/>
+            <a:off x="984310" y="1170830"/>
+            <a:ext cx="383148" cy="338554"/>
           </a:xfrm>
           <a:prstGeom prst="rect">
             <a:avLst/>
@@ -5713,351 +5041,533 @@
           <a:lstStyle/>
           <a:p>
             <a:r>
-              <a:rPr lang="en-US"/>
-              <a:t>Alternatives: GloVe, Doc2Vec</a:t>
-            </a:r>
-          </a:p>
-        </p:txBody>
-      </p:sp>
-      <p:sp>
-        <p:nvSpPr>
-          <p:cNvPr id="53" name="Rectangle 52">
-            <a:extLst>
-              <a:ext uri="{FF2B5EF4-FFF2-40B4-BE49-F238E27FC236}">
-                <a16:creationId xmlns:a16="http://schemas.microsoft.com/office/drawing/2014/main" id="{D88E4017-3140-CC4E-92AF-7DACB95B0721}"/>
-              </a:ext>
-            </a:extLst>
-          </p:cNvPr>
-          <p:cNvSpPr/>
+              <a:rPr lang="en-US" sz="1600" i="1"/>
+              <a:t>d</a:t>
+            </a:r>
+          </a:p>
+        </p:txBody>
+      </p:sp>
+      <p:sp>
+        <p:nvSpPr>
+          <p:cNvPr id="104" name="TextBox 103">
+            <a:extLst>
+              <a:ext uri="{FF2B5EF4-FFF2-40B4-BE49-F238E27FC236}">
+                <a16:creationId xmlns:a16="http://schemas.microsoft.com/office/drawing/2014/main" id="{CE76B53E-FF1B-1D4B-B96C-CD6DFA2175DE}"/>
+              </a:ext>
+            </a:extLst>
+          </p:cNvPr>
+          <p:cNvSpPr txBox="1"/>
           <p:nvPr/>
         </p:nvSpPr>
         <p:spPr>
-          <a:xfrm>
-            <a:off x="6855111" y="1598360"/>
-            <a:ext cx="1100385" cy="389847"/>
+          <a:xfrm flipH="1">
+            <a:off x="1519858" y="1323230"/>
+            <a:ext cx="299550" cy="338554"/>
           </a:xfrm>
           <a:prstGeom prst="rect">
             <a:avLst/>
           </a:prstGeom>
-        </p:spPr>
-        <p:style>
-          <a:lnRef idx="2">
-            <a:schemeClr val="accent4">
-              <a:shade val="50000"/>
-            </a:schemeClr>
-          </a:lnRef>
-          <a:fillRef idx="1">
-            <a:schemeClr val="accent4"/>
-          </a:fillRef>
-          <a:effectRef idx="0">
-            <a:schemeClr val="accent4"/>
-          </a:effectRef>
-          <a:fontRef idx="minor">
-            <a:schemeClr val="lt1"/>
-          </a:fontRef>
-        </p:style>
-        <p:txBody>
-          <a:bodyPr rtlCol="0" anchor="ctr"/>
-          <a:lstStyle/>
-          <a:p>
-            <a:pPr algn="ctr"/>
-            <a:r>
-              <a:rPr lang="en-US"/>
-              <a:t>antonym</a:t>
-            </a:r>
-          </a:p>
-        </p:txBody>
-      </p:sp>
-      <p:sp>
-        <p:nvSpPr>
-          <p:cNvPr id="54" name="Rectangle 53">
-            <a:extLst>
-              <a:ext uri="{FF2B5EF4-FFF2-40B4-BE49-F238E27FC236}">
-                <a16:creationId xmlns:a16="http://schemas.microsoft.com/office/drawing/2014/main" id="{319BDFE2-154E-834A-9391-346D60E35815}"/>
-              </a:ext>
-            </a:extLst>
-          </p:cNvPr>
-          <p:cNvSpPr/>
+          <a:noFill/>
+        </p:spPr>
+        <p:txBody>
+          <a:bodyPr wrap="square" rtlCol="0">
+            <a:spAutoFit/>
+          </a:bodyPr>
+          <a:lstStyle/>
+          <a:p>
+            <a:r>
+              <a:rPr lang="en-US" sz="1600" i="1"/>
+              <a:t>d</a:t>
+            </a:r>
+          </a:p>
+        </p:txBody>
+      </p:sp>
+      <p:sp>
+        <p:nvSpPr>
+          <p:cNvPr id="105" name="TextBox 104">
+            <a:extLst>
+              <a:ext uri="{FF2B5EF4-FFF2-40B4-BE49-F238E27FC236}">
+                <a16:creationId xmlns:a16="http://schemas.microsoft.com/office/drawing/2014/main" id="{C6352254-34FD-7743-8692-5ABBA31BEF03}"/>
+              </a:ext>
+            </a:extLst>
+          </p:cNvPr>
+          <p:cNvSpPr txBox="1"/>
           <p:nvPr/>
         </p:nvSpPr>
         <p:spPr>
-          <a:xfrm>
-            <a:off x="3089573" y="2328233"/>
-            <a:ext cx="1148348" cy="389847"/>
+          <a:xfrm flipH="1">
+            <a:off x="2597997" y="1254034"/>
+            <a:ext cx="299550" cy="338554"/>
           </a:xfrm>
           <a:prstGeom prst="rect">
             <a:avLst/>
           </a:prstGeom>
-        </p:spPr>
-        <p:style>
-          <a:lnRef idx="2">
-            <a:schemeClr val="accent4">
-              <a:shade val="50000"/>
-            </a:schemeClr>
-          </a:lnRef>
-          <a:fillRef idx="1">
-            <a:schemeClr val="accent4"/>
-          </a:fillRef>
-          <a:effectRef idx="0">
-            <a:schemeClr val="accent4"/>
-          </a:effectRef>
-          <a:fontRef idx="minor">
-            <a:schemeClr val="lt1"/>
-          </a:fontRef>
-        </p:style>
-        <p:txBody>
-          <a:bodyPr rtlCol="0" anchor="ctr"/>
-          <a:lstStyle/>
-          <a:p>
-            <a:pPr algn="ctr"/>
-            <a:r>
-              <a:rPr lang="en-US"/>
-              <a:t>synonym</a:t>
-            </a:r>
-          </a:p>
-        </p:txBody>
-      </p:sp>
-      <p:sp>
-        <p:nvSpPr>
-          <p:cNvPr id="55" name="Rectangle 54">
-            <a:extLst>
-              <a:ext uri="{FF2B5EF4-FFF2-40B4-BE49-F238E27FC236}">
-                <a16:creationId xmlns:a16="http://schemas.microsoft.com/office/drawing/2014/main" id="{6DAEB3F0-78B5-024D-994E-0A9E9338B445}"/>
-              </a:ext>
-            </a:extLst>
-          </p:cNvPr>
-          <p:cNvSpPr/>
+          <a:noFill/>
+        </p:spPr>
+        <p:txBody>
+          <a:bodyPr wrap="square" rtlCol="0">
+            <a:spAutoFit/>
+          </a:bodyPr>
+          <a:lstStyle/>
+          <a:p>
+            <a:r>
+              <a:rPr lang="en-US" sz="1600" i="1"/>
+              <a:t>d</a:t>
+            </a:r>
+          </a:p>
+        </p:txBody>
+      </p:sp>
+      <p:sp>
+        <p:nvSpPr>
+          <p:cNvPr id="106" name="TextBox 105">
+            <a:extLst>
+              <a:ext uri="{FF2B5EF4-FFF2-40B4-BE49-F238E27FC236}">
+                <a16:creationId xmlns:a16="http://schemas.microsoft.com/office/drawing/2014/main" id="{76C2895E-8C5E-CF42-93AD-FF09BA0C859D}"/>
+              </a:ext>
+            </a:extLst>
+          </p:cNvPr>
+          <p:cNvSpPr txBox="1"/>
           <p:nvPr/>
         </p:nvSpPr>
         <p:spPr>
-          <a:xfrm>
-            <a:off x="3271251" y="3202059"/>
-            <a:ext cx="1012424" cy="389847"/>
+          <a:xfrm flipH="1">
+            <a:off x="6533252" y="1377104"/>
+            <a:ext cx="299550" cy="338554"/>
           </a:xfrm>
           <a:prstGeom prst="rect">
             <a:avLst/>
           </a:prstGeom>
-        </p:spPr>
-        <p:style>
-          <a:lnRef idx="2">
-            <a:schemeClr val="accent4">
-              <a:shade val="50000"/>
-            </a:schemeClr>
-          </a:lnRef>
-          <a:fillRef idx="1">
-            <a:schemeClr val="accent4"/>
-          </a:fillRef>
-          <a:effectRef idx="0">
-            <a:schemeClr val="accent4"/>
-          </a:effectRef>
-          <a:fontRef idx="minor">
-            <a:schemeClr val="lt1"/>
-          </a:fontRef>
-        </p:style>
-        <p:txBody>
-          <a:bodyPr rtlCol="0" anchor="ctr"/>
-          <a:lstStyle/>
-          <a:p>
-            <a:pPr algn="ctr"/>
-            <a:r>
-              <a:rPr lang="en-US"/>
-              <a:t>example</a:t>
-            </a:r>
-          </a:p>
-        </p:txBody>
-      </p:sp>
-      <p:sp>
-        <p:nvSpPr>
-          <p:cNvPr id="56" name="Rectangle 55">
-            <a:extLst>
-              <a:ext uri="{FF2B5EF4-FFF2-40B4-BE49-F238E27FC236}">
-                <a16:creationId xmlns:a16="http://schemas.microsoft.com/office/drawing/2014/main" id="{A8D6CAB2-DFFB-B940-9310-F0C3766EF268}"/>
-              </a:ext>
-            </a:extLst>
-          </p:cNvPr>
-          <p:cNvSpPr/>
+          <a:noFill/>
+        </p:spPr>
+        <p:txBody>
+          <a:bodyPr wrap="square" rtlCol="0">
+            <a:spAutoFit/>
+          </a:bodyPr>
+          <a:lstStyle/>
+          <a:p>
+            <a:r>
+              <a:rPr lang="en-US" sz="1600" i="1"/>
+              <a:t>d</a:t>
+            </a:r>
+          </a:p>
+        </p:txBody>
+      </p:sp>
+      <p:sp>
+        <p:nvSpPr>
+          <p:cNvPr id="107" name="TextBox 106">
+            <a:extLst>
+              <a:ext uri="{FF2B5EF4-FFF2-40B4-BE49-F238E27FC236}">
+                <a16:creationId xmlns:a16="http://schemas.microsoft.com/office/drawing/2014/main" id="{1866A2C7-740E-C945-94CF-709D7EBB2990}"/>
+              </a:ext>
+            </a:extLst>
+          </p:cNvPr>
+          <p:cNvSpPr txBox="1"/>
           <p:nvPr/>
         </p:nvSpPr>
         <p:spPr>
-          <a:xfrm>
-            <a:off x="3387412" y="3982429"/>
-            <a:ext cx="999237" cy="389847"/>
+          <a:xfrm flipH="1">
+            <a:off x="7683545" y="1550097"/>
+            <a:ext cx="299550" cy="338554"/>
           </a:xfrm>
           <a:prstGeom prst="rect">
             <a:avLst/>
           </a:prstGeom>
-        </p:spPr>
-        <p:style>
-          <a:lnRef idx="2">
-            <a:schemeClr val="accent4">
-              <a:shade val="50000"/>
-            </a:schemeClr>
-          </a:lnRef>
-          <a:fillRef idx="1">
-            <a:schemeClr val="accent4"/>
-          </a:fillRef>
-          <a:effectRef idx="0">
-            <a:schemeClr val="accent4"/>
-          </a:effectRef>
-          <a:fontRef idx="minor">
-            <a:schemeClr val="lt1"/>
-          </a:fontRef>
-        </p:style>
-        <p:txBody>
-          <a:bodyPr rtlCol="0" anchor="ctr"/>
-          <a:lstStyle/>
-          <a:p>
-            <a:pPr algn="ctr"/>
-            <a:r>
-              <a:rPr lang="en-US"/>
-              <a:t>example</a:t>
-            </a:r>
-          </a:p>
-        </p:txBody>
-      </p:sp>
-      <p:sp>
-        <p:nvSpPr>
-          <p:cNvPr id="57" name="Rectangle 56">
-            <a:extLst>
-              <a:ext uri="{FF2B5EF4-FFF2-40B4-BE49-F238E27FC236}">
-                <a16:creationId xmlns:a16="http://schemas.microsoft.com/office/drawing/2014/main" id="{C72DCF29-0765-C142-A170-220F3DEF6F65}"/>
-              </a:ext>
-            </a:extLst>
-          </p:cNvPr>
-          <p:cNvSpPr/>
+          <a:noFill/>
+        </p:spPr>
+        <p:txBody>
+          <a:bodyPr wrap="square" rtlCol="0">
+            <a:spAutoFit/>
+          </a:bodyPr>
+          <a:lstStyle/>
+          <a:p>
+            <a:r>
+              <a:rPr lang="en-US" sz="1600" i="1"/>
+              <a:t>d</a:t>
+            </a:r>
+          </a:p>
+        </p:txBody>
+      </p:sp>
+      <p:sp>
+        <p:nvSpPr>
+          <p:cNvPr id="108" name="TextBox 107">
+            <a:extLst>
+              <a:ext uri="{FF2B5EF4-FFF2-40B4-BE49-F238E27FC236}">
+                <a16:creationId xmlns:a16="http://schemas.microsoft.com/office/drawing/2014/main" id="{0422520D-299D-C34C-BAE2-C6A21C0750F3}"/>
+              </a:ext>
+            </a:extLst>
+          </p:cNvPr>
+          <p:cNvSpPr txBox="1"/>
           <p:nvPr/>
         </p:nvSpPr>
         <p:spPr>
-          <a:xfrm>
-            <a:off x="6416045" y="3130195"/>
-            <a:ext cx="1153698" cy="389847"/>
+          <a:xfrm flipH="1">
+            <a:off x="7556505" y="3110964"/>
+            <a:ext cx="299550" cy="338554"/>
           </a:xfrm>
           <a:prstGeom prst="rect">
             <a:avLst/>
           </a:prstGeom>
-        </p:spPr>
-        <p:style>
-          <a:lnRef idx="2">
-            <a:schemeClr val="accent4">
-              <a:shade val="50000"/>
-            </a:schemeClr>
-          </a:lnRef>
-          <a:fillRef idx="1">
-            <a:schemeClr val="accent4"/>
-          </a:fillRef>
-          <a:effectRef idx="0">
-            <a:schemeClr val="accent4"/>
-          </a:effectRef>
-          <a:fontRef idx="minor">
-            <a:schemeClr val="lt1"/>
-          </a:fontRef>
-        </p:style>
-        <p:txBody>
-          <a:bodyPr rtlCol="0" anchor="ctr"/>
-          <a:lstStyle/>
-          <a:p>
-            <a:pPr algn="ctr"/>
-            <a:r>
-              <a:rPr lang="en-US"/>
-              <a:t>Definition</a:t>
-            </a:r>
-          </a:p>
-        </p:txBody>
-      </p:sp>
-      <p:sp>
-        <p:nvSpPr>
-          <p:cNvPr id="58" name="Rectangle 57">
-            <a:extLst>
-              <a:ext uri="{FF2B5EF4-FFF2-40B4-BE49-F238E27FC236}">
-                <a16:creationId xmlns:a16="http://schemas.microsoft.com/office/drawing/2014/main" id="{B31028EA-5D98-504B-B898-1B86A75267CD}"/>
-              </a:ext>
-            </a:extLst>
-          </p:cNvPr>
-          <p:cNvSpPr/>
+          <a:noFill/>
+        </p:spPr>
+        <p:txBody>
+          <a:bodyPr wrap="square" rtlCol="0">
+            <a:spAutoFit/>
+          </a:bodyPr>
+          <a:lstStyle/>
+          <a:p>
+            <a:r>
+              <a:rPr lang="en-US" sz="1600" i="1"/>
+              <a:t>e</a:t>
+            </a:r>
+          </a:p>
+        </p:txBody>
+      </p:sp>
+      <p:sp>
+        <p:nvSpPr>
+          <p:cNvPr id="109" name="TextBox 108">
+            <a:extLst>
+              <a:ext uri="{FF2B5EF4-FFF2-40B4-BE49-F238E27FC236}">
+                <a16:creationId xmlns:a16="http://schemas.microsoft.com/office/drawing/2014/main" id="{3317F754-2ACE-3541-B89B-10182D277E67}"/>
+              </a:ext>
+            </a:extLst>
+          </p:cNvPr>
+          <p:cNvSpPr txBox="1"/>
           <p:nvPr/>
         </p:nvSpPr>
         <p:spPr>
-          <a:xfrm>
-            <a:off x="5970774" y="3813482"/>
-            <a:ext cx="1234016" cy="424281"/>
+          <a:xfrm flipH="1">
+            <a:off x="6327157" y="2827913"/>
+            <a:ext cx="299550" cy="338554"/>
           </a:xfrm>
           <a:prstGeom prst="rect">
             <a:avLst/>
           </a:prstGeom>
-        </p:spPr>
-        <p:style>
-          <a:lnRef idx="2">
-            <a:schemeClr val="accent4">
-              <a:shade val="50000"/>
-            </a:schemeClr>
-          </a:lnRef>
-          <a:fillRef idx="1">
-            <a:schemeClr val="accent4"/>
-          </a:fillRef>
-          <a:effectRef idx="0">
-            <a:schemeClr val="accent4"/>
-          </a:effectRef>
-          <a:fontRef idx="minor">
-            <a:schemeClr val="lt1"/>
-          </a:fontRef>
-        </p:style>
-        <p:txBody>
-          <a:bodyPr rtlCol="0" anchor="ctr"/>
-          <a:lstStyle/>
-          <a:p>
-            <a:pPr algn="ctr"/>
-            <a:r>
-              <a:rPr lang="en-US"/>
-              <a:t>Definition</a:t>
-            </a:r>
-          </a:p>
-        </p:txBody>
-      </p:sp>
-      <p:sp>
-        <p:nvSpPr>
-          <p:cNvPr id="59" name="Rectangle 58">
-            <a:extLst>
-              <a:ext uri="{FF2B5EF4-FFF2-40B4-BE49-F238E27FC236}">
-                <a16:creationId xmlns:a16="http://schemas.microsoft.com/office/drawing/2014/main" id="{B855F05C-DE03-3B4A-AADF-E1D6D31854A2}"/>
-              </a:ext>
-            </a:extLst>
-          </p:cNvPr>
-          <p:cNvSpPr/>
+          <a:noFill/>
+        </p:spPr>
+        <p:txBody>
+          <a:bodyPr wrap="square" rtlCol="0">
+            <a:spAutoFit/>
+          </a:bodyPr>
+          <a:lstStyle/>
+          <a:p>
+            <a:r>
+              <a:rPr lang="en-US" sz="1600" i="1"/>
+              <a:t>e</a:t>
+            </a:r>
+          </a:p>
+        </p:txBody>
+      </p:sp>
+      <p:sp>
+        <p:nvSpPr>
+          <p:cNvPr id="110" name="TextBox 109">
+            <a:extLst>
+              <a:ext uri="{FF2B5EF4-FFF2-40B4-BE49-F238E27FC236}">
+                <a16:creationId xmlns:a16="http://schemas.microsoft.com/office/drawing/2014/main" id="{A0BD7C73-83CD-5545-992A-2439917F9E3D}"/>
+              </a:ext>
+            </a:extLst>
+          </p:cNvPr>
+          <p:cNvSpPr txBox="1"/>
           <p:nvPr/>
         </p:nvSpPr>
         <p:spPr>
-          <a:xfrm>
-            <a:off x="3603856" y="1727598"/>
-            <a:ext cx="1153698" cy="389847"/>
+          <a:xfrm flipH="1">
+            <a:off x="2932424" y="3662891"/>
+            <a:ext cx="299550" cy="338554"/>
           </a:xfrm>
           <a:prstGeom prst="rect">
             <a:avLst/>
           </a:prstGeom>
-        </p:spPr>
-        <p:style>
-          <a:lnRef idx="2">
-            <a:schemeClr val="accent4">
-              <a:shade val="50000"/>
-            </a:schemeClr>
-          </a:lnRef>
-          <a:fillRef idx="1">
-            <a:schemeClr val="accent4"/>
-          </a:fillRef>
-          <a:effectRef idx="0">
-            <a:schemeClr val="accent4"/>
-          </a:effectRef>
-          <a:fontRef idx="minor">
-            <a:schemeClr val="lt1"/>
-          </a:fontRef>
-        </p:style>
-        <p:txBody>
-          <a:bodyPr rtlCol="0" anchor="ctr"/>
-          <a:lstStyle/>
-          <a:p>
-            <a:pPr algn="ctr"/>
-            <a:r>
-              <a:rPr lang="en-US"/>
-              <a:t>Definition</a:t>
+          <a:noFill/>
+        </p:spPr>
+        <p:txBody>
+          <a:bodyPr wrap="square" rtlCol="0">
+            <a:spAutoFit/>
+          </a:bodyPr>
+          <a:lstStyle/>
+          <a:p>
+            <a:r>
+              <a:rPr lang="en-US" sz="1600" i="1"/>
+              <a:t>e</a:t>
+            </a:r>
+          </a:p>
+        </p:txBody>
+      </p:sp>
+      <p:sp>
+        <p:nvSpPr>
+          <p:cNvPr id="111" name="TextBox 110">
+            <a:extLst>
+              <a:ext uri="{FF2B5EF4-FFF2-40B4-BE49-F238E27FC236}">
+                <a16:creationId xmlns:a16="http://schemas.microsoft.com/office/drawing/2014/main" id="{7CFBED07-4FDD-5B46-A699-114AC129271C}"/>
+              </a:ext>
+            </a:extLst>
+          </p:cNvPr>
+          <p:cNvSpPr txBox="1"/>
+          <p:nvPr/>
+        </p:nvSpPr>
+        <p:spPr>
+          <a:xfrm flipH="1">
+            <a:off x="2125327" y="3007120"/>
+            <a:ext cx="299550" cy="338554"/>
+          </a:xfrm>
+          <a:prstGeom prst="rect">
+            <a:avLst/>
+          </a:prstGeom>
+          <a:noFill/>
+        </p:spPr>
+        <p:txBody>
+          <a:bodyPr wrap="square" rtlCol="0">
+            <a:spAutoFit/>
+          </a:bodyPr>
+          <a:lstStyle/>
+          <a:p>
+            <a:r>
+              <a:rPr lang="en-US" sz="1600" i="1"/>
+              <a:t>e</a:t>
+            </a:r>
+          </a:p>
+        </p:txBody>
+      </p:sp>
+      <p:sp>
+        <p:nvSpPr>
+          <p:cNvPr id="112" name="TextBox 111">
+            <a:extLst>
+              <a:ext uri="{FF2B5EF4-FFF2-40B4-BE49-F238E27FC236}">
+                <a16:creationId xmlns:a16="http://schemas.microsoft.com/office/drawing/2014/main" id="{CBC4F443-A676-054C-AE26-EE234F90F5A4}"/>
+              </a:ext>
+            </a:extLst>
+          </p:cNvPr>
+          <p:cNvSpPr txBox="1"/>
+          <p:nvPr/>
+        </p:nvSpPr>
+        <p:spPr>
+          <a:xfrm flipH="1">
+            <a:off x="1200214" y="2523894"/>
+            <a:ext cx="299550" cy="338554"/>
+          </a:xfrm>
+          <a:prstGeom prst="rect">
+            <a:avLst/>
+          </a:prstGeom>
+          <a:noFill/>
+        </p:spPr>
+        <p:txBody>
+          <a:bodyPr wrap="square" rtlCol="0">
+            <a:spAutoFit/>
+          </a:bodyPr>
+          <a:lstStyle/>
+          <a:p>
+            <a:r>
+              <a:rPr lang="en-US" sz="1600" i="1"/>
+              <a:t>e</a:t>
+            </a:r>
+          </a:p>
+        </p:txBody>
+      </p:sp>
+      <p:sp>
+        <p:nvSpPr>
+          <p:cNvPr id="113" name="TextBox 112">
+            <a:extLst>
+              <a:ext uri="{FF2B5EF4-FFF2-40B4-BE49-F238E27FC236}">
+                <a16:creationId xmlns:a16="http://schemas.microsoft.com/office/drawing/2014/main" id="{666AB102-1489-AC43-80F1-FE0DD59F9B65}"/>
+              </a:ext>
+            </a:extLst>
+          </p:cNvPr>
+          <p:cNvSpPr txBox="1"/>
+          <p:nvPr/>
+        </p:nvSpPr>
+        <p:spPr>
+          <a:xfrm flipH="1">
+            <a:off x="3364012" y="2185340"/>
+            <a:ext cx="490169" cy="338554"/>
+          </a:xfrm>
+          <a:prstGeom prst="rect">
+            <a:avLst/>
+          </a:prstGeom>
+          <a:noFill/>
+        </p:spPr>
+        <p:txBody>
+          <a:bodyPr wrap="square" rtlCol="0">
+            <a:spAutoFit/>
+          </a:bodyPr>
+          <a:lstStyle/>
+          <a:p>
+            <a:r>
+              <a:rPr lang="en-US" sz="1600" i="1"/>
+              <a:t>sc</a:t>
+            </a:r>
+          </a:p>
+        </p:txBody>
+      </p:sp>
+      <p:sp>
+        <p:nvSpPr>
+          <p:cNvPr id="114" name="TextBox 113">
+            <a:extLst>
+              <a:ext uri="{FF2B5EF4-FFF2-40B4-BE49-F238E27FC236}">
+                <a16:creationId xmlns:a16="http://schemas.microsoft.com/office/drawing/2014/main" id="{F4E39BAE-017D-1347-8E27-C86A7C7F1AB2}"/>
+              </a:ext>
+            </a:extLst>
+          </p:cNvPr>
+          <p:cNvSpPr txBox="1"/>
+          <p:nvPr/>
+        </p:nvSpPr>
+        <p:spPr>
+          <a:xfrm flipH="1">
+            <a:off x="4761899" y="1678037"/>
+            <a:ext cx="490169" cy="338554"/>
+          </a:xfrm>
+          <a:prstGeom prst="rect">
+            <a:avLst/>
+          </a:prstGeom>
+          <a:noFill/>
+        </p:spPr>
+        <p:txBody>
+          <a:bodyPr wrap="square" rtlCol="0">
+            <a:spAutoFit/>
+          </a:bodyPr>
+          <a:lstStyle/>
+          <a:p>
+            <a:r>
+              <a:rPr lang="en-US" sz="1600" i="1"/>
+              <a:t>sc</a:t>
+            </a:r>
+          </a:p>
+        </p:txBody>
+      </p:sp>
+      <p:sp>
+        <p:nvSpPr>
+          <p:cNvPr id="115" name="TextBox 114">
+            <a:extLst>
+              <a:ext uri="{FF2B5EF4-FFF2-40B4-BE49-F238E27FC236}">
+                <a16:creationId xmlns:a16="http://schemas.microsoft.com/office/drawing/2014/main" id="{C86625F1-9162-3742-930D-4C32A1565841}"/>
+              </a:ext>
+            </a:extLst>
+          </p:cNvPr>
+          <p:cNvSpPr txBox="1"/>
+          <p:nvPr/>
+        </p:nvSpPr>
+        <p:spPr>
+          <a:xfrm flipH="1">
+            <a:off x="5461796" y="2300643"/>
+            <a:ext cx="490169" cy="338554"/>
+          </a:xfrm>
+          <a:prstGeom prst="rect">
+            <a:avLst/>
+          </a:prstGeom>
+          <a:noFill/>
+        </p:spPr>
+        <p:txBody>
+          <a:bodyPr wrap="square" rtlCol="0">
+            <a:spAutoFit/>
+          </a:bodyPr>
+          <a:lstStyle/>
+          <a:p>
+            <a:r>
+              <a:rPr lang="en-US" sz="1600" i="1"/>
+              <a:t>sc</a:t>
+            </a:r>
+          </a:p>
+        </p:txBody>
+      </p:sp>
+      <p:sp>
+        <p:nvSpPr>
+          <p:cNvPr id="116" name="TextBox 115">
+            <a:extLst>
+              <a:ext uri="{FF2B5EF4-FFF2-40B4-BE49-F238E27FC236}">
+                <a16:creationId xmlns:a16="http://schemas.microsoft.com/office/drawing/2014/main" id="{C3C5C888-F36C-0E42-9738-10880A32565F}"/>
+              </a:ext>
+            </a:extLst>
+          </p:cNvPr>
+          <p:cNvSpPr txBox="1"/>
+          <p:nvPr/>
+        </p:nvSpPr>
+        <p:spPr>
+          <a:xfrm flipH="1">
+            <a:off x="3882996" y="4178246"/>
+            <a:ext cx="490169" cy="338554"/>
+          </a:xfrm>
+          <a:prstGeom prst="rect">
+            <a:avLst/>
+          </a:prstGeom>
+          <a:noFill/>
+        </p:spPr>
+        <p:txBody>
+          <a:bodyPr wrap="square" rtlCol="0">
+            <a:spAutoFit/>
+          </a:bodyPr>
+          <a:lstStyle/>
+          <a:p>
+            <a:r>
+              <a:rPr lang="en-US" sz="1600" i="1"/>
+              <a:t>syn</a:t>
+            </a:r>
+          </a:p>
+        </p:txBody>
+      </p:sp>
+      <p:sp>
+        <p:nvSpPr>
+          <p:cNvPr id="117" name="TextBox 116">
+            <a:extLst>
+              <a:ext uri="{FF2B5EF4-FFF2-40B4-BE49-F238E27FC236}">
+                <a16:creationId xmlns:a16="http://schemas.microsoft.com/office/drawing/2014/main" id="{812E84F0-A992-9B44-8A6D-A1E4D9FEE884}"/>
+              </a:ext>
+            </a:extLst>
+          </p:cNvPr>
+          <p:cNvSpPr txBox="1"/>
+          <p:nvPr/>
+        </p:nvSpPr>
+        <p:spPr>
+          <a:xfrm flipH="1">
+            <a:off x="4850636" y="4101942"/>
+            <a:ext cx="490169" cy="338554"/>
+          </a:xfrm>
+          <a:prstGeom prst="rect">
+            <a:avLst/>
+          </a:prstGeom>
+          <a:noFill/>
+        </p:spPr>
+        <p:txBody>
+          <a:bodyPr wrap="square" rtlCol="0">
+            <a:spAutoFit/>
+          </a:bodyPr>
+          <a:lstStyle/>
+          <a:p>
+            <a:r>
+              <a:rPr lang="en-US" sz="1600" i="1"/>
+              <a:t>syn</a:t>
+            </a:r>
+          </a:p>
+        </p:txBody>
+      </p:sp>
+      <p:sp>
+        <p:nvSpPr>
+          <p:cNvPr id="118" name="TextBox 117">
+            <a:extLst>
+              <a:ext uri="{FF2B5EF4-FFF2-40B4-BE49-F238E27FC236}">
+                <a16:creationId xmlns:a16="http://schemas.microsoft.com/office/drawing/2014/main" id="{7E7E4AAF-C7EF-424D-9B8B-35B47E86B76B}"/>
+              </a:ext>
+            </a:extLst>
+          </p:cNvPr>
+          <p:cNvSpPr txBox="1"/>
+          <p:nvPr/>
+        </p:nvSpPr>
+        <p:spPr>
+          <a:xfrm flipH="1">
+            <a:off x="6429144" y="4376531"/>
+            <a:ext cx="490169" cy="338554"/>
+          </a:xfrm>
+          <a:prstGeom prst="rect">
+            <a:avLst/>
+          </a:prstGeom>
+          <a:noFill/>
+        </p:spPr>
+        <p:txBody>
+          <a:bodyPr wrap="square" rtlCol="0">
+            <a:spAutoFit/>
+          </a:bodyPr>
+          <a:lstStyle/>
+          <a:p>
+            <a:r>
+              <a:rPr lang="en-US" sz="1600" i="1"/>
+              <a:t>ant</a:t>
             </a:r>
           </a:p>
         </p:txBody>
@@ -6065,7 +5575,7 @@
     </p:spTree>
     <p:extLst>
       <p:ext uri="{BB962C8B-B14F-4D97-AF65-F5344CB8AC3E}">
-        <p14:creationId xmlns:p14="http://schemas.microsoft.com/office/powerpoint/2010/main" val="2347416145"/>
+        <p14:creationId xmlns:p14="http://schemas.microsoft.com/office/powerpoint/2010/main" val="2922175956"/>
       </p:ext>
     </p:extLst>
   </p:cSld>

</xml_diff>

<commit_message>
Reorganizing: BabelNet-DESA WordNet-ESA OmegaWiki-S ...
Former-commit-id: d19b72f2e8d6bd0025b6800aae61411ea340fb8e
</commit_message>
<xml_diff>
--- a/Plan_Task1.pptx
+++ b/Plan_Task1.pptx
@@ -261,7 +261,7 @@
           <a:lstStyle/>
           <a:p>
             <a:fld id="{803220A4-8895-6D46-A558-2CE2469121C7}" type="datetimeFigureOut">
-              <a:t>9/2/19</a:t>
+              <a:t>9/5/19</a:t>
             </a:fld>
             <a:endParaRPr lang="en-US"/>
           </a:p>
@@ -459,7 +459,7 @@
           <a:lstStyle/>
           <a:p>
             <a:fld id="{803220A4-8895-6D46-A558-2CE2469121C7}" type="datetimeFigureOut">
-              <a:t>9/2/19</a:t>
+              <a:t>9/5/19</a:t>
             </a:fld>
             <a:endParaRPr lang="en-US"/>
           </a:p>
@@ -667,7 +667,7 @@
           <a:lstStyle/>
           <a:p>
             <a:fld id="{803220A4-8895-6D46-A558-2CE2469121C7}" type="datetimeFigureOut">
-              <a:t>9/2/19</a:t>
+              <a:t>9/5/19</a:t>
             </a:fld>
             <a:endParaRPr lang="en-US"/>
           </a:p>
@@ -865,7 +865,7 @@
           <a:lstStyle/>
           <a:p>
             <a:fld id="{803220A4-8895-6D46-A558-2CE2469121C7}" type="datetimeFigureOut">
-              <a:t>9/2/19</a:t>
+              <a:t>9/5/19</a:t>
             </a:fld>
             <a:endParaRPr lang="en-US"/>
           </a:p>
@@ -1139,7 +1139,7 @@
           <a:lstStyle/>
           <a:p>
             <a:fld id="{803220A4-8895-6D46-A558-2CE2469121C7}" type="datetimeFigureOut">
-              <a:t>9/2/19</a:t>
+              <a:t>9/5/19</a:t>
             </a:fld>
             <a:endParaRPr lang="en-US"/>
           </a:p>
@@ -1405,7 +1405,7 @@
           <a:lstStyle/>
           <a:p>
             <a:fld id="{803220A4-8895-6D46-A558-2CE2469121C7}" type="datetimeFigureOut">
-              <a:t>9/2/19</a:t>
+              <a:t>9/5/19</a:t>
             </a:fld>
             <a:endParaRPr lang="en-US"/>
           </a:p>
@@ -1818,7 +1818,7 @@
           <a:lstStyle/>
           <a:p>
             <a:fld id="{803220A4-8895-6D46-A558-2CE2469121C7}" type="datetimeFigureOut">
-              <a:t>9/2/19</a:t>
+              <a:t>9/5/19</a:t>
             </a:fld>
             <a:endParaRPr lang="en-US"/>
           </a:p>
@@ -1958,7 +1958,7 @@
           <a:lstStyle/>
           <a:p>
             <a:fld id="{803220A4-8895-6D46-A558-2CE2469121C7}" type="datetimeFigureOut">
-              <a:t>9/2/19</a:t>
+              <a:t>9/5/19</a:t>
             </a:fld>
             <a:endParaRPr lang="en-US"/>
           </a:p>
@@ -2069,7 +2069,7 @@
           <a:lstStyle/>
           <a:p>
             <a:fld id="{803220A4-8895-6D46-A558-2CE2469121C7}" type="datetimeFigureOut">
-              <a:t>9/2/19</a:t>
+              <a:t>9/5/19</a:t>
             </a:fld>
             <a:endParaRPr lang="en-US"/>
           </a:p>
@@ -2380,7 +2380,7 @@
           <a:lstStyle/>
           <a:p>
             <a:fld id="{803220A4-8895-6D46-A558-2CE2469121C7}" type="datetimeFigureOut">
-              <a:t>9/2/19</a:t>
+              <a:t>9/5/19</a:t>
             </a:fld>
             <a:endParaRPr lang="en-US"/>
           </a:p>
@@ -2667,7 +2667,7 @@
           <a:lstStyle/>
           <a:p>
             <a:fld id="{803220A4-8895-6D46-A558-2CE2469121C7}" type="datetimeFigureOut">
-              <a:t>9/2/19</a:t>
+              <a:t>9/5/19</a:t>
             </a:fld>
             <a:endParaRPr lang="en-US"/>
           </a:p>
@@ -2908,7 +2908,7 @@
           </a:lstStyle>
           <a:p>
             <a:fld id="{803220A4-8895-6D46-A558-2CE2469121C7}" type="datetimeFigureOut">
-              <a:t>9/2/19</a:t>
+              <a:t>9/5/19</a:t>
             </a:fld>
             <a:endParaRPr lang="en-US"/>
           </a:p>
@@ -3417,7 +3417,7 @@
         </p:nvSpPr>
         <p:spPr>
           <a:xfrm>
-            <a:off x="1485250" y="1819529"/>
+            <a:off x="2646808" y="1980170"/>
             <a:ext cx="1234161" cy="819668"/>
           </a:xfrm>
           <a:prstGeom prst="hexagon">
@@ -3464,7 +3464,7 @@
         </p:nvSpPr>
         <p:spPr>
           <a:xfrm>
-            <a:off x="6627885" y="1973637"/>
+            <a:off x="7789443" y="2134278"/>
             <a:ext cx="1243912" cy="819667"/>
           </a:xfrm>
           <a:prstGeom prst="hexagon">
@@ -3511,7 +3511,7 @@
         </p:nvSpPr>
         <p:spPr>
           <a:xfrm>
-            <a:off x="4908997" y="300680"/>
+            <a:off x="6070555" y="461321"/>
             <a:ext cx="1243912" cy="704335"/>
           </a:xfrm>
           <a:prstGeom prst="hexagon">
@@ -3558,7 +3558,7 @@
         </p:nvSpPr>
         <p:spPr>
           <a:xfrm>
-            <a:off x="197739" y="337751"/>
+            <a:off x="1359297" y="498392"/>
             <a:ext cx="889686" cy="704335"/>
           </a:xfrm>
           <a:prstGeom prst="ellipse">
@@ -3605,7 +3605,7 @@
         </p:nvSpPr>
         <p:spPr>
           <a:xfrm>
-            <a:off x="1245474" y="580771"/>
+            <a:off x="2407032" y="741412"/>
             <a:ext cx="889686" cy="704335"/>
           </a:xfrm>
           <a:prstGeom prst="ellipse">
@@ -3652,7 +3652,7 @@
         </p:nvSpPr>
         <p:spPr>
           <a:xfrm>
-            <a:off x="2705372" y="300680"/>
+            <a:off x="3866930" y="461321"/>
             <a:ext cx="889686" cy="704335"/>
           </a:xfrm>
           <a:prstGeom prst="ellipse">
@@ -3699,7 +3699,7 @@
         </p:nvSpPr>
         <p:spPr>
           <a:xfrm>
-            <a:off x="6569948" y="549700"/>
+            <a:off x="7731506" y="710341"/>
             <a:ext cx="889686" cy="704335"/>
           </a:xfrm>
           <a:prstGeom prst="ellipse">
@@ -3746,7 +3746,7 @@
         </p:nvSpPr>
         <p:spPr>
           <a:xfrm>
-            <a:off x="7664552" y="901867"/>
+            <a:off x="8826110" y="1062508"/>
             <a:ext cx="889686" cy="704335"/>
           </a:xfrm>
           <a:prstGeom prst="ellipse">
@@ -3793,7 +3793,7 @@
         </p:nvSpPr>
         <p:spPr>
           <a:xfrm>
-            <a:off x="610078" y="2821452"/>
+            <a:off x="1771636" y="2982093"/>
             <a:ext cx="889686" cy="704335"/>
           </a:xfrm>
           <a:prstGeom prst="ellipse">
@@ -3840,7 +3840,7 @@
         </p:nvSpPr>
         <p:spPr>
           <a:xfrm>
-            <a:off x="1751018" y="3358971"/>
+            <a:off x="2912576" y="3519612"/>
             <a:ext cx="889686" cy="704335"/>
           </a:xfrm>
           <a:prstGeom prst="ellipse">
@@ -3887,7 +3887,7 @@
         </p:nvSpPr>
         <p:spPr>
           <a:xfrm>
-            <a:off x="2719411" y="4143637"/>
+            <a:off x="3880969" y="4304278"/>
             <a:ext cx="889686" cy="704335"/>
           </a:xfrm>
           <a:prstGeom prst="ellipse">
@@ -3934,7 +3934,7 @@
         </p:nvSpPr>
         <p:spPr>
           <a:xfrm>
-            <a:off x="6078767" y="3210523"/>
+            <a:off x="7240325" y="3371164"/>
             <a:ext cx="889686" cy="704335"/>
           </a:xfrm>
           <a:prstGeom prst="ellipse">
@@ -3981,7 +3981,7 @@
         </p:nvSpPr>
         <p:spPr>
           <a:xfrm>
-            <a:off x="7123428" y="3708917"/>
+            <a:off x="8284986" y="3869558"/>
             <a:ext cx="889686" cy="704335"/>
           </a:xfrm>
           <a:prstGeom prst="ellipse">
@@ -4032,7 +4032,7 @@
         </p:nvCxnSpPr>
         <p:spPr>
           <a:xfrm>
-            <a:off x="957134" y="938939"/>
+            <a:off x="2118692" y="1099580"/>
             <a:ext cx="733033" cy="880590"/>
           </a:xfrm>
           <a:prstGeom prst="straightConnector1">
@@ -4075,7 +4075,7 @@
         </p:nvCxnSpPr>
         <p:spPr>
           <a:xfrm flipH="1">
-            <a:off x="1690167" y="1285106"/>
+            <a:off x="2851725" y="1445747"/>
             <a:ext cx="150" cy="534423"/>
           </a:xfrm>
           <a:prstGeom prst="straightConnector1">
@@ -4118,7 +4118,7 @@
         </p:nvCxnSpPr>
         <p:spPr>
           <a:xfrm flipH="1">
-            <a:off x="2514494" y="901868"/>
+            <a:off x="3676052" y="1062509"/>
             <a:ext cx="321169" cy="917661"/>
           </a:xfrm>
           <a:prstGeom prst="straightConnector1">
@@ -4161,7 +4161,7 @@
         </p:nvCxnSpPr>
         <p:spPr>
           <a:xfrm>
-            <a:off x="6700239" y="1150888"/>
+            <a:off x="7861797" y="1311529"/>
             <a:ext cx="132563" cy="822749"/>
           </a:xfrm>
           <a:prstGeom prst="straightConnector1">
@@ -4204,7 +4204,7 @@
         </p:nvCxnSpPr>
         <p:spPr>
           <a:xfrm flipH="1">
-            <a:off x="7666880" y="1503055"/>
+            <a:off x="8828438" y="1663696"/>
             <a:ext cx="127963" cy="470582"/>
           </a:xfrm>
           <a:prstGeom prst="straightConnector1">
@@ -4247,7 +4247,7 @@
         </p:nvCxnSpPr>
         <p:spPr>
           <a:xfrm flipV="1">
-            <a:off x="1054921" y="2639197"/>
+            <a:off x="2216479" y="2799838"/>
             <a:ext cx="635246" cy="182255"/>
           </a:xfrm>
           <a:prstGeom prst="straightConnector1">
@@ -4290,7 +4290,7 @@
         </p:nvCxnSpPr>
         <p:spPr>
           <a:xfrm flipV="1">
-            <a:off x="2195861" y="2639197"/>
+            <a:off x="3357419" y="2799838"/>
             <a:ext cx="318633" cy="719774"/>
           </a:xfrm>
           <a:prstGeom prst="straightConnector1">
@@ -4333,7 +4333,7 @@
         </p:nvCxnSpPr>
         <p:spPr>
           <a:xfrm flipH="1" flipV="1">
-            <a:off x="2514494" y="2639197"/>
+            <a:off x="3676052" y="2799838"/>
             <a:ext cx="649760" cy="1504440"/>
           </a:xfrm>
           <a:prstGeom prst="straightConnector1">
@@ -4376,7 +4376,7 @@
         </p:nvCxnSpPr>
         <p:spPr>
           <a:xfrm flipV="1">
-            <a:off x="6209058" y="2793304"/>
+            <a:off x="7370616" y="2953945"/>
             <a:ext cx="623744" cy="520366"/>
           </a:xfrm>
           <a:prstGeom prst="straightConnector1">
@@ -4419,7 +4419,7 @@
         </p:nvCxnSpPr>
         <p:spPr>
           <a:xfrm flipV="1">
-            <a:off x="7568271" y="2793304"/>
+            <a:off x="8729829" y="2953945"/>
             <a:ext cx="98609" cy="915613"/>
           </a:xfrm>
           <a:prstGeom prst="straightConnector1">
@@ -4458,7 +4458,7 @@
         </p:nvSpPr>
         <p:spPr>
           <a:xfrm>
-            <a:off x="4062654" y="2747144"/>
+            <a:off x="5224212" y="2907785"/>
             <a:ext cx="963827" cy="815546"/>
           </a:xfrm>
           <a:prstGeom prst="rect">
@@ -4517,7 +4517,7 @@
         </p:nvCxnSpPr>
         <p:spPr>
           <a:xfrm flipH="1" flipV="1">
-            <a:off x="2719411" y="2229363"/>
+            <a:off x="3880969" y="2390004"/>
             <a:ext cx="1825157" cy="517781"/>
           </a:xfrm>
           <a:prstGeom prst="straightConnector1">
@@ -4559,7 +4559,7 @@
         </p:nvCxnSpPr>
         <p:spPr>
           <a:xfrm flipV="1">
-            <a:off x="4544568" y="2383471"/>
+            <a:off x="5706126" y="2544112"/>
             <a:ext cx="2083317" cy="363673"/>
           </a:xfrm>
           <a:prstGeom prst="straightConnector1">
@@ -4601,7 +4601,7 @@
         </p:nvCxnSpPr>
         <p:spPr>
           <a:xfrm flipV="1">
-            <a:off x="4544568" y="1005015"/>
+            <a:off x="5706126" y="1165656"/>
             <a:ext cx="540513" cy="1742129"/>
           </a:xfrm>
           <a:prstGeom prst="straightConnector1">
@@ -4640,7 +4640,7 @@
         </p:nvSpPr>
         <p:spPr>
           <a:xfrm>
-            <a:off x="3164254" y="5132357"/>
+            <a:off x="4325812" y="5292998"/>
             <a:ext cx="963827" cy="815546"/>
           </a:xfrm>
           <a:prstGeom prst="rect">
@@ -4696,7 +4696,7 @@
         </p:nvSpPr>
         <p:spPr>
           <a:xfrm>
-            <a:off x="5049039" y="4724584"/>
+            <a:off x="6210597" y="4885225"/>
             <a:ext cx="963827" cy="815546"/>
           </a:xfrm>
           <a:prstGeom prst="rect">
@@ -4752,7 +4752,7 @@
         </p:nvSpPr>
         <p:spPr>
           <a:xfrm>
-            <a:off x="7794843" y="5132357"/>
+            <a:off x="8956401" y="5292998"/>
             <a:ext cx="963827" cy="815546"/>
           </a:xfrm>
           <a:prstGeom prst="rect">
@@ -4811,7 +4811,7 @@
         </p:nvCxnSpPr>
         <p:spPr>
           <a:xfrm flipH="1">
-            <a:off x="3646168" y="3562690"/>
+            <a:off x="4807726" y="3723331"/>
             <a:ext cx="898400" cy="1569667"/>
           </a:xfrm>
           <a:prstGeom prst="straightConnector1">
@@ -4853,7 +4853,7 @@
         </p:nvCxnSpPr>
         <p:spPr>
           <a:xfrm>
-            <a:off x="4544568" y="3562690"/>
+            <a:off x="5706126" y="3723331"/>
             <a:ext cx="986385" cy="1161894"/>
           </a:xfrm>
           <a:prstGeom prst="straightConnector1">
@@ -4895,7 +4895,7 @@
         </p:nvCxnSpPr>
         <p:spPr>
           <a:xfrm>
-            <a:off x="4544568" y="3562690"/>
+            <a:off x="5706126" y="3723331"/>
             <a:ext cx="3732189" cy="1569667"/>
           </a:xfrm>
           <a:prstGeom prst="straightConnector1">
@@ -4934,7 +4934,7 @@
         </p:nvSpPr>
         <p:spPr>
           <a:xfrm rot="19247124">
-            <a:off x="183301" y="3471561"/>
+            <a:off x="1344859" y="3632202"/>
             <a:ext cx="566894" cy="182255"/>
           </a:xfrm>
           <a:prstGeom prst="rightArrow">
@@ -4980,7 +4980,7 @@
         </p:nvSpPr>
         <p:spPr>
           <a:xfrm rot="19247124">
-            <a:off x="-24963" y="1119971"/>
+            <a:off x="1136595" y="1280612"/>
             <a:ext cx="566894" cy="182255"/>
           </a:xfrm>
           <a:prstGeom prst="rightArrow">
@@ -5026,7 +5026,7 @@
         </p:nvSpPr>
         <p:spPr>
           <a:xfrm>
-            <a:off x="984310" y="1170830"/>
+            <a:off x="2145868" y="1331471"/>
             <a:ext cx="383148" cy="338554"/>
           </a:xfrm>
           <a:prstGeom prst="rect">
@@ -5061,7 +5061,7 @@
         </p:nvSpPr>
         <p:spPr>
           <a:xfrm flipH="1">
-            <a:off x="1519858" y="1323230"/>
+            <a:off x="2681416" y="1483871"/>
             <a:ext cx="299550" cy="338554"/>
           </a:xfrm>
           <a:prstGeom prst="rect">
@@ -5096,7 +5096,7 @@
         </p:nvSpPr>
         <p:spPr>
           <a:xfrm flipH="1">
-            <a:off x="2597997" y="1254034"/>
+            <a:off x="3759555" y="1414675"/>
             <a:ext cx="299550" cy="338554"/>
           </a:xfrm>
           <a:prstGeom prst="rect">
@@ -5131,7 +5131,7 @@
         </p:nvSpPr>
         <p:spPr>
           <a:xfrm flipH="1">
-            <a:off x="6533252" y="1377104"/>
+            <a:off x="7694810" y="1537745"/>
             <a:ext cx="299550" cy="338554"/>
           </a:xfrm>
           <a:prstGeom prst="rect">
@@ -5166,7 +5166,7 @@
         </p:nvSpPr>
         <p:spPr>
           <a:xfrm flipH="1">
-            <a:off x="7683545" y="1550097"/>
+            <a:off x="8845103" y="1710738"/>
             <a:ext cx="299550" cy="338554"/>
           </a:xfrm>
           <a:prstGeom prst="rect">
@@ -5201,7 +5201,7 @@
         </p:nvSpPr>
         <p:spPr>
           <a:xfrm flipH="1">
-            <a:off x="7556505" y="3110964"/>
+            <a:off x="8718063" y="3271605"/>
             <a:ext cx="299550" cy="338554"/>
           </a:xfrm>
           <a:prstGeom prst="rect">
@@ -5236,7 +5236,7 @@
         </p:nvSpPr>
         <p:spPr>
           <a:xfrm flipH="1">
-            <a:off x="6327157" y="2827913"/>
+            <a:off x="7488715" y="2988554"/>
             <a:ext cx="299550" cy="338554"/>
           </a:xfrm>
           <a:prstGeom prst="rect">
@@ -5271,7 +5271,7 @@
         </p:nvSpPr>
         <p:spPr>
           <a:xfrm flipH="1">
-            <a:off x="2932424" y="3662891"/>
+            <a:off x="4093982" y="3823532"/>
             <a:ext cx="299550" cy="338554"/>
           </a:xfrm>
           <a:prstGeom prst="rect">
@@ -5306,7 +5306,7 @@
         </p:nvSpPr>
         <p:spPr>
           <a:xfrm flipH="1">
-            <a:off x="2125327" y="3007120"/>
+            <a:off x="3286885" y="3167761"/>
             <a:ext cx="299550" cy="338554"/>
           </a:xfrm>
           <a:prstGeom prst="rect">
@@ -5341,7 +5341,7 @@
         </p:nvSpPr>
         <p:spPr>
           <a:xfrm flipH="1">
-            <a:off x="1200214" y="2523894"/>
+            <a:off x="2361772" y="2684535"/>
             <a:ext cx="299550" cy="338554"/>
           </a:xfrm>
           <a:prstGeom prst="rect">
@@ -5376,7 +5376,7 @@
         </p:nvSpPr>
         <p:spPr>
           <a:xfrm flipH="1">
-            <a:off x="3364012" y="2185340"/>
+            <a:off x="4525570" y="2345981"/>
             <a:ext cx="490169" cy="338554"/>
           </a:xfrm>
           <a:prstGeom prst="rect">
@@ -5411,7 +5411,7 @@
         </p:nvSpPr>
         <p:spPr>
           <a:xfrm flipH="1">
-            <a:off x="4761899" y="1678037"/>
+            <a:off x="5923457" y="1838678"/>
             <a:ext cx="490169" cy="338554"/>
           </a:xfrm>
           <a:prstGeom prst="rect">
@@ -5446,7 +5446,7 @@
         </p:nvSpPr>
         <p:spPr>
           <a:xfrm flipH="1">
-            <a:off x="5461796" y="2300643"/>
+            <a:off x="6623354" y="2461284"/>
             <a:ext cx="490169" cy="338554"/>
           </a:xfrm>
           <a:prstGeom prst="rect">
@@ -5481,7 +5481,7 @@
         </p:nvSpPr>
         <p:spPr>
           <a:xfrm flipH="1">
-            <a:off x="3882996" y="4178246"/>
+            <a:off x="5044554" y="4338887"/>
             <a:ext cx="490169" cy="338554"/>
           </a:xfrm>
           <a:prstGeom prst="rect">
@@ -5516,7 +5516,7 @@
         </p:nvSpPr>
         <p:spPr>
           <a:xfrm flipH="1">
-            <a:off x="4850636" y="4101942"/>
+            <a:off x="6012194" y="4262583"/>
             <a:ext cx="490169" cy="338554"/>
           </a:xfrm>
           <a:prstGeom prst="rect">
@@ -5551,7 +5551,7 @@
         </p:nvSpPr>
         <p:spPr>
           <a:xfrm flipH="1">
-            <a:off x="6429144" y="4376531"/>
+            <a:off x="7590702" y="4537172"/>
             <a:ext cx="490169" cy="338554"/>
           </a:xfrm>
           <a:prstGeom prst="rect">

</xml_diff>

<commit_message>
Developing again. Gathering vocabulary from text corpus...
Former-commit-id: f1982fc07e94aa14a3314669cab2df7196bf0299
Former-commit-id: a7896752306f79dba78ffe1467f457d76c7bfcc6
</commit_message>
<xml_diff>
--- a/Plan_Task1.pptx
+++ b/Plan_Task1.pptx
@@ -261,7 +261,7 @@
           <a:lstStyle/>
           <a:p>
             <a:fld id="{803220A4-8895-6D46-A558-2CE2469121C7}" type="datetimeFigureOut">
-              <a:t>9/5/19</a:t>
+              <a:t>10/11/19</a:t>
             </a:fld>
             <a:endParaRPr lang="en-US"/>
           </a:p>
@@ -459,7 +459,7 @@
           <a:lstStyle/>
           <a:p>
             <a:fld id="{803220A4-8895-6D46-A558-2CE2469121C7}" type="datetimeFigureOut">
-              <a:t>9/5/19</a:t>
+              <a:t>10/11/19</a:t>
             </a:fld>
             <a:endParaRPr lang="en-US"/>
           </a:p>
@@ -667,7 +667,7 @@
           <a:lstStyle/>
           <a:p>
             <a:fld id="{803220A4-8895-6D46-A558-2CE2469121C7}" type="datetimeFigureOut">
-              <a:t>9/5/19</a:t>
+              <a:t>10/11/19</a:t>
             </a:fld>
             <a:endParaRPr lang="en-US"/>
           </a:p>
@@ -865,7 +865,7 @@
           <a:lstStyle/>
           <a:p>
             <a:fld id="{803220A4-8895-6D46-A558-2CE2469121C7}" type="datetimeFigureOut">
-              <a:t>9/5/19</a:t>
+              <a:t>10/11/19</a:t>
             </a:fld>
             <a:endParaRPr lang="en-US"/>
           </a:p>
@@ -1139,7 +1139,7 @@
           <a:lstStyle/>
           <a:p>
             <a:fld id="{803220A4-8895-6D46-A558-2CE2469121C7}" type="datetimeFigureOut">
-              <a:t>9/5/19</a:t>
+              <a:t>10/11/19</a:t>
             </a:fld>
             <a:endParaRPr lang="en-US"/>
           </a:p>
@@ -1405,7 +1405,7 @@
           <a:lstStyle/>
           <a:p>
             <a:fld id="{803220A4-8895-6D46-A558-2CE2469121C7}" type="datetimeFigureOut">
-              <a:t>9/5/19</a:t>
+              <a:t>10/11/19</a:t>
             </a:fld>
             <a:endParaRPr lang="en-US"/>
           </a:p>
@@ -1818,7 +1818,7 @@
           <a:lstStyle/>
           <a:p>
             <a:fld id="{803220A4-8895-6D46-A558-2CE2469121C7}" type="datetimeFigureOut">
-              <a:t>9/5/19</a:t>
+              <a:t>10/11/19</a:t>
             </a:fld>
             <a:endParaRPr lang="en-US"/>
           </a:p>
@@ -1958,7 +1958,7 @@
           <a:lstStyle/>
           <a:p>
             <a:fld id="{803220A4-8895-6D46-A558-2CE2469121C7}" type="datetimeFigureOut">
-              <a:t>9/5/19</a:t>
+              <a:t>10/11/19</a:t>
             </a:fld>
             <a:endParaRPr lang="en-US"/>
           </a:p>
@@ -2069,7 +2069,7 @@
           <a:lstStyle/>
           <a:p>
             <a:fld id="{803220A4-8895-6D46-A558-2CE2469121C7}" type="datetimeFigureOut">
-              <a:t>9/5/19</a:t>
+              <a:t>10/11/19</a:t>
             </a:fld>
             <a:endParaRPr lang="en-US"/>
           </a:p>
@@ -2380,7 +2380,7 @@
           <a:lstStyle/>
           <a:p>
             <a:fld id="{803220A4-8895-6D46-A558-2CE2469121C7}" type="datetimeFigureOut">
-              <a:t>9/5/19</a:t>
+              <a:t>10/11/19</a:t>
             </a:fld>
             <a:endParaRPr lang="en-US"/>
           </a:p>
@@ -2667,7 +2667,7 @@
           <a:lstStyle/>
           <a:p>
             <a:fld id="{803220A4-8895-6D46-A558-2CE2469121C7}" type="datetimeFigureOut">
-              <a:t>9/5/19</a:t>
+              <a:t>10/11/19</a:t>
             </a:fld>
             <a:endParaRPr lang="en-US"/>
           </a:p>
@@ -2908,7 +2908,7 @@
           </a:lstStyle>
           <a:p>
             <a:fld id="{803220A4-8895-6D46-A558-2CE2469121C7}" type="datetimeFigureOut">
-              <a:t>9/5/19</a:t>
+              <a:t>10/11/19</a:t>
             </a:fld>
             <a:endParaRPr lang="en-US"/>
           </a:p>
@@ -5572,6 +5572,62 @@
           </a:p>
         </p:txBody>
       </p:sp>
+      <p:sp>
+        <p:nvSpPr>
+          <p:cNvPr id="53" name="Rectangle 52">
+            <a:extLst>
+              <a:ext uri="{FF2B5EF4-FFF2-40B4-BE49-F238E27FC236}">
+                <a16:creationId xmlns:a16="http://schemas.microsoft.com/office/drawing/2014/main" id="{E4A62AC1-0E5B-3447-8185-435CB4862F92}"/>
+              </a:ext>
+            </a:extLst>
+          </p:cNvPr>
+          <p:cNvSpPr/>
+          <p:nvPr/>
+        </p:nvSpPr>
+        <p:spPr>
+          <a:xfrm>
+            <a:off x="10620892" y="3054012"/>
+            <a:ext cx="963827" cy="815546"/>
+          </a:xfrm>
+          <a:prstGeom prst="rect">
+            <a:avLst/>
+          </a:prstGeom>
+        </p:spPr>
+        <p:style>
+          <a:lnRef idx="2">
+            <a:schemeClr val="accent4">
+              <a:shade val="50000"/>
+            </a:schemeClr>
+          </a:lnRef>
+          <a:fillRef idx="1">
+            <a:schemeClr val="accent4"/>
+          </a:fillRef>
+          <a:effectRef idx="0">
+            <a:schemeClr val="accent4"/>
+          </a:effectRef>
+          <a:fontRef idx="minor">
+            <a:schemeClr val="lt1"/>
+          </a:fontRef>
+        </p:style>
+        <p:txBody>
+          <a:bodyPr rtlCol="0" anchor="ctr"/>
+          <a:lstStyle/>
+          <a:p>
+            <a:pPr algn="ctr"/>
+            <a:r>
+              <a:rPr lang="en-US"/>
+              <a:t>for.</a:t>
+            </a:r>
+            <a:br>
+              <a:rPr lang="en-US"/>
+            </a:br>
+            <a:r>
+              <a:rPr lang="en-US"/>
+              <a:t>global</a:t>
+            </a:r>
+          </a:p>
+        </p:txBody>
+      </p:sp>
     </p:spTree>
     <p:extLst>
       <p:ext uri="{BB962C8B-B14F-4D97-AF65-F5344CB8AC3E}">

</xml_diff>